<commit_message>
update template files used when create new file
fix "Vincent Lee is author of all Word files created in Seahub"
</commit_message>
<xml_diff>
--- a/media/office-template/empty.pptx
+++ b/media/office-template/empty.pptx
@@ -11,7 +11,7 @@
   <p:notesSz cx="6858000" cy="9144000"/>
   <p:defaultTextStyle>
     <a:defPPr>
-      <a:defRPr lang="en-US"/>
+      <a:defRPr lang="zh-CN"/>
     </a:defPPr>
     <a:lvl1pPr marL="0" algn="l" defTabSz="914400" rtl="0" eaLnBrk="1" latinLnBrk="0" hangingPunct="1">
       <a:defRPr sz="1800" kern="1200">
@@ -104,17 +104,12 @@
       </a:defRPr>
     </a:lvl9pPr>
   </p:defaultTextStyle>
-  <p:extLst>
-    <p:ext uri="{EFAFB233-063F-42B5-8137-9DF3F51BA10A}">
-      <p15:sldGuideLst xmlns:p15="http://schemas.microsoft.com/office/powerpoint/2012/main"/>
-    </p:ext>
-  </p:extLst>
 </p:presentation>
 </file>
 
 <file path=ppt/slideLayouts/slideLayout1.xml><?xml version="1.0" encoding="utf-8"?>
 <p:sldLayout xmlns:a="http://schemas.openxmlformats.org/drawingml/2006/main" xmlns:r="http://schemas.openxmlformats.org/officeDocument/2006/relationships" xmlns:p="http://schemas.openxmlformats.org/presentationml/2006/main" type="title" preserve="1">
-  <p:cSld name="Title Slide">
+  <p:cSld name="标题幻灯片">
     <p:spTree>
       <p:nvGrpSpPr>
         <p:cNvPr id="1" name=""/>
@@ -131,7 +126,13 @@
       </p:grpSpPr>
       <p:sp>
         <p:nvSpPr>
-          <p:cNvPr id="2" name="Title 1"/>
+          <p:cNvPr id="2" name="标题 1">
+            <a:extLst>
+              <a:ext uri="{FF2B5EF4-FFF2-40B4-BE49-F238E27FC236}">
+                <a16:creationId xmlns:a16="http://schemas.microsoft.com/office/drawing/2014/main" id="{24C8F438-DBB6-40FA-A5A1-EB55F7B24EB2}"/>
+              </a:ext>
+            </a:extLst>
+          </p:cNvPr>
           <p:cNvSpPr>
             <a:spLocks noGrp="1"/>
           </p:cNvSpPr>
@@ -154,16 +155,21 @@
           </a:lstStyle>
           <a:p>
             <a:r>
-              <a:rPr lang="en-US" smtClean="0"/>
-              <a:t>Click to edit Master title style</a:t>
-            </a:r>
-            <a:endParaRPr lang="en-US"/>
-          </a:p>
-        </p:txBody>
-      </p:sp>
-      <p:sp>
-        <p:nvSpPr>
-          <p:cNvPr id="3" name="Subtitle 2"/>
+              <a:rPr lang="zh-CN" altLang="en-US"/>
+              <a:t>单击此处编辑母版标题样式</a:t>
+            </a:r>
+          </a:p>
+        </p:txBody>
+      </p:sp>
+      <p:sp>
+        <p:nvSpPr>
+          <p:cNvPr id="3" name="副标题 2">
+            <a:extLst>
+              <a:ext uri="{FF2B5EF4-FFF2-40B4-BE49-F238E27FC236}">
+                <a16:creationId xmlns:a16="http://schemas.microsoft.com/office/drawing/2014/main" id="{0C5BE3EB-E61B-4C3B-8D2A-5E6D66672E55}"/>
+              </a:ext>
+            </a:extLst>
+          </p:cNvPr>
           <p:cNvSpPr>
             <a:spLocks noGrp="1"/>
           </p:cNvSpPr>
@@ -219,16 +225,21 @@
           </a:lstStyle>
           <a:p>
             <a:r>
-              <a:rPr lang="en-US" smtClean="0"/>
-              <a:t>Click to edit Master subtitle style</a:t>
-            </a:r>
-            <a:endParaRPr lang="en-US"/>
-          </a:p>
-        </p:txBody>
-      </p:sp>
-      <p:sp>
-        <p:nvSpPr>
-          <p:cNvPr id="4" name="Date Placeholder 3"/>
+              <a:rPr lang="zh-CN" altLang="en-US"/>
+              <a:t>单击此处编辑母版副标题样式</a:t>
+            </a:r>
+          </a:p>
+        </p:txBody>
+      </p:sp>
+      <p:sp>
+        <p:nvSpPr>
+          <p:cNvPr id="4" name="日期占位符 3">
+            <a:extLst>
+              <a:ext uri="{FF2B5EF4-FFF2-40B4-BE49-F238E27FC236}">
+                <a16:creationId xmlns:a16="http://schemas.microsoft.com/office/drawing/2014/main" id="{9C0AA3EF-F806-4546-A871-02C5B9192A3C}"/>
+              </a:ext>
+            </a:extLst>
+          </p:cNvPr>
           <p:cNvSpPr>
             <a:spLocks noGrp="1"/>
           </p:cNvSpPr>
@@ -241,17 +252,23 @@
           <a:bodyPr/>
           <a:lstStyle/>
           <a:p>
-            <a:fld id="{F1FA7AC5-6045-4418-8E60-F48788734473}" type="datetimeFigureOut">
-              <a:rPr lang="en-US" smtClean="0"/>
-              <a:t>7/26/2012</a:t>
+            <a:fld id="{488607AE-241E-4541-9A94-40C722101DE2}" type="datetimeFigureOut">
+              <a:rPr lang="zh-CN" altLang="en-US" smtClean="0"/>
+              <a:t>2019/6/27</a:t>
             </a:fld>
-            <a:endParaRPr lang="en-US"/>
-          </a:p>
-        </p:txBody>
-      </p:sp>
-      <p:sp>
-        <p:nvSpPr>
-          <p:cNvPr id="5" name="Footer Placeholder 4"/>
+            <a:endParaRPr lang="zh-CN" altLang="en-US"/>
+          </a:p>
+        </p:txBody>
+      </p:sp>
+      <p:sp>
+        <p:nvSpPr>
+          <p:cNvPr id="5" name="页脚占位符 4">
+            <a:extLst>
+              <a:ext uri="{FF2B5EF4-FFF2-40B4-BE49-F238E27FC236}">
+                <a16:creationId xmlns:a16="http://schemas.microsoft.com/office/drawing/2014/main" id="{35A8D405-0BBF-4F59-A3C0-C27993C5E74C}"/>
+              </a:ext>
+            </a:extLst>
+          </p:cNvPr>
           <p:cNvSpPr>
             <a:spLocks noGrp="1"/>
           </p:cNvSpPr>
@@ -264,13 +281,19 @@
           <a:bodyPr/>
           <a:lstStyle/>
           <a:p>
-            <a:endParaRPr lang="en-US"/>
-          </a:p>
-        </p:txBody>
-      </p:sp>
-      <p:sp>
-        <p:nvSpPr>
-          <p:cNvPr id="6" name="Slide Number Placeholder 5"/>
+            <a:endParaRPr lang="zh-CN" altLang="en-US"/>
+          </a:p>
+        </p:txBody>
+      </p:sp>
+      <p:sp>
+        <p:nvSpPr>
+          <p:cNvPr id="6" name="灯片编号占位符 5">
+            <a:extLst>
+              <a:ext uri="{FF2B5EF4-FFF2-40B4-BE49-F238E27FC236}">
+                <a16:creationId xmlns:a16="http://schemas.microsoft.com/office/drawing/2014/main" id="{B37B6A98-35F3-49A4-8DBD-E38FF1856B64}"/>
+              </a:ext>
+            </a:extLst>
+          </p:cNvPr>
           <p:cNvSpPr>
             <a:spLocks noGrp="1"/>
           </p:cNvSpPr>
@@ -283,18 +306,18 @@
           <a:bodyPr/>
           <a:lstStyle/>
           <a:p>
-            <a:fld id="{8C71CAF9-4461-454A-B702-D536C3775752}" type="slidenum">
-              <a:rPr lang="en-US" smtClean="0"/>
+            <a:fld id="{7673EE0C-0863-498C-9054-DB8CCFC87F4C}" type="slidenum">
+              <a:rPr lang="zh-CN" altLang="en-US" smtClean="0"/>
               <a:t>‹#›</a:t>
             </a:fld>
-            <a:endParaRPr lang="en-US"/>
+            <a:endParaRPr lang="zh-CN" altLang="en-US"/>
           </a:p>
         </p:txBody>
       </p:sp>
     </p:spTree>
     <p:extLst>
       <p:ext uri="{BB962C8B-B14F-4D97-AF65-F5344CB8AC3E}">
-        <p14:creationId xmlns:p14="http://schemas.microsoft.com/office/powerpoint/2010/main" val="508168537"/>
+        <p14:creationId xmlns:p14="http://schemas.microsoft.com/office/powerpoint/2010/main" val="654707259"/>
       </p:ext>
     </p:extLst>
   </p:cSld>
@@ -306,7 +329,7 @@
 
 <file path=ppt/slideLayouts/slideLayout10.xml><?xml version="1.0" encoding="utf-8"?>
 <p:sldLayout xmlns:a="http://schemas.openxmlformats.org/drawingml/2006/main" xmlns:r="http://schemas.openxmlformats.org/officeDocument/2006/relationships" xmlns:p="http://schemas.openxmlformats.org/presentationml/2006/main" type="vertTx" preserve="1">
-  <p:cSld name="Title and Vertical Text">
+  <p:cSld name="标题和竖排文字">
     <p:spTree>
       <p:nvGrpSpPr>
         <p:cNvPr id="1" name=""/>
@@ -323,7 +346,13 @@
       </p:grpSpPr>
       <p:sp>
         <p:nvSpPr>
-          <p:cNvPr id="2" name="Title 1"/>
+          <p:cNvPr id="2" name="标题 1">
+            <a:extLst>
+              <a:ext uri="{FF2B5EF4-FFF2-40B4-BE49-F238E27FC236}">
+                <a16:creationId xmlns:a16="http://schemas.microsoft.com/office/drawing/2014/main" id="{577275BE-E30C-4305-999D-8BC0AA7A54AF}"/>
+              </a:ext>
+            </a:extLst>
+          </p:cNvPr>
           <p:cNvSpPr>
             <a:spLocks noGrp="1"/>
           </p:cNvSpPr>
@@ -337,16 +366,21 @@
           <a:lstStyle/>
           <a:p>
             <a:r>
-              <a:rPr lang="en-US" smtClean="0"/>
-              <a:t>Click to edit Master title style</a:t>
-            </a:r>
-            <a:endParaRPr lang="en-US"/>
-          </a:p>
-        </p:txBody>
-      </p:sp>
-      <p:sp>
-        <p:nvSpPr>
-          <p:cNvPr id="3" name="Vertical Text Placeholder 2"/>
+              <a:rPr lang="zh-CN" altLang="en-US"/>
+              <a:t>单击此处编辑母版标题样式</a:t>
+            </a:r>
+          </a:p>
+        </p:txBody>
+      </p:sp>
+      <p:sp>
+        <p:nvSpPr>
+          <p:cNvPr id="3" name="竖排文字占位符 2">
+            <a:extLst>
+              <a:ext uri="{FF2B5EF4-FFF2-40B4-BE49-F238E27FC236}">
+                <a16:creationId xmlns:a16="http://schemas.microsoft.com/office/drawing/2014/main" id="{80D329F8-9884-44CB-A831-6EA4CA413555}"/>
+              </a:ext>
+            </a:extLst>
+          </p:cNvPr>
           <p:cNvSpPr>
             <a:spLocks noGrp="1"/>
           </p:cNvSpPr>
@@ -361,44 +395,49 @@
           <a:p>
             <a:pPr lvl="0"/>
             <a:r>
-              <a:rPr lang="en-US" smtClean="0"/>
-              <a:t>Click to edit Master text styles</a:t>
+              <a:rPr lang="zh-CN" altLang="en-US"/>
+              <a:t>单击此处编辑母版文本样式</a:t>
             </a:r>
           </a:p>
           <a:p>
             <a:pPr lvl="1"/>
             <a:r>
-              <a:rPr lang="en-US" smtClean="0"/>
-              <a:t>Second level</a:t>
+              <a:rPr lang="zh-CN" altLang="en-US"/>
+              <a:t>二级</a:t>
             </a:r>
           </a:p>
           <a:p>
             <a:pPr lvl="2"/>
             <a:r>
-              <a:rPr lang="en-US" smtClean="0"/>
-              <a:t>Third level</a:t>
+              <a:rPr lang="zh-CN" altLang="en-US"/>
+              <a:t>三级</a:t>
             </a:r>
           </a:p>
           <a:p>
             <a:pPr lvl="3"/>
             <a:r>
-              <a:rPr lang="en-US" smtClean="0"/>
-              <a:t>Fourth level</a:t>
+              <a:rPr lang="zh-CN" altLang="en-US"/>
+              <a:t>四级</a:t>
             </a:r>
           </a:p>
           <a:p>
             <a:pPr lvl="4"/>
             <a:r>
-              <a:rPr lang="en-US" smtClean="0"/>
-              <a:t>Fifth level</a:t>
-            </a:r>
-            <a:endParaRPr lang="en-US"/>
-          </a:p>
-        </p:txBody>
-      </p:sp>
-      <p:sp>
-        <p:nvSpPr>
-          <p:cNvPr id="4" name="Date Placeholder 3"/>
+              <a:rPr lang="zh-CN" altLang="en-US"/>
+              <a:t>五级</a:t>
+            </a:r>
+          </a:p>
+        </p:txBody>
+      </p:sp>
+      <p:sp>
+        <p:nvSpPr>
+          <p:cNvPr id="4" name="日期占位符 3">
+            <a:extLst>
+              <a:ext uri="{FF2B5EF4-FFF2-40B4-BE49-F238E27FC236}">
+                <a16:creationId xmlns:a16="http://schemas.microsoft.com/office/drawing/2014/main" id="{DEF50CB3-8937-4101-BABB-9A4BF947A78D}"/>
+              </a:ext>
+            </a:extLst>
+          </p:cNvPr>
           <p:cNvSpPr>
             <a:spLocks noGrp="1"/>
           </p:cNvSpPr>
@@ -411,17 +450,23 @@
           <a:bodyPr/>
           <a:lstStyle/>
           <a:p>
-            <a:fld id="{F1FA7AC5-6045-4418-8E60-F48788734473}" type="datetimeFigureOut">
-              <a:rPr lang="en-US" smtClean="0"/>
-              <a:t>7/26/2012</a:t>
+            <a:fld id="{488607AE-241E-4541-9A94-40C722101DE2}" type="datetimeFigureOut">
+              <a:rPr lang="zh-CN" altLang="en-US" smtClean="0"/>
+              <a:t>2019/6/27</a:t>
             </a:fld>
-            <a:endParaRPr lang="en-US"/>
-          </a:p>
-        </p:txBody>
-      </p:sp>
-      <p:sp>
-        <p:nvSpPr>
-          <p:cNvPr id="5" name="Footer Placeholder 4"/>
+            <a:endParaRPr lang="zh-CN" altLang="en-US"/>
+          </a:p>
+        </p:txBody>
+      </p:sp>
+      <p:sp>
+        <p:nvSpPr>
+          <p:cNvPr id="5" name="页脚占位符 4">
+            <a:extLst>
+              <a:ext uri="{FF2B5EF4-FFF2-40B4-BE49-F238E27FC236}">
+                <a16:creationId xmlns:a16="http://schemas.microsoft.com/office/drawing/2014/main" id="{4D1C46FA-35B6-43F3-B54F-446C800A52AA}"/>
+              </a:ext>
+            </a:extLst>
+          </p:cNvPr>
           <p:cNvSpPr>
             <a:spLocks noGrp="1"/>
           </p:cNvSpPr>
@@ -434,13 +479,19 @@
           <a:bodyPr/>
           <a:lstStyle/>
           <a:p>
-            <a:endParaRPr lang="en-US"/>
-          </a:p>
-        </p:txBody>
-      </p:sp>
-      <p:sp>
-        <p:nvSpPr>
-          <p:cNvPr id="6" name="Slide Number Placeholder 5"/>
+            <a:endParaRPr lang="zh-CN" altLang="en-US"/>
+          </a:p>
+        </p:txBody>
+      </p:sp>
+      <p:sp>
+        <p:nvSpPr>
+          <p:cNvPr id="6" name="灯片编号占位符 5">
+            <a:extLst>
+              <a:ext uri="{FF2B5EF4-FFF2-40B4-BE49-F238E27FC236}">
+                <a16:creationId xmlns:a16="http://schemas.microsoft.com/office/drawing/2014/main" id="{ECA19D81-4324-4E78-BBCB-28D16A1EBF3B}"/>
+              </a:ext>
+            </a:extLst>
+          </p:cNvPr>
           <p:cNvSpPr>
             <a:spLocks noGrp="1"/>
           </p:cNvSpPr>
@@ -453,18 +504,18 @@
           <a:bodyPr/>
           <a:lstStyle/>
           <a:p>
-            <a:fld id="{8C71CAF9-4461-454A-B702-D536C3775752}" type="slidenum">
-              <a:rPr lang="en-US" smtClean="0"/>
+            <a:fld id="{7673EE0C-0863-498C-9054-DB8CCFC87F4C}" type="slidenum">
+              <a:rPr lang="zh-CN" altLang="en-US" smtClean="0"/>
               <a:t>‹#›</a:t>
             </a:fld>
-            <a:endParaRPr lang="en-US"/>
+            <a:endParaRPr lang="zh-CN" altLang="en-US"/>
           </a:p>
         </p:txBody>
       </p:sp>
     </p:spTree>
     <p:extLst>
       <p:ext uri="{BB962C8B-B14F-4D97-AF65-F5344CB8AC3E}">
-        <p14:creationId xmlns:p14="http://schemas.microsoft.com/office/powerpoint/2010/main" val="613236000"/>
+        <p14:creationId xmlns:p14="http://schemas.microsoft.com/office/powerpoint/2010/main" val="4007917575"/>
       </p:ext>
     </p:extLst>
   </p:cSld>
@@ -476,7 +527,7 @@
 
 <file path=ppt/slideLayouts/slideLayout11.xml><?xml version="1.0" encoding="utf-8"?>
 <p:sldLayout xmlns:a="http://schemas.openxmlformats.org/drawingml/2006/main" xmlns:r="http://schemas.openxmlformats.org/officeDocument/2006/relationships" xmlns:p="http://schemas.openxmlformats.org/presentationml/2006/main" type="vertTitleAndTx" preserve="1">
-  <p:cSld name="Vertical Title and Text">
+  <p:cSld name="竖排标题与文本">
     <p:spTree>
       <p:nvGrpSpPr>
         <p:cNvPr id="1" name=""/>
@@ -493,7 +544,13 @@
       </p:grpSpPr>
       <p:sp>
         <p:nvSpPr>
-          <p:cNvPr id="2" name="Vertical Title 1"/>
+          <p:cNvPr id="2" name="竖排标题 1">
+            <a:extLst>
+              <a:ext uri="{FF2B5EF4-FFF2-40B4-BE49-F238E27FC236}">
+                <a16:creationId xmlns:a16="http://schemas.microsoft.com/office/drawing/2014/main" id="{76B62B14-6685-44B4-BB6D-0C469F412C1A}"/>
+              </a:ext>
+            </a:extLst>
+          </p:cNvPr>
           <p:cNvSpPr>
             <a:spLocks noGrp="1"/>
           </p:cNvSpPr>
@@ -512,16 +569,21 @@
           <a:lstStyle/>
           <a:p>
             <a:r>
-              <a:rPr lang="en-US" smtClean="0"/>
-              <a:t>Click to edit Master title style</a:t>
-            </a:r>
-            <a:endParaRPr lang="en-US"/>
-          </a:p>
-        </p:txBody>
-      </p:sp>
-      <p:sp>
-        <p:nvSpPr>
-          <p:cNvPr id="3" name="Vertical Text Placeholder 2"/>
+              <a:rPr lang="zh-CN" altLang="en-US"/>
+              <a:t>单击此处编辑母版标题样式</a:t>
+            </a:r>
+          </a:p>
+        </p:txBody>
+      </p:sp>
+      <p:sp>
+        <p:nvSpPr>
+          <p:cNvPr id="3" name="竖排文字占位符 2">
+            <a:extLst>
+              <a:ext uri="{FF2B5EF4-FFF2-40B4-BE49-F238E27FC236}">
+                <a16:creationId xmlns:a16="http://schemas.microsoft.com/office/drawing/2014/main" id="{B46C389E-3F8A-4740-AFD3-17659AF5A3AF}"/>
+              </a:ext>
+            </a:extLst>
+          </p:cNvPr>
           <p:cNvSpPr>
             <a:spLocks noGrp="1"/>
           </p:cNvSpPr>
@@ -541,44 +603,49 @@
           <a:p>
             <a:pPr lvl="0"/>
             <a:r>
-              <a:rPr lang="en-US" smtClean="0"/>
-              <a:t>Click to edit Master text styles</a:t>
+              <a:rPr lang="zh-CN" altLang="en-US"/>
+              <a:t>单击此处编辑母版文本样式</a:t>
             </a:r>
           </a:p>
           <a:p>
             <a:pPr lvl="1"/>
             <a:r>
-              <a:rPr lang="en-US" smtClean="0"/>
-              <a:t>Second level</a:t>
+              <a:rPr lang="zh-CN" altLang="en-US"/>
+              <a:t>二级</a:t>
             </a:r>
           </a:p>
           <a:p>
             <a:pPr lvl="2"/>
             <a:r>
-              <a:rPr lang="en-US" smtClean="0"/>
-              <a:t>Third level</a:t>
+              <a:rPr lang="zh-CN" altLang="en-US"/>
+              <a:t>三级</a:t>
             </a:r>
           </a:p>
           <a:p>
             <a:pPr lvl="3"/>
             <a:r>
-              <a:rPr lang="en-US" smtClean="0"/>
-              <a:t>Fourth level</a:t>
+              <a:rPr lang="zh-CN" altLang="en-US"/>
+              <a:t>四级</a:t>
             </a:r>
           </a:p>
           <a:p>
             <a:pPr lvl="4"/>
             <a:r>
-              <a:rPr lang="en-US" smtClean="0"/>
-              <a:t>Fifth level</a:t>
-            </a:r>
-            <a:endParaRPr lang="en-US"/>
-          </a:p>
-        </p:txBody>
-      </p:sp>
-      <p:sp>
-        <p:nvSpPr>
-          <p:cNvPr id="4" name="Date Placeholder 3"/>
+              <a:rPr lang="zh-CN" altLang="en-US"/>
+              <a:t>五级</a:t>
+            </a:r>
+          </a:p>
+        </p:txBody>
+      </p:sp>
+      <p:sp>
+        <p:nvSpPr>
+          <p:cNvPr id="4" name="日期占位符 3">
+            <a:extLst>
+              <a:ext uri="{FF2B5EF4-FFF2-40B4-BE49-F238E27FC236}">
+                <a16:creationId xmlns:a16="http://schemas.microsoft.com/office/drawing/2014/main" id="{0E7E5460-3B8E-4763-9BF3-142F005C6EE4}"/>
+              </a:ext>
+            </a:extLst>
+          </p:cNvPr>
           <p:cNvSpPr>
             <a:spLocks noGrp="1"/>
           </p:cNvSpPr>
@@ -591,17 +658,23 @@
           <a:bodyPr/>
           <a:lstStyle/>
           <a:p>
-            <a:fld id="{F1FA7AC5-6045-4418-8E60-F48788734473}" type="datetimeFigureOut">
-              <a:rPr lang="en-US" smtClean="0"/>
-              <a:t>7/26/2012</a:t>
+            <a:fld id="{488607AE-241E-4541-9A94-40C722101DE2}" type="datetimeFigureOut">
+              <a:rPr lang="zh-CN" altLang="en-US" smtClean="0"/>
+              <a:t>2019/6/27</a:t>
             </a:fld>
-            <a:endParaRPr lang="en-US"/>
-          </a:p>
-        </p:txBody>
-      </p:sp>
-      <p:sp>
-        <p:nvSpPr>
-          <p:cNvPr id="5" name="Footer Placeholder 4"/>
+            <a:endParaRPr lang="zh-CN" altLang="en-US"/>
+          </a:p>
+        </p:txBody>
+      </p:sp>
+      <p:sp>
+        <p:nvSpPr>
+          <p:cNvPr id="5" name="页脚占位符 4">
+            <a:extLst>
+              <a:ext uri="{FF2B5EF4-FFF2-40B4-BE49-F238E27FC236}">
+                <a16:creationId xmlns:a16="http://schemas.microsoft.com/office/drawing/2014/main" id="{F7DADC92-471A-46C6-9F60-128130E8BB1B}"/>
+              </a:ext>
+            </a:extLst>
+          </p:cNvPr>
           <p:cNvSpPr>
             <a:spLocks noGrp="1"/>
           </p:cNvSpPr>
@@ -614,13 +687,19 @@
           <a:bodyPr/>
           <a:lstStyle/>
           <a:p>
-            <a:endParaRPr lang="en-US"/>
-          </a:p>
-        </p:txBody>
-      </p:sp>
-      <p:sp>
-        <p:nvSpPr>
-          <p:cNvPr id="6" name="Slide Number Placeholder 5"/>
+            <a:endParaRPr lang="zh-CN" altLang="en-US"/>
+          </a:p>
+        </p:txBody>
+      </p:sp>
+      <p:sp>
+        <p:nvSpPr>
+          <p:cNvPr id="6" name="灯片编号占位符 5">
+            <a:extLst>
+              <a:ext uri="{FF2B5EF4-FFF2-40B4-BE49-F238E27FC236}">
+                <a16:creationId xmlns:a16="http://schemas.microsoft.com/office/drawing/2014/main" id="{3CF9632D-97D0-456E-B34C-2F1934F13BB8}"/>
+              </a:ext>
+            </a:extLst>
+          </p:cNvPr>
           <p:cNvSpPr>
             <a:spLocks noGrp="1"/>
           </p:cNvSpPr>
@@ -633,18 +712,18 @@
           <a:bodyPr/>
           <a:lstStyle/>
           <a:p>
-            <a:fld id="{8C71CAF9-4461-454A-B702-D536C3775752}" type="slidenum">
-              <a:rPr lang="en-US" smtClean="0"/>
+            <a:fld id="{7673EE0C-0863-498C-9054-DB8CCFC87F4C}" type="slidenum">
+              <a:rPr lang="zh-CN" altLang="en-US" smtClean="0"/>
               <a:t>‹#›</a:t>
             </a:fld>
-            <a:endParaRPr lang="en-US"/>
+            <a:endParaRPr lang="zh-CN" altLang="en-US"/>
           </a:p>
         </p:txBody>
       </p:sp>
     </p:spTree>
     <p:extLst>
       <p:ext uri="{BB962C8B-B14F-4D97-AF65-F5344CB8AC3E}">
-        <p14:creationId xmlns:p14="http://schemas.microsoft.com/office/powerpoint/2010/main" val="2660566950"/>
+        <p14:creationId xmlns:p14="http://schemas.microsoft.com/office/powerpoint/2010/main" val="3746448495"/>
       </p:ext>
     </p:extLst>
   </p:cSld>
@@ -656,7 +735,7 @@
 
 <file path=ppt/slideLayouts/slideLayout2.xml><?xml version="1.0" encoding="utf-8"?>
 <p:sldLayout xmlns:a="http://schemas.openxmlformats.org/drawingml/2006/main" xmlns:r="http://schemas.openxmlformats.org/officeDocument/2006/relationships" xmlns:p="http://schemas.openxmlformats.org/presentationml/2006/main" type="obj" preserve="1">
-  <p:cSld name="Title and Content">
+  <p:cSld name="标题和内容">
     <p:spTree>
       <p:nvGrpSpPr>
         <p:cNvPr id="1" name=""/>
@@ -673,7 +752,13 @@
       </p:grpSpPr>
       <p:sp>
         <p:nvSpPr>
-          <p:cNvPr id="2" name="Title 1"/>
+          <p:cNvPr id="2" name="标题 1">
+            <a:extLst>
+              <a:ext uri="{FF2B5EF4-FFF2-40B4-BE49-F238E27FC236}">
+                <a16:creationId xmlns:a16="http://schemas.microsoft.com/office/drawing/2014/main" id="{8F557C3E-EC16-4486-882E-2C6E324B695D}"/>
+              </a:ext>
+            </a:extLst>
+          </p:cNvPr>
           <p:cNvSpPr>
             <a:spLocks noGrp="1"/>
           </p:cNvSpPr>
@@ -687,16 +772,21 @@
           <a:lstStyle/>
           <a:p>
             <a:r>
-              <a:rPr lang="en-US" smtClean="0"/>
-              <a:t>Click to edit Master title style</a:t>
-            </a:r>
-            <a:endParaRPr lang="en-US"/>
-          </a:p>
-        </p:txBody>
-      </p:sp>
-      <p:sp>
-        <p:nvSpPr>
-          <p:cNvPr id="3" name="Content Placeholder 2"/>
+              <a:rPr lang="zh-CN" altLang="en-US"/>
+              <a:t>单击此处编辑母版标题样式</a:t>
+            </a:r>
+          </a:p>
+        </p:txBody>
+      </p:sp>
+      <p:sp>
+        <p:nvSpPr>
+          <p:cNvPr id="3" name="内容占位符 2">
+            <a:extLst>
+              <a:ext uri="{FF2B5EF4-FFF2-40B4-BE49-F238E27FC236}">
+                <a16:creationId xmlns:a16="http://schemas.microsoft.com/office/drawing/2014/main" id="{EA26A6B4-CB26-4DC2-A984-6269BA37FBA0}"/>
+              </a:ext>
+            </a:extLst>
+          </p:cNvPr>
           <p:cNvSpPr>
             <a:spLocks noGrp="1"/>
           </p:cNvSpPr>
@@ -711,44 +801,49 @@
           <a:p>
             <a:pPr lvl="0"/>
             <a:r>
-              <a:rPr lang="en-US" smtClean="0"/>
-              <a:t>Click to edit Master text styles</a:t>
+              <a:rPr lang="zh-CN" altLang="en-US"/>
+              <a:t>单击此处编辑母版文本样式</a:t>
             </a:r>
           </a:p>
           <a:p>
             <a:pPr lvl="1"/>
             <a:r>
-              <a:rPr lang="en-US" smtClean="0"/>
-              <a:t>Second level</a:t>
+              <a:rPr lang="zh-CN" altLang="en-US"/>
+              <a:t>二级</a:t>
             </a:r>
           </a:p>
           <a:p>
             <a:pPr lvl="2"/>
             <a:r>
-              <a:rPr lang="en-US" smtClean="0"/>
-              <a:t>Third level</a:t>
+              <a:rPr lang="zh-CN" altLang="en-US"/>
+              <a:t>三级</a:t>
             </a:r>
           </a:p>
           <a:p>
             <a:pPr lvl="3"/>
             <a:r>
-              <a:rPr lang="en-US" smtClean="0"/>
-              <a:t>Fourth level</a:t>
+              <a:rPr lang="zh-CN" altLang="en-US"/>
+              <a:t>四级</a:t>
             </a:r>
           </a:p>
           <a:p>
             <a:pPr lvl="4"/>
             <a:r>
-              <a:rPr lang="en-US" smtClean="0"/>
-              <a:t>Fifth level</a:t>
-            </a:r>
-            <a:endParaRPr lang="en-US"/>
-          </a:p>
-        </p:txBody>
-      </p:sp>
-      <p:sp>
-        <p:nvSpPr>
-          <p:cNvPr id="4" name="Date Placeholder 3"/>
+              <a:rPr lang="zh-CN" altLang="en-US"/>
+              <a:t>五级</a:t>
+            </a:r>
+          </a:p>
+        </p:txBody>
+      </p:sp>
+      <p:sp>
+        <p:nvSpPr>
+          <p:cNvPr id="4" name="日期占位符 3">
+            <a:extLst>
+              <a:ext uri="{FF2B5EF4-FFF2-40B4-BE49-F238E27FC236}">
+                <a16:creationId xmlns:a16="http://schemas.microsoft.com/office/drawing/2014/main" id="{362AC28E-3054-4EB5-9C9B-2775408AE85F}"/>
+              </a:ext>
+            </a:extLst>
+          </p:cNvPr>
           <p:cNvSpPr>
             <a:spLocks noGrp="1"/>
           </p:cNvSpPr>
@@ -761,17 +856,23 @@
           <a:bodyPr/>
           <a:lstStyle/>
           <a:p>
-            <a:fld id="{F1FA7AC5-6045-4418-8E60-F48788734473}" type="datetimeFigureOut">
-              <a:rPr lang="en-US" smtClean="0"/>
-              <a:t>7/26/2012</a:t>
+            <a:fld id="{488607AE-241E-4541-9A94-40C722101DE2}" type="datetimeFigureOut">
+              <a:rPr lang="zh-CN" altLang="en-US" smtClean="0"/>
+              <a:t>2019/6/27</a:t>
             </a:fld>
-            <a:endParaRPr lang="en-US"/>
-          </a:p>
-        </p:txBody>
-      </p:sp>
-      <p:sp>
-        <p:nvSpPr>
-          <p:cNvPr id="5" name="Footer Placeholder 4"/>
+            <a:endParaRPr lang="zh-CN" altLang="en-US"/>
+          </a:p>
+        </p:txBody>
+      </p:sp>
+      <p:sp>
+        <p:nvSpPr>
+          <p:cNvPr id="5" name="页脚占位符 4">
+            <a:extLst>
+              <a:ext uri="{FF2B5EF4-FFF2-40B4-BE49-F238E27FC236}">
+                <a16:creationId xmlns:a16="http://schemas.microsoft.com/office/drawing/2014/main" id="{3C806D0D-EF2C-4485-BA8B-569B2044C9C0}"/>
+              </a:ext>
+            </a:extLst>
+          </p:cNvPr>
           <p:cNvSpPr>
             <a:spLocks noGrp="1"/>
           </p:cNvSpPr>
@@ -784,13 +885,19 @@
           <a:bodyPr/>
           <a:lstStyle/>
           <a:p>
-            <a:endParaRPr lang="en-US"/>
-          </a:p>
-        </p:txBody>
-      </p:sp>
-      <p:sp>
-        <p:nvSpPr>
-          <p:cNvPr id="6" name="Slide Number Placeholder 5"/>
+            <a:endParaRPr lang="zh-CN" altLang="en-US"/>
+          </a:p>
+        </p:txBody>
+      </p:sp>
+      <p:sp>
+        <p:nvSpPr>
+          <p:cNvPr id="6" name="灯片编号占位符 5">
+            <a:extLst>
+              <a:ext uri="{FF2B5EF4-FFF2-40B4-BE49-F238E27FC236}">
+                <a16:creationId xmlns:a16="http://schemas.microsoft.com/office/drawing/2014/main" id="{85EF0BF0-0B18-4976-9DE3-3B3FEB358D8C}"/>
+              </a:ext>
+            </a:extLst>
+          </p:cNvPr>
           <p:cNvSpPr>
             <a:spLocks noGrp="1"/>
           </p:cNvSpPr>
@@ -803,18 +910,18 @@
           <a:bodyPr/>
           <a:lstStyle/>
           <a:p>
-            <a:fld id="{8C71CAF9-4461-454A-B702-D536C3775752}" type="slidenum">
-              <a:rPr lang="en-US" smtClean="0"/>
+            <a:fld id="{7673EE0C-0863-498C-9054-DB8CCFC87F4C}" type="slidenum">
+              <a:rPr lang="zh-CN" altLang="en-US" smtClean="0"/>
               <a:t>‹#›</a:t>
             </a:fld>
-            <a:endParaRPr lang="en-US"/>
+            <a:endParaRPr lang="zh-CN" altLang="en-US"/>
           </a:p>
         </p:txBody>
       </p:sp>
     </p:spTree>
     <p:extLst>
       <p:ext uri="{BB962C8B-B14F-4D97-AF65-F5344CB8AC3E}">
-        <p14:creationId xmlns:p14="http://schemas.microsoft.com/office/powerpoint/2010/main" val="3386326818"/>
+        <p14:creationId xmlns:p14="http://schemas.microsoft.com/office/powerpoint/2010/main" val="3664822978"/>
       </p:ext>
     </p:extLst>
   </p:cSld>
@@ -826,7 +933,7 @@
 
 <file path=ppt/slideLayouts/slideLayout3.xml><?xml version="1.0" encoding="utf-8"?>
 <p:sldLayout xmlns:a="http://schemas.openxmlformats.org/drawingml/2006/main" xmlns:r="http://schemas.openxmlformats.org/officeDocument/2006/relationships" xmlns:p="http://schemas.openxmlformats.org/presentationml/2006/main" type="secHead" preserve="1">
-  <p:cSld name="Section Header">
+  <p:cSld name="节标题">
     <p:spTree>
       <p:nvGrpSpPr>
         <p:cNvPr id="1" name=""/>
@@ -843,7 +950,13 @@
       </p:grpSpPr>
       <p:sp>
         <p:nvSpPr>
-          <p:cNvPr id="2" name="Title 1"/>
+          <p:cNvPr id="2" name="标题 1">
+            <a:extLst>
+              <a:ext uri="{FF2B5EF4-FFF2-40B4-BE49-F238E27FC236}">
+                <a16:creationId xmlns:a16="http://schemas.microsoft.com/office/drawing/2014/main" id="{959E0B99-83E0-4AE9-8103-6C4F39AD7EC6}"/>
+              </a:ext>
+            </a:extLst>
+          </p:cNvPr>
           <p:cNvSpPr>
             <a:spLocks noGrp="1"/>
           </p:cNvSpPr>
@@ -866,16 +979,21 @@
           </a:lstStyle>
           <a:p>
             <a:r>
-              <a:rPr lang="en-US" smtClean="0"/>
-              <a:t>Click to edit Master title style</a:t>
-            </a:r>
-            <a:endParaRPr lang="en-US"/>
-          </a:p>
-        </p:txBody>
-      </p:sp>
-      <p:sp>
-        <p:nvSpPr>
-          <p:cNvPr id="3" name="Text Placeholder 2"/>
+              <a:rPr lang="zh-CN" altLang="en-US"/>
+              <a:t>单击此处编辑母版标题样式</a:t>
+            </a:r>
+          </a:p>
+        </p:txBody>
+      </p:sp>
+      <p:sp>
+        <p:nvSpPr>
+          <p:cNvPr id="3" name="文本占位符 2">
+            <a:extLst>
+              <a:ext uri="{FF2B5EF4-FFF2-40B4-BE49-F238E27FC236}">
+                <a16:creationId xmlns:a16="http://schemas.microsoft.com/office/drawing/2014/main" id="{1BFB71F3-927C-4A83-9643-5356F61B284B}"/>
+              </a:ext>
+            </a:extLst>
+          </p:cNvPr>
           <p:cNvSpPr>
             <a:spLocks noGrp="1"/>
           </p:cNvSpPr>
@@ -986,15 +1104,21 @@
           <a:p>
             <a:pPr lvl="0"/>
             <a:r>
-              <a:rPr lang="en-US" smtClean="0"/>
-              <a:t>Click to edit Master text styles</a:t>
-            </a:r>
-          </a:p>
-        </p:txBody>
-      </p:sp>
-      <p:sp>
-        <p:nvSpPr>
-          <p:cNvPr id="4" name="Date Placeholder 3"/>
+              <a:rPr lang="zh-CN" altLang="en-US"/>
+              <a:t>单击此处编辑母版文本样式</a:t>
+            </a:r>
+          </a:p>
+        </p:txBody>
+      </p:sp>
+      <p:sp>
+        <p:nvSpPr>
+          <p:cNvPr id="4" name="日期占位符 3">
+            <a:extLst>
+              <a:ext uri="{FF2B5EF4-FFF2-40B4-BE49-F238E27FC236}">
+                <a16:creationId xmlns:a16="http://schemas.microsoft.com/office/drawing/2014/main" id="{7169643B-C09C-4627-9E70-E410C8232114}"/>
+              </a:ext>
+            </a:extLst>
+          </p:cNvPr>
           <p:cNvSpPr>
             <a:spLocks noGrp="1"/>
           </p:cNvSpPr>
@@ -1007,17 +1131,23 @@
           <a:bodyPr/>
           <a:lstStyle/>
           <a:p>
-            <a:fld id="{F1FA7AC5-6045-4418-8E60-F48788734473}" type="datetimeFigureOut">
-              <a:rPr lang="en-US" smtClean="0"/>
-              <a:t>7/26/2012</a:t>
+            <a:fld id="{488607AE-241E-4541-9A94-40C722101DE2}" type="datetimeFigureOut">
+              <a:rPr lang="zh-CN" altLang="en-US" smtClean="0"/>
+              <a:t>2019/6/27</a:t>
             </a:fld>
-            <a:endParaRPr lang="en-US"/>
-          </a:p>
-        </p:txBody>
-      </p:sp>
-      <p:sp>
-        <p:nvSpPr>
-          <p:cNvPr id="5" name="Footer Placeholder 4"/>
+            <a:endParaRPr lang="zh-CN" altLang="en-US"/>
+          </a:p>
+        </p:txBody>
+      </p:sp>
+      <p:sp>
+        <p:nvSpPr>
+          <p:cNvPr id="5" name="页脚占位符 4">
+            <a:extLst>
+              <a:ext uri="{FF2B5EF4-FFF2-40B4-BE49-F238E27FC236}">
+                <a16:creationId xmlns:a16="http://schemas.microsoft.com/office/drawing/2014/main" id="{677DBE73-F4E8-44E0-85E6-8594492A7C29}"/>
+              </a:ext>
+            </a:extLst>
+          </p:cNvPr>
           <p:cNvSpPr>
             <a:spLocks noGrp="1"/>
           </p:cNvSpPr>
@@ -1030,13 +1160,19 @@
           <a:bodyPr/>
           <a:lstStyle/>
           <a:p>
-            <a:endParaRPr lang="en-US"/>
-          </a:p>
-        </p:txBody>
-      </p:sp>
-      <p:sp>
-        <p:nvSpPr>
-          <p:cNvPr id="6" name="Slide Number Placeholder 5"/>
+            <a:endParaRPr lang="zh-CN" altLang="en-US"/>
+          </a:p>
+        </p:txBody>
+      </p:sp>
+      <p:sp>
+        <p:nvSpPr>
+          <p:cNvPr id="6" name="灯片编号占位符 5">
+            <a:extLst>
+              <a:ext uri="{FF2B5EF4-FFF2-40B4-BE49-F238E27FC236}">
+                <a16:creationId xmlns:a16="http://schemas.microsoft.com/office/drawing/2014/main" id="{B9C2310E-0EAC-48B4-9B09-4F5DA4394FF8}"/>
+              </a:ext>
+            </a:extLst>
+          </p:cNvPr>
           <p:cNvSpPr>
             <a:spLocks noGrp="1"/>
           </p:cNvSpPr>
@@ -1049,18 +1185,18 @@
           <a:bodyPr/>
           <a:lstStyle/>
           <a:p>
-            <a:fld id="{8C71CAF9-4461-454A-B702-D536C3775752}" type="slidenum">
-              <a:rPr lang="en-US" smtClean="0"/>
+            <a:fld id="{7673EE0C-0863-498C-9054-DB8CCFC87F4C}" type="slidenum">
+              <a:rPr lang="zh-CN" altLang="en-US" smtClean="0"/>
               <a:t>‹#›</a:t>
             </a:fld>
-            <a:endParaRPr lang="en-US"/>
+            <a:endParaRPr lang="zh-CN" altLang="en-US"/>
           </a:p>
         </p:txBody>
       </p:sp>
     </p:spTree>
     <p:extLst>
       <p:ext uri="{BB962C8B-B14F-4D97-AF65-F5344CB8AC3E}">
-        <p14:creationId xmlns:p14="http://schemas.microsoft.com/office/powerpoint/2010/main" val="1875206763"/>
+        <p14:creationId xmlns:p14="http://schemas.microsoft.com/office/powerpoint/2010/main" val="2143164232"/>
       </p:ext>
     </p:extLst>
   </p:cSld>
@@ -1072,7 +1208,7 @@
 
 <file path=ppt/slideLayouts/slideLayout4.xml><?xml version="1.0" encoding="utf-8"?>
 <p:sldLayout xmlns:a="http://schemas.openxmlformats.org/drawingml/2006/main" xmlns:r="http://schemas.openxmlformats.org/officeDocument/2006/relationships" xmlns:p="http://schemas.openxmlformats.org/presentationml/2006/main" type="twoObj" preserve="1">
-  <p:cSld name="Two Content">
+  <p:cSld name="两栏内容">
     <p:spTree>
       <p:nvGrpSpPr>
         <p:cNvPr id="1" name=""/>
@@ -1089,7 +1225,13 @@
       </p:grpSpPr>
       <p:sp>
         <p:nvSpPr>
-          <p:cNvPr id="2" name="Title 1"/>
+          <p:cNvPr id="2" name="标题 1">
+            <a:extLst>
+              <a:ext uri="{FF2B5EF4-FFF2-40B4-BE49-F238E27FC236}">
+                <a16:creationId xmlns:a16="http://schemas.microsoft.com/office/drawing/2014/main" id="{33EB559B-B464-4960-97B2-A3D6DE11759E}"/>
+              </a:ext>
+            </a:extLst>
+          </p:cNvPr>
           <p:cNvSpPr>
             <a:spLocks noGrp="1"/>
           </p:cNvSpPr>
@@ -1103,16 +1245,21 @@
           <a:lstStyle/>
           <a:p>
             <a:r>
-              <a:rPr lang="en-US" smtClean="0"/>
-              <a:t>Click to edit Master title style</a:t>
-            </a:r>
-            <a:endParaRPr lang="en-US"/>
-          </a:p>
-        </p:txBody>
-      </p:sp>
-      <p:sp>
-        <p:nvSpPr>
-          <p:cNvPr id="3" name="Content Placeholder 2"/>
+              <a:rPr lang="zh-CN" altLang="en-US"/>
+              <a:t>单击此处编辑母版标题样式</a:t>
+            </a:r>
+          </a:p>
+        </p:txBody>
+      </p:sp>
+      <p:sp>
+        <p:nvSpPr>
+          <p:cNvPr id="3" name="内容占位符 2">
+            <a:extLst>
+              <a:ext uri="{FF2B5EF4-FFF2-40B4-BE49-F238E27FC236}">
+                <a16:creationId xmlns:a16="http://schemas.microsoft.com/office/drawing/2014/main" id="{84EB285A-1A1B-42BC-B6A3-3044E86753A4}"/>
+              </a:ext>
+            </a:extLst>
+          </p:cNvPr>
           <p:cNvSpPr>
             <a:spLocks noGrp="1"/>
           </p:cNvSpPr>
@@ -1132,44 +1279,49 @@
           <a:p>
             <a:pPr lvl="0"/>
             <a:r>
-              <a:rPr lang="en-US" smtClean="0"/>
-              <a:t>Click to edit Master text styles</a:t>
+              <a:rPr lang="zh-CN" altLang="en-US"/>
+              <a:t>单击此处编辑母版文本样式</a:t>
             </a:r>
           </a:p>
           <a:p>
             <a:pPr lvl="1"/>
             <a:r>
-              <a:rPr lang="en-US" smtClean="0"/>
-              <a:t>Second level</a:t>
+              <a:rPr lang="zh-CN" altLang="en-US"/>
+              <a:t>二级</a:t>
             </a:r>
           </a:p>
           <a:p>
             <a:pPr lvl="2"/>
             <a:r>
-              <a:rPr lang="en-US" smtClean="0"/>
-              <a:t>Third level</a:t>
+              <a:rPr lang="zh-CN" altLang="en-US"/>
+              <a:t>三级</a:t>
             </a:r>
           </a:p>
           <a:p>
             <a:pPr lvl="3"/>
             <a:r>
-              <a:rPr lang="en-US" smtClean="0"/>
-              <a:t>Fourth level</a:t>
+              <a:rPr lang="zh-CN" altLang="en-US"/>
+              <a:t>四级</a:t>
             </a:r>
           </a:p>
           <a:p>
             <a:pPr lvl="4"/>
             <a:r>
-              <a:rPr lang="en-US" smtClean="0"/>
-              <a:t>Fifth level</a:t>
-            </a:r>
-            <a:endParaRPr lang="en-US"/>
-          </a:p>
-        </p:txBody>
-      </p:sp>
-      <p:sp>
-        <p:nvSpPr>
-          <p:cNvPr id="4" name="Content Placeholder 3"/>
+              <a:rPr lang="zh-CN" altLang="en-US"/>
+              <a:t>五级</a:t>
+            </a:r>
+          </a:p>
+        </p:txBody>
+      </p:sp>
+      <p:sp>
+        <p:nvSpPr>
+          <p:cNvPr id="4" name="内容占位符 3">
+            <a:extLst>
+              <a:ext uri="{FF2B5EF4-FFF2-40B4-BE49-F238E27FC236}">
+                <a16:creationId xmlns:a16="http://schemas.microsoft.com/office/drawing/2014/main" id="{84DD7182-3EB6-42C3-8751-45D001CA0E69}"/>
+              </a:ext>
+            </a:extLst>
+          </p:cNvPr>
           <p:cNvSpPr>
             <a:spLocks noGrp="1"/>
           </p:cNvSpPr>
@@ -1189,44 +1341,49 @@
           <a:p>
             <a:pPr lvl="0"/>
             <a:r>
-              <a:rPr lang="en-US" smtClean="0"/>
-              <a:t>Click to edit Master text styles</a:t>
+              <a:rPr lang="zh-CN" altLang="en-US"/>
+              <a:t>单击此处编辑母版文本样式</a:t>
             </a:r>
           </a:p>
           <a:p>
             <a:pPr lvl="1"/>
             <a:r>
-              <a:rPr lang="en-US" smtClean="0"/>
-              <a:t>Second level</a:t>
+              <a:rPr lang="zh-CN" altLang="en-US"/>
+              <a:t>二级</a:t>
             </a:r>
           </a:p>
           <a:p>
             <a:pPr lvl="2"/>
             <a:r>
-              <a:rPr lang="en-US" smtClean="0"/>
-              <a:t>Third level</a:t>
+              <a:rPr lang="zh-CN" altLang="en-US"/>
+              <a:t>三级</a:t>
             </a:r>
           </a:p>
           <a:p>
             <a:pPr lvl="3"/>
             <a:r>
-              <a:rPr lang="en-US" smtClean="0"/>
-              <a:t>Fourth level</a:t>
+              <a:rPr lang="zh-CN" altLang="en-US"/>
+              <a:t>四级</a:t>
             </a:r>
           </a:p>
           <a:p>
             <a:pPr lvl="4"/>
             <a:r>
-              <a:rPr lang="en-US" smtClean="0"/>
-              <a:t>Fifth level</a:t>
-            </a:r>
-            <a:endParaRPr lang="en-US"/>
-          </a:p>
-        </p:txBody>
-      </p:sp>
-      <p:sp>
-        <p:nvSpPr>
-          <p:cNvPr id="5" name="Date Placeholder 4"/>
+              <a:rPr lang="zh-CN" altLang="en-US"/>
+              <a:t>五级</a:t>
+            </a:r>
+          </a:p>
+        </p:txBody>
+      </p:sp>
+      <p:sp>
+        <p:nvSpPr>
+          <p:cNvPr id="5" name="日期占位符 4">
+            <a:extLst>
+              <a:ext uri="{FF2B5EF4-FFF2-40B4-BE49-F238E27FC236}">
+                <a16:creationId xmlns:a16="http://schemas.microsoft.com/office/drawing/2014/main" id="{8C5E1537-4603-4812-8D28-CECDA6FEFCE9}"/>
+              </a:ext>
+            </a:extLst>
+          </p:cNvPr>
           <p:cNvSpPr>
             <a:spLocks noGrp="1"/>
           </p:cNvSpPr>
@@ -1239,17 +1396,23 @@
           <a:bodyPr/>
           <a:lstStyle/>
           <a:p>
-            <a:fld id="{F1FA7AC5-6045-4418-8E60-F48788734473}" type="datetimeFigureOut">
-              <a:rPr lang="en-US" smtClean="0"/>
-              <a:t>7/26/2012</a:t>
+            <a:fld id="{488607AE-241E-4541-9A94-40C722101DE2}" type="datetimeFigureOut">
+              <a:rPr lang="zh-CN" altLang="en-US" smtClean="0"/>
+              <a:t>2019/6/27</a:t>
             </a:fld>
-            <a:endParaRPr lang="en-US"/>
-          </a:p>
-        </p:txBody>
-      </p:sp>
-      <p:sp>
-        <p:nvSpPr>
-          <p:cNvPr id="6" name="Footer Placeholder 5"/>
+            <a:endParaRPr lang="zh-CN" altLang="en-US"/>
+          </a:p>
+        </p:txBody>
+      </p:sp>
+      <p:sp>
+        <p:nvSpPr>
+          <p:cNvPr id="6" name="页脚占位符 5">
+            <a:extLst>
+              <a:ext uri="{FF2B5EF4-FFF2-40B4-BE49-F238E27FC236}">
+                <a16:creationId xmlns:a16="http://schemas.microsoft.com/office/drawing/2014/main" id="{B32E3E13-B791-4266-8D7F-74E98A441083}"/>
+              </a:ext>
+            </a:extLst>
+          </p:cNvPr>
           <p:cNvSpPr>
             <a:spLocks noGrp="1"/>
           </p:cNvSpPr>
@@ -1262,13 +1425,19 @@
           <a:bodyPr/>
           <a:lstStyle/>
           <a:p>
-            <a:endParaRPr lang="en-US"/>
-          </a:p>
-        </p:txBody>
-      </p:sp>
-      <p:sp>
-        <p:nvSpPr>
-          <p:cNvPr id="7" name="Slide Number Placeholder 6"/>
+            <a:endParaRPr lang="zh-CN" altLang="en-US"/>
+          </a:p>
+        </p:txBody>
+      </p:sp>
+      <p:sp>
+        <p:nvSpPr>
+          <p:cNvPr id="7" name="灯片编号占位符 6">
+            <a:extLst>
+              <a:ext uri="{FF2B5EF4-FFF2-40B4-BE49-F238E27FC236}">
+                <a16:creationId xmlns:a16="http://schemas.microsoft.com/office/drawing/2014/main" id="{AB1AEA81-91A1-465B-8AAA-2FD5DCB56DB5}"/>
+              </a:ext>
+            </a:extLst>
+          </p:cNvPr>
           <p:cNvSpPr>
             <a:spLocks noGrp="1"/>
           </p:cNvSpPr>
@@ -1281,18 +1450,18 @@
           <a:bodyPr/>
           <a:lstStyle/>
           <a:p>
-            <a:fld id="{8C71CAF9-4461-454A-B702-D536C3775752}" type="slidenum">
-              <a:rPr lang="en-US" smtClean="0"/>
+            <a:fld id="{7673EE0C-0863-498C-9054-DB8CCFC87F4C}" type="slidenum">
+              <a:rPr lang="zh-CN" altLang="en-US" smtClean="0"/>
               <a:t>‹#›</a:t>
             </a:fld>
-            <a:endParaRPr lang="en-US"/>
+            <a:endParaRPr lang="zh-CN" altLang="en-US"/>
           </a:p>
         </p:txBody>
       </p:sp>
     </p:spTree>
     <p:extLst>
       <p:ext uri="{BB962C8B-B14F-4D97-AF65-F5344CB8AC3E}">
-        <p14:creationId xmlns:p14="http://schemas.microsoft.com/office/powerpoint/2010/main" val="3401293223"/>
+        <p14:creationId xmlns:p14="http://schemas.microsoft.com/office/powerpoint/2010/main" val="283675285"/>
       </p:ext>
     </p:extLst>
   </p:cSld>
@@ -1304,7 +1473,7 @@
 
 <file path=ppt/slideLayouts/slideLayout5.xml><?xml version="1.0" encoding="utf-8"?>
 <p:sldLayout xmlns:a="http://schemas.openxmlformats.org/drawingml/2006/main" xmlns:r="http://schemas.openxmlformats.org/officeDocument/2006/relationships" xmlns:p="http://schemas.openxmlformats.org/presentationml/2006/main" type="twoTxTwoObj" preserve="1">
-  <p:cSld name="Comparison">
+  <p:cSld name="比较">
     <p:spTree>
       <p:nvGrpSpPr>
         <p:cNvPr id="1" name=""/>
@@ -1321,7 +1490,13 @@
       </p:grpSpPr>
       <p:sp>
         <p:nvSpPr>
-          <p:cNvPr id="2" name="Title 1"/>
+          <p:cNvPr id="2" name="标题 1">
+            <a:extLst>
+              <a:ext uri="{FF2B5EF4-FFF2-40B4-BE49-F238E27FC236}">
+                <a16:creationId xmlns:a16="http://schemas.microsoft.com/office/drawing/2014/main" id="{5A16154C-DE6B-45C3-8B51-0019DCB42412}"/>
+              </a:ext>
+            </a:extLst>
+          </p:cNvPr>
           <p:cNvSpPr>
             <a:spLocks noGrp="1"/>
           </p:cNvSpPr>
@@ -1340,16 +1515,21 @@
           <a:lstStyle/>
           <a:p>
             <a:r>
-              <a:rPr lang="en-US" smtClean="0"/>
-              <a:t>Click to edit Master title style</a:t>
-            </a:r>
-            <a:endParaRPr lang="en-US"/>
-          </a:p>
-        </p:txBody>
-      </p:sp>
-      <p:sp>
-        <p:nvSpPr>
-          <p:cNvPr id="3" name="Text Placeholder 2"/>
+              <a:rPr lang="zh-CN" altLang="en-US"/>
+              <a:t>单击此处编辑母版标题样式</a:t>
+            </a:r>
+          </a:p>
+        </p:txBody>
+      </p:sp>
+      <p:sp>
+        <p:nvSpPr>
+          <p:cNvPr id="3" name="文本占位符 2">
+            <a:extLst>
+              <a:ext uri="{FF2B5EF4-FFF2-40B4-BE49-F238E27FC236}">
+                <a16:creationId xmlns:a16="http://schemas.microsoft.com/office/drawing/2014/main" id="{F553BC3D-C6B9-4198-8428-55E496410D74}"/>
+              </a:ext>
+            </a:extLst>
+          </p:cNvPr>
           <p:cNvSpPr>
             <a:spLocks noGrp="1"/>
           </p:cNvSpPr>
@@ -1406,15 +1586,21 @@
           <a:p>
             <a:pPr lvl="0"/>
             <a:r>
-              <a:rPr lang="en-US" smtClean="0"/>
-              <a:t>Click to edit Master text styles</a:t>
-            </a:r>
-          </a:p>
-        </p:txBody>
-      </p:sp>
-      <p:sp>
-        <p:nvSpPr>
-          <p:cNvPr id="4" name="Content Placeholder 3"/>
+              <a:rPr lang="zh-CN" altLang="en-US"/>
+              <a:t>单击此处编辑母版文本样式</a:t>
+            </a:r>
+          </a:p>
+        </p:txBody>
+      </p:sp>
+      <p:sp>
+        <p:nvSpPr>
+          <p:cNvPr id="4" name="内容占位符 3">
+            <a:extLst>
+              <a:ext uri="{FF2B5EF4-FFF2-40B4-BE49-F238E27FC236}">
+                <a16:creationId xmlns:a16="http://schemas.microsoft.com/office/drawing/2014/main" id="{D55D7306-B8AA-463D-ABF2-6B8A04E87C71}"/>
+              </a:ext>
+            </a:extLst>
+          </p:cNvPr>
           <p:cNvSpPr>
             <a:spLocks noGrp="1"/>
           </p:cNvSpPr>
@@ -1434,44 +1620,49 @@
           <a:p>
             <a:pPr lvl="0"/>
             <a:r>
-              <a:rPr lang="en-US" smtClean="0"/>
-              <a:t>Click to edit Master text styles</a:t>
+              <a:rPr lang="zh-CN" altLang="en-US"/>
+              <a:t>单击此处编辑母版文本样式</a:t>
             </a:r>
           </a:p>
           <a:p>
             <a:pPr lvl="1"/>
             <a:r>
-              <a:rPr lang="en-US" smtClean="0"/>
-              <a:t>Second level</a:t>
+              <a:rPr lang="zh-CN" altLang="en-US"/>
+              <a:t>二级</a:t>
             </a:r>
           </a:p>
           <a:p>
             <a:pPr lvl="2"/>
             <a:r>
-              <a:rPr lang="en-US" smtClean="0"/>
-              <a:t>Third level</a:t>
+              <a:rPr lang="zh-CN" altLang="en-US"/>
+              <a:t>三级</a:t>
             </a:r>
           </a:p>
           <a:p>
             <a:pPr lvl="3"/>
             <a:r>
-              <a:rPr lang="en-US" smtClean="0"/>
-              <a:t>Fourth level</a:t>
+              <a:rPr lang="zh-CN" altLang="en-US"/>
+              <a:t>四级</a:t>
             </a:r>
           </a:p>
           <a:p>
             <a:pPr lvl="4"/>
             <a:r>
-              <a:rPr lang="en-US" smtClean="0"/>
-              <a:t>Fifth level</a:t>
-            </a:r>
-            <a:endParaRPr lang="en-US"/>
-          </a:p>
-        </p:txBody>
-      </p:sp>
-      <p:sp>
-        <p:nvSpPr>
-          <p:cNvPr id="5" name="Text Placeholder 4"/>
+              <a:rPr lang="zh-CN" altLang="en-US"/>
+              <a:t>五级</a:t>
+            </a:r>
+          </a:p>
+        </p:txBody>
+      </p:sp>
+      <p:sp>
+        <p:nvSpPr>
+          <p:cNvPr id="5" name="文本占位符 4">
+            <a:extLst>
+              <a:ext uri="{FF2B5EF4-FFF2-40B4-BE49-F238E27FC236}">
+                <a16:creationId xmlns:a16="http://schemas.microsoft.com/office/drawing/2014/main" id="{429A6106-10D3-449C-B11C-1B3DE367EDAD}"/>
+              </a:ext>
+            </a:extLst>
+          </p:cNvPr>
           <p:cNvSpPr>
             <a:spLocks noGrp="1"/>
           </p:cNvSpPr>
@@ -1528,15 +1719,21 @@
           <a:p>
             <a:pPr lvl="0"/>
             <a:r>
-              <a:rPr lang="en-US" smtClean="0"/>
-              <a:t>Click to edit Master text styles</a:t>
-            </a:r>
-          </a:p>
-        </p:txBody>
-      </p:sp>
-      <p:sp>
-        <p:nvSpPr>
-          <p:cNvPr id="6" name="Content Placeholder 5"/>
+              <a:rPr lang="zh-CN" altLang="en-US"/>
+              <a:t>单击此处编辑母版文本样式</a:t>
+            </a:r>
+          </a:p>
+        </p:txBody>
+      </p:sp>
+      <p:sp>
+        <p:nvSpPr>
+          <p:cNvPr id="6" name="内容占位符 5">
+            <a:extLst>
+              <a:ext uri="{FF2B5EF4-FFF2-40B4-BE49-F238E27FC236}">
+                <a16:creationId xmlns:a16="http://schemas.microsoft.com/office/drawing/2014/main" id="{8EE846C3-E1A7-41F7-A16B-A748FA8AF438}"/>
+              </a:ext>
+            </a:extLst>
+          </p:cNvPr>
           <p:cNvSpPr>
             <a:spLocks noGrp="1"/>
           </p:cNvSpPr>
@@ -1556,44 +1753,49 @@
           <a:p>
             <a:pPr lvl="0"/>
             <a:r>
-              <a:rPr lang="en-US" smtClean="0"/>
-              <a:t>Click to edit Master text styles</a:t>
+              <a:rPr lang="zh-CN" altLang="en-US"/>
+              <a:t>单击此处编辑母版文本样式</a:t>
             </a:r>
           </a:p>
           <a:p>
             <a:pPr lvl="1"/>
             <a:r>
-              <a:rPr lang="en-US" smtClean="0"/>
-              <a:t>Second level</a:t>
+              <a:rPr lang="zh-CN" altLang="en-US"/>
+              <a:t>二级</a:t>
             </a:r>
           </a:p>
           <a:p>
             <a:pPr lvl="2"/>
             <a:r>
-              <a:rPr lang="en-US" smtClean="0"/>
-              <a:t>Third level</a:t>
+              <a:rPr lang="zh-CN" altLang="en-US"/>
+              <a:t>三级</a:t>
             </a:r>
           </a:p>
           <a:p>
             <a:pPr lvl="3"/>
             <a:r>
-              <a:rPr lang="en-US" smtClean="0"/>
-              <a:t>Fourth level</a:t>
+              <a:rPr lang="zh-CN" altLang="en-US"/>
+              <a:t>四级</a:t>
             </a:r>
           </a:p>
           <a:p>
             <a:pPr lvl="4"/>
             <a:r>
-              <a:rPr lang="en-US" smtClean="0"/>
-              <a:t>Fifth level</a:t>
-            </a:r>
-            <a:endParaRPr lang="en-US"/>
-          </a:p>
-        </p:txBody>
-      </p:sp>
-      <p:sp>
-        <p:nvSpPr>
-          <p:cNvPr id="7" name="Date Placeholder 6"/>
+              <a:rPr lang="zh-CN" altLang="en-US"/>
+              <a:t>五级</a:t>
+            </a:r>
+          </a:p>
+        </p:txBody>
+      </p:sp>
+      <p:sp>
+        <p:nvSpPr>
+          <p:cNvPr id="7" name="日期占位符 6">
+            <a:extLst>
+              <a:ext uri="{FF2B5EF4-FFF2-40B4-BE49-F238E27FC236}">
+                <a16:creationId xmlns:a16="http://schemas.microsoft.com/office/drawing/2014/main" id="{47B93BB4-43B7-4994-B393-E96C41D52BF1}"/>
+              </a:ext>
+            </a:extLst>
+          </p:cNvPr>
           <p:cNvSpPr>
             <a:spLocks noGrp="1"/>
           </p:cNvSpPr>
@@ -1606,17 +1808,23 @@
           <a:bodyPr/>
           <a:lstStyle/>
           <a:p>
-            <a:fld id="{F1FA7AC5-6045-4418-8E60-F48788734473}" type="datetimeFigureOut">
-              <a:rPr lang="en-US" smtClean="0"/>
-              <a:t>7/26/2012</a:t>
+            <a:fld id="{488607AE-241E-4541-9A94-40C722101DE2}" type="datetimeFigureOut">
+              <a:rPr lang="zh-CN" altLang="en-US" smtClean="0"/>
+              <a:t>2019/6/27</a:t>
             </a:fld>
-            <a:endParaRPr lang="en-US"/>
-          </a:p>
-        </p:txBody>
-      </p:sp>
-      <p:sp>
-        <p:nvSpPr>
-          <p:cNvPr id="8" name="Footer Placeholder 7"/>
+            <a:endParaRPr lang="zh-CN" altLang="en-US"/>
+          </a:p>
+        </p:txBody>
+      </p:sp>
+      <p:sp>
+        <p:nvSpPr>
+          <p:cNvPr id="8" name="页脚占位符 7">
+            <a:extLst>
+              <a:ext uri="{FF2B5EF4-FFF2-40B4-BE49-F238E27FC236}">
+                <a16:creationId xmlns:a16="http://schemas.microsoft.com/office/drawing/2014/main" id="{6712D3D2-2017-4C85-AAB3-53E39B4ACE6C}"/>
+              </a:ext>
+            </a:extLst>
+          </p:cNvPr>
           <p:cNvSpPr>
             <a:spLocks noGrp="1"/>
           </p:cNvSpPr>
@@ -1629,13 +1837,19 @@
           <a:bodyPr/>
           <a:lstStyle/>
           <a:p>
-            <a:endParaRPr lang="en-US"/>
-          </a:p>
-        </p:txBody>
-      </p:sp>
-      <p:sp>
-        <p:nvSpPr>
-          <p:cNvPr id="9" name="Slide Number Placeholder 8"/>
+            <a:endParaRPr lang="zh-CN" altLang="en-US"/>
+          </a:p>
+        </p:txBody>
+      </p:sp>
+      <p:sp>
+        <p:nvSpPr>
+          <p:cNvPr id="9" name="灯片编号占位符 8">
+            <a:extLst>
+              <a:ext uri="{FF2B5EF4-FFF2-40B4-BE49-F238E27FC236}">
+                <a16:creationId xmlns:a16="http://schemas.microsoft.com/office/drawing/2014/main" id="{DB8B9B62-4692-4D0F-AED0-598E7B179323}"/>
+              </a:ext>
+            </a:extLst>
+          </p:cNvPr>
           <p:cNvSpPr>
             <a:spLocks noGrp="1"/>
           </p:cNvSpPr>
@@ -1648,18 +1862,18 @@
           <a:bodyPr/>
           <a:lstStyle/>
           <a:p>
-            <a:fld id="{8C71CAF9-4461-454A-B702-D536C3775752}" type="slidenum">
-              <a:rPr lang="en-US" smtClean="0"/>
+            <a:fld id="{7673EE0C-0863-498C-9054-DB8CCFC87F4C}" type="slidenum">
+              <a:rPr lang="zh-CN" altLang="en-US" smtClean="0"/>
               <a:t>‹#›</a:t>
             </a:fld>
-            <a:endParaRPr lang="en-US"/>
+            <a:endParaRPr lang="zh-CN" altLang="en-US"/>
           </a:p>
         </p:txBody>
       </p:sp>
     </p:spTree>
     <p:extLst>
       <p:ext uri="{BB962C8B-B14F-4D97-AF65-F5344CB8AC3E}">
-        <p14:creationId xmlns:p14="http://schemas.microsoft.com/office/powerpoint/2010/main" val="3056490410"/>
+        <p14:creationId xmlns:p14="http://schemas.microsoft.com/office/powerpoint/2010/main" val="622414609"/>
       </p:ext>
     </p:extLst>
   </p:cSld>
@@ -1671,7 +1885,7 @@
 
 <file path=ppt/slideLayouts/slideLayout6.xml><?xml version="1.0" encoding="utf-8"?>
 <p:sldLayout xmlns:a="http://schemas.openxmlformats.org/drawingml/2006/main" xmlns:r="http://schemas.openxmlformats.org/officeDocument/2006/relationships" xmlns:p="http://schemas.openxmlformats.org/presentationml/2006/main" type="titleOnly" preserve="1">
-  <p:cSld name="Title Only">
+  <p:cSld name="仅标题">
     <p:spTree>
       <p:nvGrpSpPr>
         <p:cNvPr id="1" name=""/>
@@ -1688,7 +1902,13 @@
       </p:grpSpPr>
       <p:sp>
         <p:nvSpPr>
-          <p:cNvPr id="2" name="Title 1"/>
+          <p:cNvPr id="2" name="标题 1">
+            <a:extLst>
+              <a:ext uri="{FF2B5EF4-FFF2-40B4-BE49-F238E27FC236}">
+                <a16:creationId xmlns:a16="http://schemas.microsoft.com/office/drawing/2014/main" id="{79B3E16C-98CB-4547-A8E8-2B30BB6A149C}"/>
+              </a:ext>
+            </a:extLst>
+          </p:cNvPr>
           <p:cNvSpPr>
             <a:spLocks noGrp="1"/>
           </p:cNvSpPr>
@@ -1702,16 +1922,21 @@
           <a:lstStyle/>
           <a:p>
             <a:r>
-              <a:rPr lang="en-US" smtClean="0"/>
-              <a:t>Click to edit Master title style</a:t>
-            </a:r>
-            <a:endParaRPr lang="en-US"/>
-          </a:p>
-        </p:txBody>
-      </p:sp>
-      <p:sp>
-        <p:nvSpPr>
-          <p:cNvPr id="3" name="Date Placeholder 2"/>
+              <a:rPr lang="zh-CN" altLang="en-US"/>
+              <a:t>单击此处编辑母版标题样式</a:t>
+            </a:r>
+          </a:p>
+        </p:txBody>
+      </p:sp>
+      <p:sp>
+        <p:nvSpPr>
+          <p:cNvPr id="3" name="日期占位符 2">
+            <a:extLst>
+              <a:ext uri="{FF2B5EF4-FFF2-40B4-BE49-F238E27FC236}">
+                <a16:creationId xmlns:a16="http://schemas.microsoft.com/office/drawing/2014/main" id="{D075FEB9-43B7-47BA-A36E-0BAC21F24696}"/>
+              </a:ext>
+            </a:extLst>
+          </p:cNvPr>
           <p:cNvSpPr>
             <a:spLocks noGrp="1"/>
           </p:cNvSpPr>
@@ -1724,17 +1949,23 @@
           <a:bodyPr/>
           <a:lstStyle/>
           <a:p>
-            <a:fld id="{F1FA7AC5-6045-4418-8E60-F48788734473}" type="datetimeFigureOut">
-              <a:rPr lang="en-US" smtClean="0"/>
-              <a:t>7/26/2012</a:t>
+            <a:fld id="{488607AE-241E-4541-9A94-40C722101DE2}" type="datetimeFigureOut">
+              <a:rPr lang="zh-CN" altLang="en-US" smtClean="0"/>
+              <a:t>2019/6/27</a:t>
             </a:fld>
-            <a:endParaRPr lang="en-US"/>
-          </a:p>
-        </p:txBody>
-      </p:sp>
-      <p:sp>
-        <p:nvSpPr>
-          <p:cNvPr id="4" name="Footer Placeholder 3"/>
+            <a:endParaRPr lang="zh-CN" altLang="en-US"/>
+          </a:p>
+        </p:txBody>
+      </p:sp>
+      <p:sp>
+        <p:nvSpPr>
+          <p:cNvPr id="4" name="页脚占位符 3">
+            <a:extLst>
+              <a:ext uri="{FF2B5EF4-FFF2-40B4-BE49-F238E27FC236}">
+                <a16:creationId xmlns:a16="http://schemas.microsoft.com/office/drawing/2014/main" id="{46E47B75-9BA0-415E-842A-1DF7A6CABF20}"/>
+              </a:ext>
+            </a:extLst>
+          </p:cNvPr>
           <p:cNvSpPr>
             <a:spLocks noGrp="1"/>
           </p:cNvSpPr>
@@ -1747,13 +1978,19 @@
           <a:bodyPr/>
           <a:lstStyle/>
           <a:p>
-            <a:endParaRPr lang="en-US"/>
-          </a:p>
-        </p:txBody>
-      </p:sp>
-      <p:sp>
-        <p:nvSpPr>
-          <p:cNvPr id="5" name="Slide Number Placeholder 4"/>
+            <a:endParaRPr lang="zh-CN" altLang="en-US"/>
+          </a:p>
+        </p:txBody>
+      </p:sp>
+      <p:sp>
+        <p:nvSpPr>
+          <p:cNvPr id="5" name="灯片编号占位符 4">
+            <a:extLst>
+              <a:ext uri="{FF2B5EF4-FFF2-40B4-BE49-F238E27FC236}">
+                <a16:creationId xmlns:a16="http://schemas.microsoft.com/office/drawing/2014/main" id="{D97145D7-24FD-4EF7-A86B-1AE8A4CD7CA2}"/>
+              </a:ext>
+            </a:extLst>
+          </p:cNvPr>
           <p:cNvSpPr>
             <a:spLocks noGrp="1"/>
           </p:cNvSpPr>
@@ -1766,18 +2003,18 @@
           <a:bodyPr/>
           <a:lstStyle/>
           <a:p>
-            <a:fld id="{8C71CAF9-4461-454A-B702-D536C3775752}" type="slidenum">
-              <a:rPr lang="en-US" smtClean="0"/>
+            <a:fld id="{7673EE0C-0863-498C-9054-DB8CCFC87F4C}" type="slidenum">
+              <a:rPr lang="zh-CN" altLang="en-US" smtClean="0"/>
               <a:t>‹#›</a:t>
             </a:fld>
-            <a:endParaRPr lang="en-US"/>
+            <a:endParaRPr lang="zh-CN" altLang="en-US"/>
           </a:p>
         </p:txBody>
       </p:sp>
     </p:spTree>
     <p:extLst>
       <p:ext uri="{BB962C8B-B14F-4D97-AF65-F5344CB8AC3E}">
-        <p14:creationId xmlns:p14="http://schemas.microsoft.com/office/powerpoint/2010/main" val="3573976379"/>
+        <p14:creationId xmlns:p14="http://schemas.microsoft.com/office/powerpoint/2010/main" val="2491300841"/>
       </p:ext>
     </p:extLst>
   </p:cSld>
@@ -1789,7 +2026,7 @@
 
 <file path=ppt/slideLayouts/slideLayout7.xml><?xml version="1.0" encoding="utf-8"?>
 <p:sldLayout xmlns:a="http://schemas.openxmlformats.org/drawingml/2006/main" xmlns:r="http://schemas.openxmlformats.org/officeDocument/2006/relationships" xmlns:p="http://schemas.openxmlformats.org/presentationml/2006/main" type="blank" preserve="1">
-  <p:cSld name="Blank">
+  <p:cSld name="空白">
     <p:spTree>
       <p:nvGrpSpPr>
         <p:cNvPr id="1" name=""/>
@@ -1806,7 +2043,13 @@
       </p:grpSpPr>
       <p:sp>
         <p:nvSpPr>
-          <p:cNvPr id="2" name="Date Placeholder 1"/>
+          <p:cNvPr id="2" name="日期占位符 1">
+            <a:extLst>
+              <a:ext uri="{FF2B5EF4-FFF2-40B4-BE49-F238E27FC236}">
+                <a16:creationId xmlns:a16="http://schemas.microsoft.com/office/drawing/2014/main" id="{A5B4FC42-EA87-43A9-A5B3-E0EA7EB6E42F}"/>
+              </a:ext>
+            </a:extLst>
+          </p:cNvPr>
           <p:cNvSpPr>
             <a:spLocks noGrp="1"/>
           </p:cNvSpPr>
@@ -1819,17 +2062,23 @@
           <a:bodyPr/>
           <a:lstStyle/>
           <a:p>
-            <a:fld id="{F1FA7AC5-6045-4418-8E60-F48788734473}" type="datetimeFigureOut">
-              <a:rPr lang="en-US" smtClean="0"/>
-              <a:t>7/26/2012</a:t>
+            <a:fld id="{488607AE-241E-4541-9A94-40C722101DE2}" type="datetimeFigureOut">
+              <a:rPr lang="zh-CN" altLang="en-US" smtClean="0"/>
+              <a:t>2019/6/27</a:t>
             </a:fld>
-            <a:endParaRPr lang="en-US"/>
-          </a:p>
-        </p:txBody>
-      </p:sp>
-      <p:sp>
-        <p:nvSpPr>
-          <p:cNvPr id="3" name="Footer Placeholder 2"/>
+            <a:endParaRPr lang="zh-CN" altLang="en-US"/>
+          </a:p>
+        </p:txBody>
+      </p:sp>
+      <p:sp>
+        <p:nvSpPr>
+          <p:cNvPr id="3" name="页脚占位符 2">
+            <a:extLst>
+              <a:ext uri="{FF2B5EF4-FFF2-40B4-BE49-F238E27FC236}">
+                <a16:creationId xmlns:a16="http://schemas.microsoft.com/office/drawing/2014/main" id="{9C8F498C-73BF-431F-BF78-2FBD1B41F0BC}"/>
+              </a:ext>
+            </a:extLst>
+          </p:cNvPr>
           <p:cNvSpPr>
             <a:spLocks noGrp="1"/>
           </p:cNvSpPr>
@@ -1842,13 +2091,19 @@
           <a:bodyPr/>
           <a:lstStyle/>
           <a:p>
-            <a:endParaRPr lang="en-US"/>
-          </a:p>
-        </p:txBody>
-      </p:sp>
-      <p:sp>
-        <p:nvSpPr>
-          <p:cNvPr id="4" name="Slide Number Placeholder 3"/>
+            <a:endParaRPr lang="zh-CN" altLang="en-US"/>
+          </a:p>
+        </p:txBody>
+      </p:sp>
+      <p:sp>
+        <p:nvSpPr>
+          <p:cNvPr id="4" name="灯片编号占位符 3">
+            <a:extLst>
+              <a:ext uri="{FF2B5EF4-FFF2-40B4-BE49-F238E27FC236}">
+                <a16:creationId xmlns:a16="http://schemas.microsoft.com/office/drawing/2014/main" id="{7682BD3E-BD51-40CC-9C45-E9D9D819AA31}"/>
+              </a:ext>
+            </a:extLst>
+          </p:cNvPr>
           <p:cNvSpPr>
             <a:spLocks noGrp="1"/>
           </p:cNvSpPr>
@@ -1861,18 +2116,18 @@
           <a:bodyPr/>
           <a:lstStyle/>
           <a:p>
-            <a:fld id="{8C71CAF9-4461-454A-B702-D536C3775752}" type="slidenum">
-              <a:rPr lang="en-US" smtClean="0"/>
+            <a:fld id="{7673EE0C-0863-498C-9054-DB8CCFC87F4C}" type="slidenum">
+              <a:rPr lang="zh-CN" altLang="en-US" smtClean="0"/>
               <a:t>‹#›</a:t>
             </a:fld>
-            <a:endParaRPr lang="en-US"/>
+            <a:endParaRPr lang="zh-CN" altLang="en-US"/>
           </a:p>
         </p:txBody>
       </p:sp>
     </p:spTree>
     <p:extLst>
       <p:ext uri="{BB962C8B-B14F-4D97-AF65-F5344CB8AC3E}">
-        <p14:creationId xmlns:p14="http://schemas.microsoft.com/office/powerpoint/2010/main" val="3201795056"/>
+        <p14:creationId xmlns:p14="http://schemas.microsoft.com/office/powerpoint/2010/main" val="3867863073"/>
       </p:ext>
     </p:extLst>
   </p:cSld>
@@ -1884,7 +2139,7 @@
 
 <file path=ppt/slideLayouts/slideLayout8.xml><?xml version="1.0" encoding="utf-8"?>
 <p:sldLayout xmlns:a="http://schemas.openxmlformats.org/drawingml/2006/main" xmlns:r="http://schemas.openxmlformats.org/officeDocument/2006/relationships" xmlns:p="http://schemas.openxmlformats.org/presentationml/2006/main" type="objTx" preserve="1">
-  <p:cSld name="Content with Caption">
+  <p:cSld name="内容与标题">
     <p:spTree>
       <p:nvGrpSpPr>
         <p:cNvPr id="1" name=""/>
@@ -1901,7 +2156,13 @@
       </p:grpSpPr>
       <p:sp>
         <p:nvSpPr>
-          <p:cNvPr id="2" name="Title 1"/>
+          <p:cNvPr id="2" name="标题 1">
+            <a:extLst>
+              <a:ext uri="{FF2B5EF4-FFF2-40B4-BE49-F238E27FC236}">
+                <a16:creationId xmlns:a16="http://schemas.microsoft.com/office/drawing/2014/main" id="{600F5306-FD7F-4A7D-AB28-8F7E352DD415}"/>
+              </a:ext>
+            </a:extLst>
+          </p:cNvPr>
           <p:cNvSpPr>
             <a:spLocks noGrp="1"/>
           </p:cNvSpPr>
@@ -1924,16 +2185,21 @@
           </a:lstStyle>
           <a:p>
             <a:r>
-              <a:rPr lang="en-US" smtClean="0"/>
-              <a:t>Click to edit Master title style</a:t>
-            </a:r>
-            <a:endParaRPr lang="en-US"/>
-          </a:p>
-        </p:txBody>
-      </p:sp>
-      <p:sp>
-        <p:nvSpPr>
-          <p:cNvPr id="3" name="Content Placeholder 2"/>
+              <a:rPr lang="zh-CN" altLang="en-US"/>
+              <a:t>单击此处编辑母版标题样式</a:t>
+            </a:r>
+          </a:p>
+        </p:txBody>
+      </p:sp>
+      <p:sp>
+        <p:nvSpPr>
+          <p:cNvPr id="3" name="内容占位符 2">
+            <a:extLst>
+              <a:ext uri="{FF2B5EF4-FFF2-40B4-BE49-F238E27FC236}">
+                <a16:creationId xmlns:a16="http://schemas.microsoft.com/office/drawing/2014/main" id="{99811D2F-F46F-4B13-A18D-43D793816504}"/>
+              </a:ext>
+            </a:extLst>
+          </p:cNvPr>
           <p:cNvSpPr>
             <a:spLocks noGrp="1"/>
           </p:cNvSpPr>
@@ -1981,44 +2247,49 @@
           <a:p>
             <a:pPr lvl="0"/>
             <a:r>
-              <a:rPr lang="en-US" smtClean="0"/>
-              <a:t>Click to edit Master text styles</a:t>
+              <a:rPr lang="zh-CN" altLang="en-US"/>
+              <a:t>单击此处编辑母版文本样式</a:t>
             </a:r>
           </a:p>
           <a:p>
             <a:pPr lvl="1"/>
             <a:r>
-              <a:rPr lang="en-US" smtClean="0"/>
-              <a:t>Second level</a:t>
+              <a:rPr lang="zh-CN" altLang="en-US"/>
+              <a:t>二级</a:t>
             </a:r>
           </a:p>
           <a:p>
             <a:pPr lvl="2"/>
             <a:r>
-              <a:rPr lang="en-US" smtClean="0"/>
-              <a:t>Third level</a:t>
+              <a:rPr lang="zh-CN" altLang="en-US"/>
+              <a:t>三级</a:t>
             </a:r>
           </a:p>
           <a:p>
             <a:pPr lvl="3"/>
             <a:r>
-              <a:rPr lang="en-US" smtClean="0"/>
-              <a:t>Fourth level</a:t>
+              <a:rPr lang="zh-CN" altLang="en-US"/>
+              <a:t>四级</a:t>
             </a:r>
           </a:p>
           <a:p>
             <a:pPr lvl="4"/>
             <a:r>
-              <a:rPr lang="en-US" smtClean="0"/>
-              <a:t>Fifth level</a:t>
-            </a:r>
-            <a:endParaRPr lang="en-US"/>
-          </a:p>
-        </p:txBody>
-      </p:sp>
-      <p:sp>
-        <p:nvSpPr>
-          <p:cNvPr id="4" name="Text Placeholder 3"/>
+              <a:rPr lang="zh-CN" altLang="en-US"/>
+              <a:t>五级</a:t>
+            </a:r>
+          </a:p>
+        </p:txBody>
+      </p:sp>
+      <p:sp>
+        <p:nvSpPr>
+          <p:cNvPr id="4" name="文本占位符 3">
+            <a:extLst>
+              <a:ext uri="{FF2B5EF4-FFF2-40B4-BE49-F238E27FC236}">
+                <a16:creationId xmlns:a16="http://schemas.microsoft.com/office/drawing/2014/main" id="{5AB78C7E-00C5-44CE-B2D5-5E4E75FF8227}"/>
+              </a:ext>
+            </a:extLst>
+          </p:cNvPr>
           <p:cNvSpPr>
             <a:spLocks noGrp="1"/>
           </p:cNvSpPr>
@@ -2075,15 +2346,21 @@
           <a:p>
             <a:pPr lvl="0"/>
             <a:r>
-              <a:rPr lang="en-US" smtClean="0"/>
-              <a:t>Click to edit Master text styles</a:t>
-            </a:r>
-          </a:p>
-        </p:txBody>
-      </p:sp>
-      <p:sp>
-        <p:nvSpPr>
-          <p:cNvPr id="5" name="Date Placeholder 4"/>
+              <a:rPr lang="zh-CN" altLang="en-US"/>
+              <a:t>单击此处编辑母版文本样式</a:t>
+            </a:r>
+          </a:p>
+        </p:txBody>
+      </p:sp>
+      <p:sp>
+        <p:nvSpPr>
+          <p:cNvPr id="5" name="日期占位符 4">
+            <a:extLst>
+              <a:ext uri="{FF2B5EF4-FFF2-40B4-BE49-F238E27FC236}">
+                <a16:creationId xmlns:a16="http://schemas.microsoft.com/office/drawing/2014/main" id="{E6666960-CB33-41BE-80BC-22061B991134}"/>
+              </a:ext>
+            </a:extLst>
+          </p:cNvPr>
           <p:cNvSpPr>
             <a:spLocks noGrp="1"/>
           </p:cNvSpPr>
@@ -2096,17 +2373,23 @@
           <a:bodyPr/>
           <a:lstStyle/>
           <a:p>
-            <a:fld id="{F1FA7AC5-6045-4418-8E60-F48788734473}" type="datetimeFigureOut">
-              <a:rPr lang="en-US" smtClean="0"/>
-              <a:t>7/26/2012</a:t>
+            <a:fld id="{488607AE-241E-4541-9A94-40C722101DE2}" type="datetimeFigureOut">
+              <a:rPr lang="zh-CN" altLang="en-US" smtClean="0"/>
+              <a:t>2019/6/27</a:t>
             </a:fld>
-            <a:endParaRPr lang="en-US"/>
-          </a:p>
-        </p:txBody>
-      </p:sp>
-      <p:sp>
-        <p:nvSpPr>
-          <p:cNvPr id="6" name="Footer Placeholder 5"/>
+            <a:endParaRPr lang="zh-CN" altLang="en-US"/>
+          </a:p>
+        </p:txBody>
+      </p:sp>
+      <p:sp>
+        <p:nvSpPr>
+          <p:cNvPr id="6" name="页脚占位符 5">
+            <a:extLst>
+              <a:ext uri="{FF2B5EF4-FFF2-40B4-BE49-F238E27FC236}">
+                <a16:creationId xmlns:a16="http://schemas.microsoft.com/office/drawing/2014/main" id="{D2364734-4F34-494B-89C6-C673D4800F7A}"/>
+              </a:ext>
+            </a:extLst>
+          </p:cNvPr>
           <p:cNvSpPr>
             <a:spLocks noGrp="1"/>
           </p:cNvSpPr>
@@ -2119,13 +2402,19 @@
           <a:bodyPr/>
           <a:lstStyle/>
           <a:p>
-            <a:endParaRPr lang="en-US"/>
-          </a:p>
-        </p:txBody>
-      </p:sp>
-      <p:sp>
-        <p:nvSpPr>
-          <p:cNvPr id="7" name="Slide Number Placeholder 6"/>
+            <a:endParaRPr lang="zh-CN" altLang="en-US"/>
+          </a:p>
+        </p:txBody>
+      </p:sp>
+      <p:sp>
+        <p:nvSpPr>
+          <p:cNvPr id="7" name="灯片编号占位符 6">
+            <a:extLst>
+              <a:ext uri="{FF2B5EF4-FFF2-40B4-BE49-F238E27FC236}">
+                <a16:creationId xmlns:a16="http://schemas.microsoft.com/office/drawing/2014/main" id="{DF2FB5E5-156C-42F3-9C47-B96E50EDC8E2}"/>
+              </a:ext>
+            </a:extLst>
+          </p:cNvPr>
           <p:cNvSpPr>
             <a:spLocks noGrp="1"/>
           </p:cNvSpPr>
@@ -2138,18 +2427,18 @@
           <a:bodyPr/>
           <a:lstStyle/>
           <a:p>
-            <a:fld id="{8C71CAF9-4461-454A-B702-D536C3775752}" type="slidenum">
-              <a:rPr lang="en-US" smtClean="0"/>
+            <a:fld id="{7673EE0C-0863-498C-9054-DB8CCFC87F4C}" type="slidenum">
+              <a:rPr lang="zh-CN" altLang="en-US" smtClean="0"/>
               <a:t>‹#›</a:t>
             </a:fld>
-            <a:endParaRPr lang="en-US"/>
+            <a:endParaRPr lang="zh-CN" altLang="en-US"/>
           </a:p>
         </p:txBody>
       </p:sp>
     </p:spTree>
     <p:extLst>
       <p:ext uri="{BB962C8B-B14F-4D97-AF65-F5344CB8AC3E}">
-        <p14:creationId xmlns:p14="http://schemas.microsoft.com/office/powerpoint/2010/main" val="2526201297"/>
+        <p14:creationId xmlns:p14="http://schemas.microsoft.com/office/powerpoint/2010/main" val="1385819109"/>
       </p:ext>
     </p:extLst>
   </p:cSld>
@@ -2161,7 +2450,7 @@
 
 <file path=ppt/slideLayouts/slideLayout9.xml><?xml version="1.0" encoding="utf-8"?>
 <p:sldLayout xmlns:a="http://schemas.openxmlformats.org/drawingml/2006/main" xmlns:r="http://schemas.openxmlformats.org/officeDocument/2006/relationships" xmlns:p="http://schemas.openxmlformats.org/presentationml/2006/main" type="picTx" preserve="1">
-  <p:cSld name="Picture with Caption">
+  <p:cSld name="图片与标题">
     <p:spTree>
       <p:nvGrpSpPr>
         <p:cNvPr id="1" name=""/>
@@ -2178,7 +2467,13 @@
       </p:grpSpPr>
       <p:sp>
         <p:nvSpPr>
-          <p:cNvPr id="2" name="Title 1"/>
+          <p:cNvPr id="2" name="标题 1">
+            <a:extLst>
+              <a:ext uri="{FF2B5EF4-FFF2-40B4-BE49-F238E27FC236}">
+                <a16:creationId xmlns:a16="http://schemas.microsoft.com/office/drawing/2014/main" id="{DD88D7A8-C7C4-424F-BF11-FA156677EAF4}"/>
+              </a:ext>
+            </a:extLst>
+          </p:cNvPr>
           <p:cNvSpPr>
             <a:spLocks noGrp="1"/>
           </p:cNvSpPr>
@@ -2201,16 +2496,21 @@
           </a:lstStyle>
           <a:p>
             <a:r>
-              <a:rPr lang="en-US" smtClean="0"/>
-              <a:t>Click to edit Master title style</a:t>
-            </a:r>
-            <a:endParaRPr lang="en-US"/>
-          </a:p>
-        </p:txBody>
-      </p:sp>
-      <p:sp>
-        <p:nvSpPr>
-          <p:cNvPr id="3" name="Picture Placeholder 2"/>
+              <a:rPr lang="zh-CN" altLang="en-US"/>
+              <a:t>单击此处编辑母版标题样式</a:t>
+            </a:r>
+          </a:p>
+        </p:txBody>
+      </p:sp>
+      <p:sp>
+        <p:nvSpPr>
+          <p:cNvPr id="3" name="图片占位符 2">
+            <a:extLst>
+              <a:ext uri="{FF2B5EF4-FFF2-40B4-BE49-F238E27FC236}">
+                <a16:creationId xmlns:a16="http://schemas.microsoft.com/office/drawing/2014/main" id="{4E31ECBB-F15A-4D8A-864F-8A342BD35868}"/>
+              </a:ext>
+            </a:extLst>
+          </p:cNvPr>
           <p:cNvSpPr>
             <a:spLocks noGrp="1"/>
           </p:cNvSpPr>
@@ -2265,13 +2565,19 @@
             </a:lvl9pPr>
           </a:lstStyle>
           <a:p>
-            <a:endParaRPr lang="en-US"/>
-          </a:p>
-        </p:txBody>
-      </p:sp>
-      <p:sp>
-        <p:nvSpPr>
-          <p:cNvPr id="4" name="Text Placeholder 3"/>
+            <a:endParaRPr lang="zh-CN" altLang="en-US"/>
+          </a:p>
+        </p:txBody>
+      </p:sp>
+      <p:sp>
+        <p:nvSpPr>
+          <p:cNvPr id="4" name="文本占位符 3">
+            <a:extLst>
+              <a:ext uri="{FF2B5EF4-FFF2-40B4-BE49-F238E27FC236}">
+                <a16:creationId xmlns:a16="http://schemas.microsoft.com/office/drawing/2014/main" id="{FF797284-BBAF-424E-93DC-E282D87651FE}"/>
+              </a:ext>
+            </a:extLst>
+          </p:cNvPr>
           <p:cNvSpPr>
             <a:spLocks noGrp="1"/>
           </p:cNvSpPr>
@@ -2328,15 +2634,21 @@
           <a:p>
             <a:pPr lvl="0"/>
             <a:r>
-              <a:rPr lang="en-US" smtClean="0"/>
-              <a:t>Click to edit Master text styles</a:t>
-            </a:r>
-          </a:p>
-        </p:txBody>
-      </p:sp>
-      <p:sp>
-        <p:nvSpPr>
-          <p:cNvPr id="5" name="Date Placeholder 4"/>
+              <a:rPr lang="zh-CN" altLang="en-US"/>
+              <a:t>单击此处编辑母版文本样式</a:t>
+            </a:r>
+          </a:p>
+        </p:txBody>
+      </p:sp>
+      <p:sp>
+        <p:nvSpPr>
+          <p:cNvPr id="5" name="日期占位符 4">
+            <a:extLst>
+              <a:ext uri="{FF2B5EF4-FFF2-40B4-BE49-F238E27FC236}">
+                <a16:creationId xmlns:a16="http://schemas.microsoft.com/office/drawing/2014/main" id="{C4DE0D4A-3DBA-44E1-AC81-FB907209E2AF}"/>
+              </a:ext>
+            </a:extLst>
+          </p:cNvPr>
           <p:cNvSpPr>
             <a:spLocks noGrp="1"/>
           </p:cNvSpPr>
@@ -2349,17 +2661,23 @@
           <a:bodyPr/>
           <a:lstStyle/>
           <a:p>
-            <a:fld id="{F1FA7AC5-6045-4418-8E60-F48788734473}" type="datetimeFigureOut">
-              <a:rPr lang="en-US" smtClean="0"/>
-              <a:t>7/26/2012</a:t>
+            <a:fld id="{488607AE-241E-4541-9A94-40C722101DE2}" type="datetimeFigureOut">
+              <a:rPr lang="zh-CN" altLang="en-US" smtClean="0"/>
+              <a:t>2019/6/27</a:t>
             </a:fld>
-            <a:endParaRPr lang="en-US"/>
-          </a:p>
-        </p:txBody>
-      </p:sp>
-      <p:sp>
-        <p:nvSpPr>
-          <p:cNvPr id="6" name="Footer Placeholder 5"/>
+            <a:endParaRPr lang="zh-CN" altLang="en-US"/>
+          </a:p>
+        </p:txBody>
+      </p:sp>
+      <p:sp>
+        <p:nvSpPr>
+          <p:cNvPr id="6" name="页脚占位符 5">
+            <a:extLst>
+              <a:ext uri="{FF2B5EF4-FFF2-40B4-BE49-F238E27FC236}">
+                <a16:creationId xmlns:a16="http://schemas.microsoft.com/office/drawing/2014/main" id="{823EA6D8-BF61-4F4C-9374-1FEB497D6AE2}"/>
+              </a:ext>
+            </a:extLst>
+          </p:cNvPr>
           <p:cNvSpPr>
             <a:spLocks noGrp="1"/>
           </p:cNvSpPr>
@@ -2372,13 +2690,19 @@
           <a:bodyPr/>
           <a:lstStyle/>
           <a:p>
-            <a:endParaRPr lang="en-US"/>
-          </a:p>
-        </p:txBody>
-      </p:sp>
-      <p:sp>
-        <p:nvSpPr>
-          <p:cNvPr id="7" name="Slide Number Placeholder 6"/>
+            <a:endParaRPr lang="zh-CN" altLang="en-US"/>
+          </a:p>
+        </p:txBody>
+      </p:sp>
+      <p:sp>
+        <p:nvSpPr>
+          <p:cNvPr id="7" name="灯片编号占位符 6">
+            <a:extLst>
+              <a:ext uri="{FF2B5EF4-FFF2-40B4-BE49-F238E27FC236}">
+                <a16:creationId xmlns:a16="http://schemas.microsoft.com/office/drawing/2014/main" id="{B59D433D-DB02-46C0-8FA4-DAD4E4E05D53}"/>
+              </a:ext>
+            </a:extLst>
+          </p:cNvPr>
           <p:cNvSpPr>
             <a:spLocks noGrp="1"/>
           </p:cNvSpPr>
@@ -2391,18 +2715,18 @@
           <a:bodyPr/>
           <a:lstStyle/>
           <a:p>
-            <a:fld id="{8C71CAF9-4461-454A-B702-D536C3775752}" type="slidenum">
-              <a:rPr lang="en-US" smtClean="0"/>
+            <a:fld id="{7673EE0C-0863-498C-9054-DB8CCFC87F4C}" type="slidenum">
+              <a:rPr lang="zh-CN" altLang="en-US" smtClean="0"/>
               <a:t>‹#›</a:t>
             </a:fld>
-            <a:endParaRPr lang="en-US"/>
+            <a:endParaRPr lang="zh-CN" altLang="en-US"/>
           </a:p>
         </p:txBody>
       </p:sp>
     </p:spTree>
     <p:extLst>
       <p:ext uri="{BB962C8B-B14F-4D97-AF65-F5344CB8AC3E}">
-        <p14:creationId xmlns:p14="http://schemas.microsoft.com/office/powerpoint/2010/main" val="242868210"/>
+        <p14:creationId xmlns:p14="http://schemas.microsoft.com/office/powerpoint/2010/main" val="1611851724"/>
       </p:ext>
     </p:extLst>
   </p:cSld>
@@ -2436,7 +2760,13 @@
       </p:grpSpPr>
       <p:sp>
         <p:nvSpPr>
-          <p:cNvPr id="2" name="Title Placeholder 1"/>
+          <p:cNvPr id="2" name="标题占位符 1">
+            <a:extLst>
+              <a:ext uri="{FF2B5EF4-FFF2-40B4-BE49-F238E27FC236}">
+                <a16:creationId xmlns:a16="http://schemas.microsoft.com/office/drawing/2014/main" id="{6FB56C91-644C-48B3-8DD3-CF13FCEF411B}"/>
+              </a:ext>
+            </a:extLst>
+          </p:cNvPr>
           <p:cNvSpPr>
             <a:spLocks noGrp="1"/>
           </p:cNvSpPr>
@@ -2460,16 +2790,21 @@
           <a:lstStyle/>
           <a:p>
             <a:r>
-              <a:rPr lang="en-US" smtClean="0"/>
-              <a:t>Click to edit Master title style</a:t>
-            </a:r>
-            <a:endParaRPr lang="en-US"/>
-          </a:p>
-        </p:txBody>
-      </p:sp>
-      <p:sp>
-        <p:nvSpPr>
-          <p:cNvPr id="3" name="Text Placeholder 2"/>
+              <a:rPr lang="zh-CN" altLang="en-US"/>
+              <a:t>单击此处编辑母版标题样式</a:t>
+            </a:r>
+          </a:p>
+        </p:txBody>
+      </p:sp>
+      <p:sp>
+        <p:nvSpPr>
+          <p:cNvPr id="3" name="文本占位符 2">
+            <a:extLst>
+              <a:ext uri="{FF2B5EF4-FFF2-40B4-BE49-F238E27FC236}">
+                <a16:creationId xmlns:a16="http://schemas.microsoft.com/office/drawing/2014/main" id="{F50E978C-4894-423D-89A6-D7839C472B1E}"/>
+              </a:ext>
+            </a:extLst>
+          </p:cNvPr>
           <p:cNvSpPr>
             <a:spLocks noGrp="1"/>
           </p:cNvSpPr>
@@ -2494,44 +2829,49 @@
           <a:p>
             <a:pPr lvl="0"/>
             <a:r>
-              <a:rPr lang="en-US" smtClean="0"/>
-              <a:t>Click to edit Master text styles</a:t>
+              <a:rPr lang="zh-CN" altLang="en-US"/>
+              <a:t>单击此处编辑母版文本样式</a:t>
             </a:r>
           </a:p>
           <a:p>
             <a:pPr lvl="1"/>
             <a:r>
-              <a:rPr lang="en-US" smtClean="0"/>
-              <a:t>Second level</a:t>
+              <a:rPr lang="zh-CN" altLang="en-US"/>
+              <a:t>二级</a:t>
             </a:r>
           </a:p>
           <a:p>
             <a:pPr lvl="2"/>
             <a:r>
-              <a:rPr lang="en-US" smtClean="0"/>
-              <a:t>Third level</a:t>
+              <a:rPr lang="zh-CN" altLang="en-US"/>
+              <a:t>三级</a:t>
             </a:r>
           </a:p>
           <a:p>
             <a:pPr lvl="3"/>
             <a:r>
-              <a:rPr lang="en-US" smtClean="0"/>
-              <a:t>Fourth level</a:t>
+              <a:rPr lang="zh-CN" altLang="en-US"/>
+              <a:t>四级</a:t>
             </a:r>
           </a:p>
           <a:p>
             <a:pPr lvl="4"/>
             <a:r>
-              <a:rPr lang="en-US" smtClean="0"/>
-              <a:t>Fifth level</a:t>
-            </a:r>
-            <a:endParaRPr lang="en-US"/>
-          </a:p>
-        </p:txBody>
-      </p:sp>
-      <p:sp>
-        <p:nvSpPr>
-          <p:cNvPr id="4" name="Date Placeholder 3"/>
+              <a:rPr lang="zh-CN" altLang="en-US"/>
+              <a:t>五级</a:t>
+            </a:r>
+          </a:p>
+        </p:txBody>
+      </p:sp>
+      <p:sp>
+        <p:nvSpPr>
+          <p:cNvPr id="4" name="日期占位符 3">
+            <a:extLst>
+              <a:ext uri="{FF2B5EF4-FFF2-40B4-BE49-F238E27FC236}">
+                <a16:creationId xmlns:a16="http://schemas.microsoft.com/office/drawing/2014/main" id="{A712BD29-F643-4C6B-8AEA-B203C167AD6D}"/>
+              </a:ext>
+            </a:extLst>
+          </p:cNvPr>
           <p:cNvSpPr>
             <a:spLocks noGrp="1"/>
           </p:cNvSpPr>
@@ -2562,17 +2902,23 @@
             </a:lvl1pPr>
           </a:lstStyle>
           <a:p>
-            <a:fld id="{F1FA7AC5-6045-4418-8E60-F48788734473}" type="datetimeFigureOut">
-              <a:rPr lang="en-US" smtClean="0"/>
-              <a:t>7/26/2012</a:t>
+            <a:fld id="{488607AE-241E-4541-9A94-40C722101DE2}" type="datetimeFigureOut">
+              <a:rPr lang="zh-CN" altLang="en-US" smtClean="0"/>
+              <a:t>2019/6/27</a:t>
             </a:fld>
-            <a:endParaRPr lang="en-US"/>
-          </a:p>
-        </p:txBody>
-      </p:sp>
-      <p:sp>
-        <p:nvSpPr>
-          <p:cNvPr id="5" name="Footer Placeholder 4"/>
+            <a:endParaRPr lang="zh-CN" altLang="en-US"/>
+          </a:p>
+        </p:txBody>
+      </p:sp>
+      <p:sp>
+        <p:nvSpPr>
+          <p:cNvPr id="5" name="页脚占位符 4">
+            <a:extLst>
+              <a:ext uri="{FF2B5EF4-FFF2-40B4-BE49-F238E27FC236}">
+                <a16:creationId xmlns:a16="http://schemas.microsoft.com/office/drawing/2014/main" id="{94738361-0FAF-4A25-BD49-534FE676CBAC}"/>
+              </a:ext>
+            </a:extLst>
+          </p:cNvPr>
           <p:cNvSpPr>
             <a:spLocks noGrp="1"/>
           </p:cNvSpPr>
@@ -2603,13 +2949,19 @@
             </a:lvl1pPr>
           </a:lstStyle>
           <a:p>
-            <a:endParaRPr lang="en-US"/>
-          </a:p>
-        </p:txBody>
-      </p:sp>
-      <p:sp>
-        <p:nvSpPr>
-          <p:cNvPr id="6" name="Slide Number Placeholder 5"/>
+            <a:endParaRPr lang="zh-CN" altLang="en-US"/>
+          </a:p>
+        </p:txBody>
+      </p:sp>
+      <p:sp>
+        <p:nvSpPr>
+          <p:cNvPr id="6" name="灯片编号占位符 5">
+            <a:extLst>
+              <a:ext uri="{FF2B5EF4-FFF2-40B4-BE49-F238E27FC236}">
+                <a16:creationId xmlns:a16="http://schemas.microsoft.com/office/drawing/2014/main" id="{3DE68FFF-3748-46C4-8F3F-D0AE6BF538C4}"/>
+              </a:ext>
+            </a:extLst>
+          </p:cNvPr>
           <p:cNvSpPr>
             <a:spLocks noGrp="1"/>
           </p:cNvSpPr>
@@ -2640,18 +2992,18 @@
             </a:lvl1pPr>
           </a:lstStyle>
           <a:p>
-            <a:fld id="{8C71CAF9-4461-454A-B702-D536C3775752}" type="slidenum">
-              <a:rPr lang="en-US" smtClean="0"/>
+            <a:fld id="{7673EE0C-0863-498C-9054-DB8CCFC87F4C}" type="slidenum">
+              <a:rPr lang="zh-CN" altLang="en-US" smtClean="0"/>
               <a:t>‹#›</a:t>
             </a:fld>
-            <a:endParaRPr lang="en-US"/>
+            <a:endParaRPr lang="zh-CN" altLang="en-US"/>
           </a:p>
         </p:txBody>
       </p:sp>
     </p:spTree>
     <p:extLst>
       <p:ext uri="{BB962C8B-B14F-4D97-AF65-F5344CB8AC3E}">
-        <p14:creationId xmlns:p14="http://schemas.microsoft.com/office/powerpoint/2010/main" val="3931132979"/>
+        <p14:creationId xmlns:p14="http://schemas.microsoft.com/office/powerpoint/2010/main" val="1526870456"/>
       </p:ext>
     </p:extLst>
   </p:cSld>
@@ -2855,7 +3207,7 @@
     </p:bodyStyle>
     <p:otherStyle>
       <a:defPPr>
-        <a:defRPr lang="en-US"/>
+        <a:defRPr lang="zh-CN"/>
       </a:defPPr>
       <a:lvl1pPr marL="0" algn="l" defTabSz="914400" rtl="0" eaLnBrk="1" latinLnBrk="0" hangingPunct="1">
         <a:defRPr sz="1800" kern="1200">
@@ -2971,7 +3323,13 @@
       </p:grpSpPr>
       <p:sp>
         <p:nvSpPr>
-          <p:cNvPr id="2" name="Title 1"/>
+          <p:cNvPr id="2" name="标题 1">
+            <a:extLst>
+              <a:ext uri="{FF2B5EF4-FFF2-40B4-BE49-F238E27FC236}">
+                <a16:creationId xmlns:a16="http://schemas.microsoft.com/office/drawing/2014/main" id="{4462AB00-C0E5-47EF-B24A-2CB4ADD44025}"/>
+              </a:ext>
+            </a:extLst>
+          </p:cNvPr>
           <p:cNvSpPr>
             <a:spLocks noGrp="1"/>
           </p:cNvSpPr>
@@ -2984,13 +3342,19 @@
           <a:bodyPr/>
           <a:lstStyle/>
           <a:p>
-            <a:endParaRPr lang="en-US"/>
-          </a:p>
-        </p:txBody>
-      </p:sp>
-      <p:sp>
-        <p:nvSpPr>
-          <p:cNvPr id="3" name="Subtitle 2"/>
+            <a:endParaRPr lang="zh-CN" altLang="en-US"/>
+          </a:p>
+        </p:txBody>
+      </p:sp>
+      <p:sp>
+        <p:nvSpPr>
+          <p:cNvPr id="3" name="副标题 2">
+            <a:extLst>
+              <a:ext uri="{FF2B5EF4-FFF2-40B4-BE49-F238E27FC236}">
+                <a16:creationId xmlns:a16="http://schemas.microsoft.com/office/drawing/2014/main" id="{CAF8F5EC-E1DD-4D94-AFA4-89A911697633}"/>
+              </a:ext>
+            </a:extLst>
+          </p:cNvPr>
           <p:cNvSpPr>
             <a:spLocks noGrp="1"/>
           </p:cNvSpPr>
@@ -3003,14 +3367,14 @@
           <a:bodyPr/>
           <a:lstStyle/>
           <a:p>
-            <a:endParaRPr lang="en-US"/>
+            <a:endParaRPr lang="zh-CN" altLang="en-US"/>
           </a:p>
         </p:txBody>
       </p:sp>
     </p:spTree>
     <p:extLst>
       <p:ext uri="{BB962C8B-B14F-4D97-AF65-F5344CB8AC3E}">
-        <p14:creationId xmlns:p14="http://schemas.microsoft.com/office/powerpoint/2010/main" val="4157082590"/>
+        <p14:creationId xmlns:p14="http://schemas.microsoft.com/office/powerpoint/2010/main" val="4182125411"/>
       </p:ext>
     </p:extLst>
   </p:cSld>
@@ -3021,7 +3385,7 @@
 </file>
 
 <file path=ppt/theme/theme1.xml><?xml version="1.0" encoding="utf-8"?>
-<a:theme xmlns:a="http://schemas.openxmlformats.org/drawingml/2006/main" name="Office Theme">
+<a:theme xmlns:a="http://schemas.openxmlformats.org/drawingml/2006/main" name="Office 主题​​">
   <a:themeElements>
     <a:clrScheme name="Office">
       <a:dk1>
@@ -3037,7 +3401,7 @@
         <a:srgbClr val="E7E6E6"/>
       </a:lt2>
       <a:accent1>
-        <a:srgbClr val="5B9BD5"/>
+        <a:srgbClr val="4472C4"/>
       </a:accent1>
       <a:accent2>
         <a:srgbClr val="ED7D31"/>
@@ -3049,7 +3413,7 @@
         <a:srgbClr val="FFC000"/>
       </a:accent4>
       <a:accent5>
-        <a:srgbClr val="4472C4"/>
+        <a:srgbClr val="5B9BD5"/>
       </a:accent5>
       <a:accent6>
         <a:srgbClr val="70AD47"/>
@@ -3063,12 +3427,12 @@
     </a:clrScheme>
     <a:fontScheme name="Office">
       <a:majorFont>
-        <a:latin typeface="Calibri Light" panose="020F0302020204030204"/>
+        <a:latin typeface="等线 Light" panose="020F0302020204030204"/>
         <a:ea typeface=""/>
         <a:cs typeface=""/>
-        <a:font script="Jpan" typeface="ＭＳ Ｐゴシック"/>
+        <a:font script="Jpan" typeface="游ゴシック Light"/>
         <a:font script="Hang" typeface="맑은 고딕"/>
-        <a:font script="Hans" typeface="宋体"/>
+        <a:font script="Hans" typeface="等线 Light"/>
         <a:font script="Hant" typeface="新細明體"/>
         <a:font script="Arab" typeface="Times New Roman"/>
         <a:font script="Hebr" typeface="Times New Roman"/>
@@ -3096,14 +3460,31 @@
         <a:font script="Viet" typeface="Times New Roman"/>
         <a:font script="Uigh" typeface="Microsoft Uighur"/>
         <a:font script="Geor" typeface="Sylfaen"/>
+        <a:font script="Armn" typeface="Arial"/>
+        <a:font script="Bugi" typeface="Leelawadee UI"/>
+        <a:font script="Bopo" typeface="Microsoft JhengHei"/>
+        <a:font script="Java" typeface="Javanese Text"/>
+        <a:font script="Lisu" typeface="Segoe UI"/>
+        <a:font script="Mymr" typeface="Myanmar Text"/>
+        <a:font script="Nkoo" typeface="Ebrima"/>
+        <a:font script="Olck" typeface="Nirmala UI"/>
+        <a:font script="Osma" typeface="Ebrima"/>
+        <a:font script="Phag" typeface="Phagspa"/>
+        <a:font script="Syrn" typeface="Estrangelo Edessa"/>
+        <a:font script="Syrj" typeface="Estrangelo Edessa"/>
+        <a:font script="Syre" typeface="Estrangelo Edessa"/>
+        <a:font script="Sora" typeface="Nirmala UI"/>
+        <a:font script="Tale" typeface="Microsoft Tai Le"/>
+        <a:font script="Talu" typeface="Microsoft New Tai Lue"/>
+        <a:font script="Tfng" typeface="Ebrima"/>
       </a:majorFont>
       <a:minorFont>
-        <a:latin typeface="Calibri" panose="020F0502020204030204"/>
+        <a:latin typeface="等线" panose="020F0502020204030204"/>
         <a:ea typeface=""/>
         <a:cs typeface=""/>
-        <a:font script="Jpan" typeface="ＭＳ Ｐゴシック"/>
+        <a:font script="Jpan" typeface="游ゴシック"/>
         <a:font script="Hang" typeface="맑은 고딕"/>
-        <a:font script="Hans" typeface="宋体"/>
+        <a:font script="Hans" typeface="等线"/>
         <a:font script="Hant" typeface="新細明體"/>
         <a:font script="Arab" typeface="Arial"/>
         <a:font script="Hebr" typeface="Arial"/>
@@ -3131,6 +3512,23 @@
         <a:font script="Viet" typeface="Arial"/>
         <a:font script="Uigh" typeface="Microsoft Uighur"/>
         <a:font script="Geor" typeface="Sylfaen"/>
+        <a:font script="Armn" typeface="Arial"/>
+        <a:font script="Bugi" typeface="Leelawadee UI"/>
+        <a:font script="Bopo" typeface="Microsoft JhengHei"/>
+        <a:font script="Java" typeface="Javanese Text"/>
+        <a:font script="Lisu" typeface="Segoe UI"/>
+        <a:font script="Mymr" typeface="Myanmar Text"/>
+        <a:font script="Nkoo" typeface="Ebrima"/>
+        <a:font script="Olck" typeface="Nirmala UI"/>
+        <a:font script="Osma" typeface="Ebrima"/>
+        <a:font script="Phag" typeface="Phagspa"/>
+        <a:font script="Syrn" typeface="Estrangelo Edessa"/>
+        <a:font script="Syrj" typeface="Estrangelo Edessa"/>
+        <a:font script="Syre" typeface="Estrangelo Edessa"/>
+        <a:font script="Sora" typeface="Nirmala UI"/>
+        <a:font script="Tale" typeface="Microsoft Tai Le"/>
+        <a:font script="Talu" typeface="Microsoft New Tai Lue"/>
+        <a:font script="Tfng" typeface="Ebrima"/>
       </a:minorFont>
     </a:fontScheme>
     <a:fmtScheme name="Office">

</xml_diff>

<commit_message>
update pptx/xlsx office template
</commit_message>
<xml_diff>
--- a/media/office-template/empty.pptx
+++ b/media/office-template/empty.pptx
@@ -1,6 +1,6 @@
 
 <file path=ppt/presentation.xml><?xml version="1.0" encoding="utf-8"?>
-<p:presentation xmlns:a="http://schemas.openxmlformats.org/drawingml/2006/main" xmlns:r="http://schemas.openxmlformats.org/officeDocument/2006/relationships" xmlns:p="http://schemas.openxmlformats.org/presentationml/2006/main" saveSubsetFonts="1">
+<p:presentation xmlns:a="http://schemas.openxmlformats.org/drawingml/2006/main" xmlns:r="http://schemas.openxmlformats.org/officeDocument/2006/relationships" xmlns:p="http://schemas.openxmlformats.org/presentationml/2006/main" removePersonalInfoOnSave="1" saveSubsetFonts="1" autoCompressPictures="0">
   <p:sldMasterIdLst>
     <p:sldMasterId id="2147483648" r:id="rId1"/>
   </p:sldMasterIdLst>
@@ -11,7 +11,7 @@
   <p:notesSz cx="6858000" cy="9144000"/>
   <p:defaultTextStyle>
     <a:defPPr>
-      <a:defRPr lang="zh-CN"/>
+      <a:defRPr lang="en-US"/>
     </a:defPPr>
     <a:lvl1pPr marL="0" algn="l" defTabSz="914400" rtl="0" eaLnBrk="1" latinLnBrk="0" hangingPunct="1">
       <a:defRPr sz="1800" kern="1200">
@@ -104,12 +104,17 @@
       </a:defRPr>
     </a:lvl9pPr>
   </p:defaultTextStyle>
+  <p:extLst>
+    <p:ext uri="{EFAFB233-063F-42B5-8137-9DF3F51BA10A}">
+      <p15:sldGuideLst xmlns:p15="http://schemas.microsoft.com/office/powerpoint/2012/main"/>
+    </p:ext>
+  </p:extLst>
 </p:presentation>
 </file>
 
 <file path=ppt/slideLayouts/slideLayout1.xml><?xml version="1.0" encoding="utf-8"?>
 <p:sldLayout xmlns:a="http://schemas.openxmlformats.org/drawingml/2006/main" xmlns:r="http://schemas.openxmlformats.org/officeDocument/2006/relationships" xmlns:p="http://schemas.openxmlformats.org/presentationml/2006/main" type="title" preserve="1">
-  <p:cSld name="标题幻灯片">
+  <p:cSld name="Title Slide">
     <p:spTree>
       <p:nvGrpSpPr>
         <p:cNvPr id="1" name=""/>
@@ -126,13 +131,7 @@
       </p:grpSpPr>
       <p:sp>
         <p:nvSpPr>
-          <p:cNvPr id="2" name="标题 1">
-            <a:extLst>
-              <a:ext uri="{FF2B5EF4-FFF2-40B4-BE49-F238E27FC236}">
-                <a16:creationId xmlns:a16="http://schemas.microsoft.com/office/drawing/2014/main" id="{24C8F438-DBB6-40FA-A5A1-EB55F7B24EB2}"/>
-              </a:ext>
-            </a:extLst>
-          </p:cNvPr>
+          <p:cNvPr id="2" name="Title 1"/>
           <p:cNvSpPr>
             <a:spLocks noGrp="1"/>
           </p:cNvSpPr>
@@ -155,21 +154,15 @@
           </a:lstStyle>
           <a:p>
             <a:r>
-              <a:rPr lang="zh-CN" altLang="en-US"/>
-              <a:t>单击此处编辑母版标题样式</a:t>
-            </a:r>
-          </a:p>
-        </p:txBody>
-      </p:sp>
-      <p:sp>
-        <p:nvSpPr>
-          <p:cNvPr id="3" name="副标题 2">
-            <a:extLst>
-              <a:ext uri="{FF2B5EF4-FFF2-40B4-BE49-F238E27FC236}">
-                <a16:creationId xmlns:a16="http://schemas.microsoft.com/office/drawing/2014/main" id="{0C5BE3EB-E61B-4C3B-8D2A-5E6D66672E55}"/>
-              </a:ext>
-            </a:extLst>
-          </p:cNvPr>
+              <a:rPr lang="en-US"/>
+              <a:t>Click to edit Master title style</a:t>
+            </a:r>
+          </a:p>
+        </p:txBody>
+      </p:sp>
+      <p:sp>
+        <p:nvSpPr>
+          <p:cNvPr id="3" name="Subtitle 2"/>
           <p:cNvSpPr>
             <a:spLocks noGrp="1"/>
           </p:cNvSpPr>
@@ -225,21 +218,15 @@
           </a:lstStyle>
           <a:p>
             <a:r>
-              <a:rPr lang="zh-CN" altLang="en-US"/>
-              <a:t>单击此处编辑母版副标题样式</a:t>
-            </a:r>
-          </a:p>
-        </p:txBody>
-      </p:sp>
-      <p:sp>
-        <p:nvSpPr>
-          <p:cNvPr id="4" name="日期占位符 3">
-            <a:extLst>
-              <a:ext uri="{FF2B5EF4-FFF2-40B4-BE49-F238E27FC236}">
-                <a16:creationId xmlns:a16="http://schemas.microsoft.com/office/drawing/2014/main" id="{9C0AA3EF-F806-4546-A871-02C5B9192A3C}"/>
-              </a:ext>
-            </a:extLst>
-          </p:cNvPr>
+              <a:rPr lang="en-US"/>
+              <a:t>Click to edit Master subtitle style</a:t>
+            </a:r>
+          </a:p>
+        </p:txBody>
+      </p:sp>
+      <p:sp>
+        <p:nvSpPr>
+          <p:cNvPr id="4" name="Date Placeholder 3"/>
           <p:cNvSpPr>
             <a:spLocks noGrp="1"/>
           </p:cNvSpPr>
@@ -252,23 +239,17 @@
           <a:bodyPr/>
           <a:lstStyle/>
           <a:p>
-            <a:fld id="{488607AE-241E-4541-9A94-40C722101DE2}" type="datetimeFigureOut">
-              <a:rPr lang="zh-CN" altLang="en-US" smtClean="0"/>
-              <a:t>2019/6/27</a:t>
+            <a:fld id="{9ED3734C-ACA2-CD44-9419-3EA4E9A728CC}" type="datetimeFigureOut">
+              <a:rPr lang="en-US" smtClean="0"/>
+              <a:t>12/5/2019</a:t>
             </a:fld>
-            <a:endParaRPr lang="zh-CN" altLang="en-US"/>
-          </a:p>
-        </p:txBody>
-      </p:sp>
-      <p:sp>
-        <p:nvSpPr>
-          <p:cNvPr id="5" name="页脚占位符 4">
-            <a:extLst>
-              <a:ext uri="{FF2B5EF4-FFF2-40B4-BE49-F238E27FC236}">
-                <a16:creationId xmlns:a16="http://schemas.microsoft.com/office/drawing/2014/main" id="{35A8D405-0BBF-4F59-A3C0-C27993C5E74C}"/>
-              </a:ext>
-            </a:extLst>
-          </p:cNvPr>
+            <a:endParaRPr lang="en-US"/>
+          </a:p>
+        </p:txBody>
+      </p:sp>
+      <p:sp>
+        <p:nvSpPr>
+          <p:cNvPr id="5" name="Footer Placeholder 4"/>
           <p:cNvSpPr>
             <a:spLocks noGrp="1"/>
           </p:cNvSpPr>
@@ -281,19 +262,13 @@
           <a:bodyPr/>
           <a:lstStyle/>
           <a:p>
-            <a:endParaRPr lang="zh-CN" altLang="en-US"/>
-          </a:p>
-        </p:txBody>
-      </p:sp>
-      <p:sp>
-        <p:nvSpPr>
-          <p:cNvPr id="6" name="灯片编号占位符 5">
-            <a:extLst>
-              <a:ext uri="{FF2B5EF4-FFF2-40B4-BE49-F238E27FC236}">
-                <a16:creationId xmlns:a16="http://schemas.microsoft.com/office/drawing/2014/main" id="{B37B6A98-35F3-49A4-8DBD-E38FF1856B64}"/>
-              </a:ext>
-            </a:extLst>
-          </p:cNvPr>
+            <a:endParaRPr lang="en-US"/>
+          </a:p>
+        </p:txBody>
+      </p:sp>
+      <p:sp>
+        <p:nvSpPr>
+          <p:cNvPr id="6" name="Slide Number Placeholder 5"/>
           <p:cNvSpPr>
             <a:spLocks noGrp="1"/>
           </p:cNvSpPr>
@@ -306,18 +281,18 @@
           <a:bodyPr/>
           <a:lstStyle/>
           <a:p>
-            <a:fld id="{7673EE0C-0863-498C-9054-DB8CCFC87F4C}" type="slidenum">
-              <a:rPr lang="zh-CN" altLang="en-US" smtClean="0"/>
+            <a:fld id="{1F412440-1B23-604B-B178-CB159C9EC6EA}" type="slidenum">
+              <a:rPr lang="en-US" smtClean="0"/>
               <a:t>‹#›</a:t>
             </a:fld>
-            <a:endParaRPr lang="zh-CN" altLang="en-US"/>
+            <a:endParaRPr lang="en-US"/>
           </a:p>
         </p:txBody>
       </p:sp>
     </p:spTree>
     <p:extLst>
       <p:ext uri="{BB962C8B-B14F-4D97-AF65-F5344CB8AC3E}">
-        <p14:creationId xmlns:p14="http://schemas.microsoft.com/office/powerpoint/2010/main" val="654707259"/>
+        <p14:creationId xmlns:p14="http://schemas.microsoft.com/office/powerpoint/2010/main" val="454571334"/>
       </p:ext>
     </p:extLst>
   </p:cSld>
@@ -329,7 +304,7 @@
 
 <file path=ppt/slideLayouts/slideLayout10.xml><?xml version="1.0" encoding="utf-8"?>
 <p:sldLayout xmlns:a="http://schemas.openxmlformats.org/drawingml/2006/main" xmlns:r="http://schemas.openxmlformats.org/officeDocument/2006/relationships" xmlns:p="http://schemas.openxmlformats.org/presentationml/2006/main" type="vertTx" preserve="1">
-  <p:cSld name="标题和竖排文字">
+  <p:cSld name="Title and Vertical Text">
     <p:spTree>
       <p:nvGrpSpPr>
         <p:cNvPr id="1" name=""/>
@@ -346,13 +321,7 @@
       </p:grpSpPr>
       <p:sp>
         <p:nvSpPr>
-          <p:cNvPr id="2" name="标题 1">
-            <a:extLst>
-              <a:ext uri="{FF2B5EF4-FFF2-40B4-BE49-F238E27FC236}">
-                <a16:creationId xmlns:a16="http://schemas.microsoft.com/office/drawing/2014/main" id="{577275BE-E30C-4305-999D-8BC0AA7A54AF}"/>
-              </a:ext>
-            </a:extLst>
-          </p:cNvPr>
+          <p:cNvPr id="2" name="Title 1"/>
           <p:cNvSpPr>
             <a:spLocks noGrp="1"/>
           </p:cNvSpPr>
@@ -366,21 +335,15 @@
           <a:lstStyle/>
           <a:p>
             <a:r>
-              <a:rPr lang="zh-CN" altLang="en-US"/>
-              <a:t>单击此处编辑母版标题样式</a:t>
-            </a:r>
-          </a:p>
-        </p:txBody>
-      </p:sp>
-      <p:sp>
-        <p:nvSpPr>
-          <p:cNvPr id="3" name="竖排文字占位符 2">
-            <a:extLst>
-              <a:ext uri="{FF2B5EF4-FFF2-40B4-BE49-F238E27FC236}">
-                <a16:creationId xmlns:a16="http://schemas.microsoft.com/office/drawing/2014/main" id="{80D329F8-9884-44CB-A831-6EA4CA413555}"/>
-              </a:ext>
-            </a:extLst>
-          </p:cNvPr>
+              <a:rPr lang="en-US"/>
+              <a:t>Click to edit Master title style</a:t>
+            </a:r>
+          </a:p>
+        </p:txBody>
+      </p:sp>
+      <p:sp>
+        <p:nvSpPr>
+          <p:cNvPr id="3" name="Vertical Text Placeholder 2"/>
           <p:cNvSpPr>
             <a:spLocks noGrp="1"/>
           </p:cNvSpPr>
@@ -395,49 +358,43 @@
           <a:p>
             <a:pPr lvl="0"/>
             <a:r>
-              <a:rPr lang="zh-CN" altLang="en-US"/>
-              <a:t>单击此处编辑母版文本样式</a:t>
+              <a:rPr lang="en-US"/>
+              <a:t>Click to edit Master text styles</a:t>
             </a:r>
           </a:p>
           <a:p>
             <a:pPr lvl="1"/>
             <a:r>
-              <a:rPr lang="zh-CN" altLang="en-US"/>
-              <a:t>二级</a:t>
+              <a:rPr lang="en-US"/>
+              <a:t>Second level</a:t>
             </a:r>
           </a:p>
           <a:p>
             <a:pPr lvl="2"/>
             <a:r>
-              <a:rPr lang="zh-CN" altLang="en-US"/>
-              <a:t>三级</a:t>
+              <a:rPr lang="en-US"/>
+              <a:t>Third level</a:t>
             </a:r>
           </a:p>
           <a:p>
             <a:pPr lvl="3"/>
             <a:r>
-              <a:rPr lang="zh-CN" altLang="en-US"/>
-              <a:t>四级</a:t>
+              <a:rPr lang="en-US"/>
+              <a:t>Fourth level</a:t>
             </a:r>
           </a:p>
           <a:p>
             <a:pPr lvl="4"/>
             <a:r>
-              <a:rPr lang="zh-CN" altLang="en-US"/>
-              <a:t>五级</a:t>
-            </a:r>
-          </a:p>
-        </p:txBody>
-      </p:sp>
-      <p:sp>
-        <p:nvSpPr>
-          <p:cNvPr id="4" name="日期占位符 3">
-            <a:extLst>
-              <a:ext uri="{FF2B5EF4-FFF2-40B4-BE49-F238E27FC236}">
-                <a16:creationId xmlns:a16="http://schemas.microsoft.com/office/drawing/2014/main" id="{DEF50CB3-8937-4101-BABB-9A4BF947A78D}"/>
-              </a:ext>
-            </a:extLst>
-          </p:cNvPr>
+              <a:rPr lang="en-US"/>
+              <a:t>Fifth level</a:t>
+            </a:r>
+          </a:p>
+        </p:txBody>
+      </p:sp>
+      <p:sp>
+        <p:nvSpPr>
+          <p:cNvPr id="4" name="Date Placeholder 3"/>
           <p:cNvSpPr>
             <a:spLocks noGrp="1"/>
           </p:cNvSpPr>
@@ -450,23 +407,17 @@
           <a:bodyPr/>
           <a:lstStyle/>
           <a:p>
-            <a:fld id="{488607AE-241E-4541-9A94-40C722101DE2}" type="datetimeFigureOut">
-              <a:rPr lang="zh-CN" altLang="en-US" smtClean="0"/>
-              <a:t>2019/6/27</a:t>
+            <a:fld id="{9ED3734C-ACA2-CD44-9419-3EA4E9A728CC}" type="datetimeFigureOut">
+              <a:rPr lang="en-US" smtClean="0"/>
+              <a:t>12/5/2019</a:t>
             </a:fld>
-            <a:endParaRPr lang="zh-CN" altLang="en-US"/>
-          </a:p>
-        </p:txBody>
-      </p:sp>
-      <p:sp>
-        <p:nvSpPr>
-          <p:cNvPr id="5" name="页脚占位符 4">
-            <a:extLst>
-              <a:ext uri="{FF2B5EF4-FFF2-40B4-BE49-F238E27FC236}">
-                <a16:creationId xmlns:a16="http://schemas.microsoft.com/office/drawing/2014/main" id="{4D1C46FA-35B6-43F3-B54F-446C800A52AA}"/>
-              </a:ext>
-            </a:extLst>
-          </p:cNvPr>
+            <a:endParaRPr lang="en-US"/>
+          </a:p>
+        </p:txBody>
+      </p:sp>
+      <p:sp>
+        <p:nvSpPr>
+          <p:cNvPr id="5" name="Footer Placeholder 4"/>
           <p:cNvSpPr>
             <a:spLocks noGrp="1"/>
           </p:cNvSpPr>
@@ -479,19 +430,13 @@
           <a:bodyPr/>
           <a:lstStyle/>
           <a:p>
-            <a:endParaRPr lang="zh-CN" altLang="en-US"/>
-          </a:p>
-        </p:txBody>
-      </p:sp>
-      <p:sp>
-        <p:nvSpPr>
-          <p:cNvPr id="6" name="灯片编号占位符 5">
-            <a:extLst>
-              <a:ext uri="{FF2B5EF4-FFF2-40B4-BE49-F238E27FC236}">
-                <a16:creationId xmlns:a16="http://schemas.microsoft.com/office/drawing/2014/main" id="{ECA19D81-4324-4E78-BBCB-28D16A1EBF3B}"/>
-              </a:ext>
-            </a:extLst>
-          </p:cNvPr>
+            <a:endParaRPr lang="en-US"/>
+          </a:p>
+        </p:txBody>
+      </p:sp>
+      <p:sp>
+        <p:nvSpPr>
+          <p:cNvPr id="6" name="Slide Number Placeholder 5"/>
           <p:cNvSpPr>
             <a:spLocks noGrp="1"/>
           </p:cNvSpPr>
@@ -504,18 +449,18 @@
           <a:bodyPr/>
           <a:lstStyle/>
           <a:p>
-            <a:fld id="{7673EE0C-0863-498C-9054-DB8CCFC87F4C}" type="slidenum">
-              <a:rPr lang="zh-CN" altLang="en-US" smtClean="0"/>
+            <a:fld id="{1F412440-1B23-604B-B178-CB159C9EC6EA}" type="slidenum">
+              <a:rPr lang="en-US" smtClean="0"/>
               <a:t>‹#›</a:t>
             </a:fld>
-            <a:endParaRPr lang="zh-CN" altLang="en-US"/>
+            <a:endParaRPr lang="en-US"/>
           </a:p>
         </p:txBody>
       </p:sp>
     </p:spTree>
     <p:extLst>
       <p:ext uri="{BB962C8B-B14F-4D97-AF65-F5344CB8AC3E}">
-        <p14:creationId xmlns:p14="http://schemas.microsoft.com/office/powerpoint/2010/main" val="4007917575"/>
+        <p14:creationId xmlns:p14="http://schemas.microsoft.com/office/powerpoint/2010/main" val="821528851"/>
       </p:ext>
     </p:extLst>
   </p:cSld>
@@ -527,7 +472,7 @@
 
 <file path=ppt/slideLayouts/slideLayout11.xml><?xml version="1.0" encoding="utf-8"?>
 <p:sldLayout xmlns:a="http://schemas.openxmlformats.org/drawingml/2006/main" xmlns:r="http://schemas.openxmlformats.org/officeDocument/2006/relationships" xmlns:p="http://schemas.openxmlformats.org/presentationml/2006/main" type="vertTitleAndTx" preserve="1">
-  <p:cSld name="竖排标题与文本">
+  <p:cSld name="Vertical Title and Text">
     <p:spTree>
       <p:nvGrpSpPr>
         <p:cNvPr id="1" name=""/>
@@ -544,13 +489,7 @@
       </p:grpSpPr>
       <p:sp>
         <p:nvSpPr>
-          <p:cNvPr id="2" name="竖排标题 1">
-            <a:extLst>
-              <a:ext uri="{FF2B5EF4-FFF2-40B4-BE49-F238E27FC236}">
-                <a16:creationId xmlns:a16="http://schemas.microsoft.com/office/drawing/2014/main" id="{76B62B14-6685-44B4-BB6D-0C469F412C1A}"/>
-              </a:ext>
-            </a:extLst>
-          </p:cNvPr>
+          <p:cNvPr id="2" name="Vertical Title 1"/>
           <p:cNvSpPr>
             <a:spLocks noGrp="1"/>
           </p:cNvSpPr>
@@ -569,21 +508,15 @@
           <a:lstStyle/>
           <a:p>
             <a:r>
-              <a:rPr lang="zh-CN" altLang="en-US"/>
-              <a:t>单击此处编辑母版标题样式</a:t>
-            </a:r>
-          </a:p>
-        </p:txBody>
-      </p:sp>
-      <p:sp>
-        <p:nvSpPr>
-          <p:cNvPr id="3" name="竖排文字占位符 2">
-            <a:extLst>
-              <a:ext uri="{FF2B5EF4-FFF2-40B4-BE49-F238E27FC236}">
-                <a16:creationId xmlns:a16="http://schemas.microsoft.com/office/drawing/2014/main" id="{B46C389E-3F8A-4740-AFD3-17659AF5A3AF}"/>
-              </a:ext>
-            </a:extLst>
-          </p:cNvPr>
+              <a:rPr lang="en-US"/>
+              <a:t>Click to edit Master title style</a:t>
+            </a:r>
+          </a:p>
+        </p:txBody>
+      </p:sp>
+      <p:sp>
+        <p:nvSpPr>
+          <p:cNvPr id="3" name="Vertical Text Placeholder 2"/>
           <p:cNvSpPr>
             <a:spLocks noGrp="1"/>
           </p:cNvSpPr>
@@ -603,49 +536,43 @@
           <a:p>
             <a:pPr lvl="0"/>
             <a:r>
-              <a:rPr lang="zh-CN" altLang="en-US"/>
-              <a:t>单击此处编辑母版文本样式</a:t>
+              <a:rPr lang="en-US"/>
+              <a:t>Click to edit Master text styles</a:t>
             </a:r>
           </a:p>
           <a:p>
             <a:pPr lvl="1"/>
             <a:r>
-              <a:rPr lang="zh-CN" altLang="en-US"/>
-              <a:t>二级</a:t>
+              <a:rPr lang="en-US"/>
+              <a:t>Second level</a:t>
             </a:r>
           </a:p>
           <a:p>
             <a:pPr lvl="2"/>
             <a:r>
-              <a:rPr lang="zh-CN" altLang="en-US"/>
-              <a:t>三级</a:t>
+              <a:rPr lang="en-US"/>
+              <a:t>Third level</a:t>
             </a:r>
           </a:p>
           <a:p>
             <a:pPr lvl="3"/>
             <a:r>
-              <a:rPr lang="zh-CN" altLang="en-US"/>
-              <a:t>四级</a:t>
+              <a:rPr lang="en-US"/>
+              <a:t>Fourth level</a:t>
             </a:r>
           </a:p>
           <a:p>
             <a:pPr lvl="4"/>
             <a:r>
-              <a:rPr lang="zh-CN" altLang="en-US"/>
-              <a:t>五级</a:t>
-            </a:r>
-          </a:p>
-        </p:txBody>
-      </p:sp>
-      <p:sp>
-        <p:nvSpPr>
-          <p:cNvPr id="4" name="日期占位符 3">
-            <a:extLst>
-              <a:ext uri="{FF2B5EF4-FFF2-40B4-BE49-F238E27FC236}">
-                <a16:creationId xmlns:a16="http://schemas.microsoft.com/office/drawing/2014/main" id="{0E7E5460-3B8E-4763-9BF3-142F005C6EE4}"/>
-              </a:ext>
-            </a:extLst>
-          </p:cNvPr>
+              <a:rPr lang="en-US"/>
+              <a:t>Fifth level</a:t>
+            </a:r>
+          </a:p>
+        </p:txBody>
+      </p:sp>
+      <p:sp>
+        <p:nvSpPr>
+          <p:cNvPr id="4" name="Date Placeholder 3"/>
           <p:cNvSpPr>
             <a:spLocks noGrp="1"/>
           </p:cNvSpPr>
@@ -658,23 +585,17 @@
           <a:bodyPr/>
           <a:lstStyle/>
           <a:p>
-            <a:fld id="{488607AE-241E-4541-9A94-40C722101DE2}" type="datetimeFigureOut">
-              <a:rPr lang="zh-CN" altLang="en-US" smtClean="0"/>
-              <a:t>2019/6/27</a:t>
+            <a:fld id="{9ED3734C-ACA2-CD44-9419-3EA4E9A728CC}" type="datetimeFigureOut">
+              <a:rPr lang="en-US" smtClean="0"/>
+              <a:t>12/5/2019</a:t>
             </a:fld>
-            <a:endParaRPr lang="zh-CN" altLang="en-US"/>
-          </a:p>
-        </p:txBody>
-      </p:sp>
-      <p:sp>
-        <p:nvSpPr>
-          <p:cNvPr id="5" name="页脚占位符 4">
-            <a:extLst>
-              <a:ext uri="{FF2B5EF4-FFF2-40B4-BE49-F238E27FC236}">
-                <a16:creationId xmlns:a16="http://schemas.microsoft.com/office/drawing/2014/main" id="{F7DADC92-471A-46C6-9F60-128130E8BB1B}"/>
-              </a:ext>
-            </a:extLst>
-          </p:cNvPr>
+            <a:endParaRPr lang="en-US"/>
+          </a:p>
+        </p:txBody>
+      </p:sp>
+      <p:sp>
+        <p:nvSpPr>
+          <p:cNvPr id="5" name="Footer Placeholder 4"/>
           <p:cNvSpPr>
             <a:spLocks noGrp="1"/>
           </p:cNvSpPr>
@@ -687,19 +608,13 @@
           <a:bodyPr/>
           <a:lstStyle/>
           <a:p>
-            <a:endParaRPr lang="zh-CN" altLang="en-US"/>
-          </a:p>
-        </p:txBody>
-      </p:sp>
-      <p:sp>
-        <p:nvSpPr>
-          <p:cNvPr id="6" name="灯片编号占位符 5">
-            <a:extLst>
-              <a:ext uri="{FF2B5EF4-FFF2-40B4-BE49-F238E27FC236}">
-                <a16:creationId xmlns:a16="http://schemas.microsoft.com/office/drawing/2014/main" id="{3CF9632D-97D0-456E-B34C-2F1934F13BB8}"/>
-              </a:ext>
-            </a:extLst>
-          </p:cNvPr>
+            <a:endParaRPr lang="en-US"/>
+          </a:p>
+        </p:txBody>
+      </p:sp>
+      <p:sp>
+        <p:nvSpPr>
+          <p:cNvPr id="6" name="Slide Number Placeholder 5"/>
           <p:cNvSpPr>
             <a:spLocks noGrp="1"/>
           </p:cNvSpPr>
@@ -712,18 +627,18 @@
           <a:bodyPr/>
           <a:lstStyle/>
           <a:p>
-            <a:fld id="{7673EE0C-0863-498C-9054-DB8CCFC87F4C}" type="slidenum">
-              <a:rPr lang="zh-CN" altLang="en-US" smtClean="0"/>
+            <a:fld id="{1F412440-1B23-604B-B178-CB159C9EC6EA}" type="slidenum">
+              <a:rPr lang="en-US" smtClean="0"/>
               <a:t>‹#›</a:t>
             </a:fld>
-            <a:endParaRPr lang="zh-CN" altLang="en-US"/>
+            <a:endParaRPr lang="en-US"/>
           </a:p>
         </p:txBody>
       </p:sp>
     </p:spTree>
     <p:extLst>
       <p:ext uri="{BB962C8B-B14F-4D97-AF65-F5344CB8AC3E}">
-        <p14:creationId xmlns:p14="http://schemas.microsoft.com/office/powerpoint/2010/main" val="3746448495"/>
+        <p14:creationId xmlns:p14="http://schemas.microsoft.com/office/powerpoint/2010/main" val="1263032194"/>
       </p:ext>
     </p:extLst>
   </p:cSld>
@@ -735,7 +650,7 @@
 
 <file path=ppt/slideLayouts/slideLayout2.xml><?xml version="1.0" encoding="utf-8"?>
 <p:sldLayout xmlns:a="http://schemas.openxmlformats.org/drawingml/2006/main" xmlns:r="http://schemas.openxmlformats.org/officeDocument/2006/relationships" xmlns:p="http://schemas.openxmlformats.org/presentationml/2006/main" type="obj" preserve="1">
-  <p:cSld name="标题和内容">
+  <p:cSld name="Title and Content">
     <p:spTree>
       <p:nvGrpSpPr>
         <p:cNvPr id="1" name=""/>
@@ -752,13 +667,7 @@
       </p:grpSpPr>
       <p:sp>
         <p:nvSpPr>
-          <p:cNvPr id="2" name="标题 1">
-            <a:extLst>
-              <a:ext uri="{FF2B5EF4-FFF2-40B4-BE49-F238E27FC236}">
-                <a16:creationId xmlns:a16="http://schemas.microsoft.com/office/drawing/2014/main" id="{8F557C3E-EC16-4486-882E-2C6E324B695D}"/>
-              </a:ext>
-            </a:extLst>
-          </p:cNvPr>
+          <p:cNvPr id="2" name="Title 1"/>
           <p:cNvSpPr>
             <a:spLocks noGrp="1"/>
           </p:cNvSpPr>
@@ -772,21 +681,15 @@
           <a:lstStyle/>
           <a:p>
             <a:r>
-              <a:rPr lang="zh-CN" altLang="en-US"/>
-              <a:t>单击此处编辑母版标题样式</a:t>
-            </a:r>
-          </a:p>
-        </p:txBody>
-      </p:sp>
-      <p:sp>
-        <p:nvSpPr>
-          <p:cNvPr id="3" name="内容占位符 2">
-            <a:extLst>
-              <a:ext uri="{FF2B5EF4-FFF2-40B4-BE49-F238E27FC236}">
-                <a16:creationId xmlns:a16="http://schemas.microsoft.com/office/drawing/2014/main" id="{EA26A6B4-CB26-4DC2-A984-6269BA37FBA0}"/>
-              </a:ext>
-            </a:extLst>
-          </p:cNvPr>
+              <a:rPr lang="en-US"/>
+              <a:t>Click to edit Master title style</a:t>
+            </a:r>
+          </a:p>
+        </p:txBody>
+      </p:sp>
+      <p:sp>
+        <p:nvSpPr>
+          <p:cNvPr id="3" name="Content Placeholder 2"/>
           <p:cNvSpPr>
             <a:spLocks noGrp="1"/>
           </p:cNvSpPr>
@@ -801,49 +704,43 @@
           <a:p>
             <a:pPr lvl="0"/>
             <a:r>
-              <a:rPr lang="zh-CN" altLang="en-US"/>
-              <a:t>单击此处编辑母版文本样式</a:t>
+              <a:rPr lang="en-US"/>
+              <a:t>Click to edit Master text styles</a:t>
             </a:r>
           </a:p>
           <a:p>
             <a:pPr lvl="1"/>
             <a:r>
-              <a:rPr lang="zh-CN" altLang="en-US"/>
-              <a:t>二级</a:t>
+              <a:rPr lang="en-US"/>
+              <a:t>Second level</a:t>
             </a:r>
           </a:p>
           <a:p>
             <a:pPr lvl="2"/>
             <a:r>
-              <a:rPr lang="zh-CN" altLang="en-US"/>
-              <a:t>三级</a:t>
+              <a:rPr lang="en-US"/>
+              <a:t>Third level</a:t>
             </a:r>
           </a:p>
           <a:p>
             <a:pPr lvl="3"/>
             <a:r>
-              <a:rPr lang="zh-CN" altLang="en-US"/>
-              <a:t>四级</a:t>
+              <a:rPr lang="en-US"/>
+              <a:t>Fourth level</a:t>
             </a:r>
           </a:p>
           <a:p>
             <a:pPr lvl="4"/>
             <a:r>
-              <a:rPr lang="zh-CN" altLang="en-US"/>
-              <a:t>五级</a:t>
-            </a:r>
-          </a:p>
-        </p:txBody>
-      </p:sp>
-      <p:sp>
-        <p:nvSpPr>
-          <p:cNvPr id="4" name="日期占位符 3">
-            <a:extLst>
-              <a:ext uri="{FF2B5EF4-FFF2-40B4-BE49-F238E27FC236}">
-                <a16:creationId xmlns:a16="http://schemas.microsoft.com/office/drawing/2014/main" id="{362AC28E-3054-4EB5-9C9B-2775408AE85F}"/>
-              </a:ext>
-            </a:extLst>
-          </p:cNvPr>
+              <a:rPr lang="en-US"/>
+              <a:t>Fifth level</a:t>
+            </a:r>
+          </a:p>
+        </p:txBody>
+      </p:sp>
+      <p:sp>
+        <p:nvSpPr>
+          <p:cNvPr id="4" name="Date Placeholder 3"/>
           <p:cNvSpPr>
             <a:spLocks noGrp="1"/>
           </p:cNvSpPr>
@@ -856,23 +753,17 @@
           <a:bodyPr/>
           <a:lstStyle/>
           <a:p>
-            <a:fld id="{488607AE-241E-4541-9A94-40C722101DE2}" type="datetimeFigureOut">
-              <a:rPr lang="zh-CN" altLang="en-US" smtClean="0"/>
-              <a:t>2019/6/27</a:t>
+            <a:fld id="{9ED3734C-ACA2-CD44-9419-3EA4E9A728CC}" type="datetimeFigureOut">
+              <a:rPr lang="en-US" smtClean="0"/>
+              <a:t>12/5/2019</a:t>
             </a:fld>
-            <a:endParaRPr lang="zh-CN" altLang="en-US"/>
-          </a:p>
-        </p:txBody>
-      </p:sp>
-      <p:sp>
-        <p:nvSpPr>
-          <p:cNvPr id="5" name="页脚占位符 4">
-            <a:extLst>
-              <a:ext uri="{FF2B5EF4-FFF2-40B4-BE49-F238E27FC236}">
-                <a16:creationId xmlns:a16="http://schemas.microsoft.com/office/drawing/2014/main" id="{3C806D0D-EF2C-4485-BA8B-569B2044C9C0}"/>
-              </a:ext>
-            </a:extLst>
-          </p:cNvPr>
+            <a:endParaRPr lang="en-US"/>
+          </a:p>
+        </p:txBody>
+      </p:sp>
+      <p:sp>
+        <p:nvSpPr>
+          <p:cNvPr id="5" name="Footer Placeholder 4"/>
           <p:cNvSpPr>
             <a:spLocks noGrp="1"/>
           </p:cNvSpPr>
@@ -885,19 +776,13 @@
           <a:bodyPr/>
           <a:lstStyle/>
           <a:p>
-            <a:endParaRPr lang="zh-CN" altLang="en-US"/>
-          </a:p>
-        </p:txBody>
-      </p:sp>
-      <p:sp>
-        <p:nvSpPr>
-          <p:cNvPr id="6" name="灯片编号占位符 5">
-            <a:extLst>
-              <a:ext uri="{FF2B5EF4-FFF2-40B4-BE49-F238E27FC236}">
-                <a16:creationId xmlns:a16="http://schemas.microsoft.com/office/drawing/2014/main" id="{85EF0BF0-0B18-4976-9DE3-3B3FEB358D8C}"/>
-              </a:ext>
-            </a:extLst>
-          </p:cNvPr>
+            <a:endParaRPr lang="en-US"/>
+          </a:p>
+        </p:txBody>
+      </p:sp>
+      <p:sp>
+        <p:nvSpPr>
+          <p:cNvPr id="6" name="Slide Number Placeholder 5"/>
           <p:cNvSpPr>
             <a:spLocks noGrp="1"/>
           </p:cNvSpPr>
@@ -910,18 +795,18 @@
           <a:bodyPr/>
           <a:lstStyle/>
           <a:p>
-            <a:fld id="{7673EE0C-0863-498C-9054-DB8CCFC87F4C}" type="slidenum">
-              <a:rPr lang="zh-CN" altLang="en-US" smtClean="0"/>
+            <a:fld id="{1F412440-1B23-604B-B178-CB159C9EC6EA}" type="slidenum">
+              <a:rPr lang="en-US" smtClean="0"/>
               <a:t>‹#›</a:t>
             </a:fld>
-            <a:endParaRPr lang="zh-CN" altLang="en-US"/>
+            <a:endParaRPr lang="en-US"/>
           </a:p>
         </p:txBody>
       </p:sp>
     </p:spTree>
     <p:extLst>
       <p:ext uri="{BB962C8B-B14F-4D97-AF65-F5344CB8AC3E}">
-        <p14:creationId xmlns:p14="http://schemas.microsoft.com/office/powerpoint/2010/main" val="3664822978"/>
+        <p14:creationId xmlns:p14="http://schemas.microsoft.com/office/powerpoint/2010/main" val="1381078159"/>
       </p:ext>
     </p:extLst>
   </p:cSld>
@@ -933,7 +818,7 @@
 
 <file path=ppt/slideLayouts/slideLayout3.xml><?xml version="1.0" encoding="utf-8"?>
 <p:sldLayout xmlns:a="http://schemas.openxmlformats.org/drawingml/2006/main" xmlns:r="http://schemas.openxmlformats.org/officeDocument/2006/relationships" xmlns:p="http://schemas.openxmlformats.org/presentationml/2006/main" type="secHead" preserve="1">
-  <p:cSld name="节标题">
+  <p:cSld name="Section Header">
     <p:spTree>
       <p:nvGrpSpPr>
         <p:cNvPr id="1" name=""/>
@@ -950,13 +835,7 @@
       </p:grpSpPr>
       <p:sp>
         <p:nvSpPr>
-          <p:cNvPr id="2" name="标题 1">
-            <a:extLst>
-              <a:ext uri="{FF2B5EF4-FFF2-40B4-BE49-F238E27FC236}">
-                <a16:creationId xmlns:a16="http://schemas.microsoft.com/office/drawing/2014/main" id="{959E0B99-83E0-4AE9-8103-6C4F39AD7EC6}"/>
-              </a:ext>
-            </a:extLst>
-          </p:cNvPr>
+          <p:cNvPr id="2" name="Title 1"/>
           <p:cNvSpPr>
             <a:spLocks noGrp="1"/>
           </p:cNvSpPr>
@@ -979,21 +858,15 @@
           </a:lstStyle>
           <a:p>
             <a:r>
-              <a:rPr lang="zh-CN" altLang="en-US"/>
-              <a:t>单击此处编辑母版标题样式</a:t>
-            </a:r>
-          </a:p>
-        </p:txBody>
-      </p:sp>
-      <p:sp>
-        <p:nvSpPr>
-          <p:cNvPr id="3" name="文本占位符 2">
-            <a:extLst>
-              <a:ext uri="{FF2B5EF4-FFF2-40B4-BE49-F238E27FC236}">
-                <a16:creationId xmlns:a16="http://schemas.microsoft.com/office/drawing/2014/main" id="{1BFB71F3-927C-4A83-9643-5356F61B284B}"/>
-              </a:ext>
-            </a:extLst>
-          </p:cNvPr>
+              <a:rPr lang="en-US"/>
+              <a:t>Click to edit Master title style</a:t>
+            </a:r>
+          </a:p>
+        </p:txBody>
+      </p:sp>
+      <p:sp>
+        <p:nvSpPr>
+          <p:cNvPr id="3" name="Text Placeholder 2"/>
           <p:cNvSpPr>
             <a:spLocks noGrp="1"/>
           </p:cNvSpPr>
@@ -1104,21 +977,15 @@
           <a:p>
             <a:pPr lvl="0"/>
             <a:r>
-              <a:rPr lang="zh-CN" altLang="en-US"/>
-              <a:t>单击此处编辑母版文本样式</a:t>
-            </a:r>
-          </a:p>
-        </p:txBody>
-      </p:sp>
-      <p:sp>
-        <p:nvSpPr>
-          <p:cNvPr id="4" name="日期占位符 3">
-            <a:extLst>
-              <a:ext uri="{FF2B5EF4-FFF2-40B4-BE49-F238E27FC236}">
-                <a16:creationId xmlns:a16="http://schemas.microsoft.com/office/drawing/2014/main" id="{7169643B-C09C-4627-9E70-E410C8232114}"/>
-              </a:ext>
-            </a:extLst>
-          </p:cNvPr>
+              <a:rPr lang="en-US"/>
+              <a:t>Click to edit Master text styles</a:t>
+            </a:r>
+          </a:p>
+        </p:txBody>
+      </p:sp>
+      <p:sp>
+        <p:nvSpPr>
+          <p:cNvPr id="4" name="Date Placeholder 3"/>
           <p:cNvSpPr>
             <a:spLocks noGrp="1"/>
           </p:cNvSpPr>
@@ -1131,23 +998,17 @@
           <a:bodyPr/>
           <a:lstStyle/>
           <a:p>
-            <a:fld id="{488607AE-241E-4541-9A94-40C722101DE2}" type="datetimeFigureOut">
-              <a:rPr lang="zh-CN" altLang="en-US" smtClean="0"/>
-              <a:t>2019/6/27</a:t>
+            <a:fld id="{9ED3734C-ACA2-CD44-9419-3EA4E9A728CC}" type="datetimeFigureOut">
+              <a:rPr lang="en-US" smtClean="0"/>
+              <a:t>12/5/2019</a:t>
             </a:fld>
-            <a:endParaRPr lang="zh-CN" altLang="en-US"/>
-          </a:p>
-        </p:txBody>
-      </p:sp>
-      <p:sp>
-        <p:nvSpPr>
-          <p:cNvPr id="5" name="页脚占位符 4">
-            <a:extLst>
-              <a:ext uri="{FF2B5EF4-FFF2-40B4-BE49-F238E27FC236}">
-                <a16:creationId xmlns:a16="http://schemas.microsoft.com/office/drawing/2014/main" id="{677DBE73-F4E8-44E0-85E6-8594492A7C29}"/>
-              </a:ext>
-            </a:extLst>
-          </p:cNvPr>
+            <a:endParaRPr lang="en-US"/>
+          </a:p>
+        </p:txBody>
+      </p:sp>
+      <p:sp>
+        <p:nvSpPr>
+          <p:cNvPr id="5" name="Footer Placeholder 4"/>
           <p:cNvSpPr>
             <a:spLocks noGrp="1"/>
           </p:cNvSpPr>
@@ -1160,19 +1021,13 @@
           <a:bodyPr/>
           <a:lstStyle/>
           <a:p>
-            <a:endParaRPr lang="zh-CN" altLang="en-US"/>
-          </a:p>
-        </p:txBody>
-      </p:sp>
-      <p:sp>
-        <p:nvSpPr>
-          <p:cNvPr id="6" name="灯片编号占位符 5">
-            <a:extLst>
-              <a:ext uri="{FF2B5EF4-FFF2-40B4-BE49-F238E27FC236}">
-                <a16:creationId xmlns:a16="http://schemas.microsoft.com/office/drawing/2014/main" id="{B9C2310E-0EAC-48B4-9B09-4F5DA4394FF8}"/>
-              </a:ext>
-            </a:extLst>
-          </p:cNvPr>
+            <a:endParaRPr lang="en-US"/>
+          </a:p>
+        </p:txBody>
+      </p:sp>
+      <p:sp>
+        <p:nvSpPr>
+          <p:cNvPr id="6" name="Slide Number Placeholder 5"/>
           <p:cNvSpPr>
             <a:spLocks noGrp="1"/>
           </p:cNvSpPr>
@@ -1185,18 +1040,18 @@
           <a:bodyPr/>
           <a:lstStyle/>
           <a:p>
-            <a:fld id="{7673EE0C-0863-498C-9054-DB8CCFC87F4C}" type="slidenum">
-              <a:rPr lang="zh-CN" altLang="en-US" smtClean="0"/>
+            <a:fld id="{1F412440-1B23-604B-B178-CB159C9EC6EA}" type="slidenum">
+              <a:rPr lang="en-US" smtClean="0"/>
               <a:t>‹#›</a:t>
             </a:fld>
-            <a:endParaRPr lang="zh-CN" altLang="en-US"/>
+            <a:endParaRPr lang="en-US"/>
           </a:p>
         </p:txBody>
       </p:sp>
     </p:spTree>
     <p:extLst>
       <p:ext uri="{BB962C8B-B14F-4D97-AF65-F5344CB8AC3E}">
-        <p14:creationId xmlns:p14="http://schemas.microsoft.com/office/powerpoint/2010/main" val="2143164232"/>
+        <p14:creationId xmlns:p14="http://schemas.microsoft.com/office/powerpoint/2010/main" val="1777361537"/>
       </p:ext>
     </p:extLst>
   </p:cSld>
@@ -1208,7 +1063,7 @@
 
 <file path=ppt/slideLayouts/slideLayout4.xml><?xml version="1.0" encoding="utf-8"?>
 <p:sldLayout xmlns:a="http://schemas.openxmlformats.org/drawingml/2006/main" xmlns:r="http://schemas.openxmlformats.org/officeDocument/2006/relationships" xmlns:p="http://schemas.openxmlformats.org/presentationml/2006/main" type="twoObj" preserve="1">
-  <p:cSld name="两栏内容">
+  <p:cSld name="Two Content">
     <p:spTree>
       <p:nvGrpSpPr>
         <p:cNvPr id="1" name=""/>
@@ -1225,13 +1080,7 @@
       </p:grpSpPr>
       <p:sp>
         <p:nvSpPr>
-          <p:cNvPr id="2" name="标题 1">
-            <a:extLst>
-              <a:ext uri="{FF2B5EF4-FFF2-40B4-BE49-F238E27FC236}">
-                <a16:creationId xmlns:a16="http://schemas.microsoft.com/office/drawing/2014/main" id="{33EB559B-B464-4960-97B2-A3D6DE11759E}"/>
-              </a:ext>
-            </a:extLst>
-          </p:cNvPr>
+          <p:cNvPr id="2" name="Title 1"/>
           <p:cNvSpPr>
             <a:spLocks noGrp="1"/>
           </p:cNvSpPr>
@@ -1245,21 +1094,15 @@
           <a:lstStyle/>
           <a:p>
             <a:r>
-              <a:rPr lang="zh-CN" altLang="en-US"/>
-              <a:t>单击此处编辑母版标题样式</a:t>
-            </a:r>
-          </a:p>
-        </p:txBody>
-      </p:sp>
-      <p:sp>
-        <p:nvSpPr>
-          <p:cNvPr id="3" name="内容占位符 2">
-            <a:extLst>
-              <a:ext uri="{FF2B5EF4-FFF2-40B4-BE49-F238E27FC236}">
-                <a16:creationId xmlns:a16="http://schemas.microsoft.com/office/drawing/2014/main" id="{84EB285A-1A1B-42BC-B6A3-3044E86753A4}"/>
-              </a:ext>
-            </a:extLst>
-          </p:cNvPr>
+              <a:rPr lang="en-US"/>
+              <a:t>Click to edit Master title style</a:t>
+            </a:r>
+          </a:p>
+        </p:txBody>
+      </p:sp>
+      <p:sp>
+        <p:nvSpPr>
+          <p:cNvPr id="3" name="Content Placeholder 2"/>
           <p:cNvSpPr>
             <a:spLocks noGrp="1"/>
           </p:cNvSpPr>
@@ -1279,49 +1122,43 @@
           <a:p>
             <a:pPr lvl="0"/>
             <a:r>
-              <a:rPr lang="zh-CN" altLang="en-US"/>
-              <a:t>单击此处编辑母版文本样式</a:t>
+              <a:rPr lang="en-US"/>
+              <a:t>Click to edit Master text styles</a:t>
             </a:r>
           </a:p>
           <a:p>
             <a:pPr lvl="1"/>
             <a:r>
-              <a:rPr lang="zh-CN" altLang="en-US"/>
-              <a:t>二级</a:t>
+              <a:rPr lang="en-US"/>
+              <a:t>Second level</a:t>
             </a:r>
           </a:p>
           <a:p>
             <a:pPr lvl="2"/>
             <a:r>
-              <a:rPr lang="zh-CN" altLang="en-US"/>
-              <a:t>三级</a:t>
+              <a:rPr lang="en-US"/>
+              <a:t>Third level</a:t>
             </a:r>
           </a:p>
           <a:p>
             <a:pPr lvl="3"/>
             <a:r>
-              <a:rPr lang="zh-CN" altLang="en-US"/>
-              <a:t>四级</a:t>
+              <a:rPr lang="en-US"/>
+              <a:t>Fourth level</a:t>
             </a:r>
           </a:p>
           <a:p>
             <a:pPr lvl="4"/>
             <a:r>
-              <a:rPr lang="zh-CN" altLang="en-US"/>
-              <a:t>五级</a:t>
-            </a:r>
-          </a:p>
-        </p:txBody>
-      </p:sp>
-      <p:sp>
-        <p:nvSpPr>
-          <p:cNvPr id="4" name="内容占位符 3">
-            <a:extLst>
-              <a:ext uri="{FF2B5EF4-FFF2-40B4-BE49-F238E27FC236}">
-                <a16:creationId xmlns:a16="http://schemas.microsoft.com/office/drawing/2014/main" id="{84DD7182-3EB6-42C3-8751-45D001CA0E69}"/>
-              </a:ext>
-            </a:extLst>
-          </p:cNvPr>
+              <a:rPr lang="en-US"/>
+              <a:t>Fifth level</a:t>
+            </a:r>
+          </a:p>
+        </p:txBody>
+      </p:sp>
+      <p:sp>
+        <p:nvSpPr>
+          <p:cNvPr id="4" name="Content Placeholder 3"/>
           <p:cNvSpPr>
             <a:spLocks noGrp="1"/>
           </p:cNvSpPr>
@@ -1341,49 +1178,43 @@
           <a:p>
             <a:pPr lvl="0"/>
             <a:r>
-              <a:rPr lang="zh-CN" altLang="en-US"/>
-              <a:t>单击此处编辑母版文本样式</a:t>
+              <a:rPr lang="en-US"/>
+              <a:t>Click to edit Master text styles</a:t>
             </a:r>
           </a:p>
           <a:p>
             <a:pPr lvl="1"/>
             <a:r>
-              <a:rPr lang="zh-CN" altLang="en-US"/>
-              <a:t>二级</a:t>
+              <a:rPr lang="en-US"/>
+              <a:t>Second level</a:t>
             </a:r>
           </a:p>
           <a:p>
             <a:pPr lvl="2"/>
             <a:r>
-              <a:rPr lang="zh-CN" altLang="en-US"/>
-              <a:t>三级</a:t>
+              <a:rPr lang="en-US"/>
+              <a:t>Third level</a:t>
             </a:r>
           </a:p>
           <a:p>
             <a:pPr lvl="3"/>
             <a:r>
-              <a:rPr lang="zh-CN" altLang="en-US"/>
-              <a:t>四级</a:t>
+              <a:rPr lang="en-US"/>
+              <a:t>Fourth level</a:t>
             </a:r>
           </a:p>
           <a:p>
             <a:pPr lvl="4"/>
             <a:r>
-              <a:rPr lang="zh-CN" altLang="en-US"/>
-              <a:t>五级</a:t>
-            </a:r>
-          </a:p>
-        </p:txBody>
-      </p:sp>
-      <p:sp>
-        <p:nvSpPr>
-          <p:cNvPr id="5" name="日期占位符 4">
-            <a:extLst>
-              <a:ext uri="{FF2B5EF4-FFF2-40B4-BE49-F238E27FC236}">
-                <a16:creationId xmlns:a16="http://schemas.microsoft.com/office/drawing/2014/main" id="{8C5E1537-4603-4812-8D28-CECDA6FEFCE9}"/>
-              </a:ext>
-            </a:extLst>
-          </p:cNvPr>
+              <a:rPr lang="en-US"/>
+              <a:t>Fifth level</a:t>
+            </a:r>
+          </a:p>
+        </p:txBody>
+      </p:sp>
+      <p:sp>
+        <p:nvSpPr>
+          <p:cNvPr id="5" name="Date Placeholder 4"/>
           <p:cNvSpPr>
             <a:spLocks noGrp="1"/>
           </p:cNvSpPr>
@@ -1396,23 +1227,17 @@
           <a:bodyPr/>
           <a:lstStyle/>
           <a:p>
-            <a:fld id="{488607AE-241E-4541-9A94-40C722101DE2}" type="datetimeFigureOut">
-              <a:rPr lang="zh-CN" altLang="en-US" smtClean="0"/>
-              <a:t>2019/6/27</a:t>
+            <a:fld id="{9ED3734C-ACA2-CD44-9419-3EA4E9A728CC}" type="datetimeFigureOut">
+              <a:rPr lang="en-US" smtClean="0"/>
+              <a:t>12/5/2019</a:t>
             </a:fld>
-            <a:endParaRPr lang="zh-CN" altLang="en-US"/>
-          </a:p>
-        </p:txBody>
-      </p:sp>
-      <p:sp>
-        <p:nvSpPr>
-          <p:cNvPr id="6" name="页脚占位符 5">
-            <a:extLst>
-              <a:ext uri="{FF2B5EF4-FFF2-40B4-BE49-F238E27FC236}">
-                <a16:creationId xmlns:a16="http://schemas.microsoft.com/office/drawing/2014/main" id="{B32E3E13-B791-4266-8D7F-74E98A441083}"/>
-              </a:ext>
-            </a:extLst>
-          </p:cNvPr>
+            <a:endParaRPr lang="en-US"/>
+          </a:p>
+        </p:txBody>
+      </p:sp>
+      <p:sp>
+        <p:nvSpPr>
+          <p:cNvPr id="6" name="Footer Placeholder 5"/>
           <p:cNvSpPr>
             <a:spLocks noGrp="1"/>
           </p:cNvSpPr>
@@ -1425,19 +1250,13 @@
           <a:bodyPr/>
           <a:lstStyle/>
           <a:p>
-            <a:endParaRPr lang="zh-CN" altLang="en-US"/>
-          </a:p>
-        </p:txBody>
-      </p:sp>
-      <p:sp>
-        <p:nvSpPr>
-          <p:cNvPr id="7" name="灯片编号占位符 6">
-            <a:extLst>
-              <a:ext uri="{FF2B5EF4-FFF2-40B4-BE49-F238E27FC236}">
-                <a16:creationId xmlns:a16="http://schemas.microsoft.com/office/drawing/2014/main" id="{AB1AEA81-91A1-465B-8AAA-2FD5DCB56DB5}"/>
-              </a:ext>
-            </a:extLst>
-          </p:cNvPr>
+            <a:endParaRPr lang="en-US"/>
+          </a:p>
+        </p:txBody>
+      </p:sp>
+      <p:sp>
+        <p:nvSpPr>
+          <p:cNvPr id="7" name="Slide Number Placeholder 6"/>
           <p:cNvSpPr>
             <a:spLocks noGrp="1"/>
           </p:cNvSpPr>
@@ -1450,18 +1269,18 @@
           <a:bodyPr/>
           <a:lstStyle/>
           <a:p>
-            <a:fld id="{7673EE0C-0863-498C-9054-DB8CCFC87F4C}" type="slidenum">
-              <a:rPr lang="zh-CN" altLang="en-US" smtClean="0"/>
+            <a:fld id="{1F412440-1B23-604B-B178-CB159C9EC6EA}" type="slidenum">
+              <a:rPr lang="en-US" smtClean="0"/>
               <a:t>‹#›</a:t>
             </a:fld>
-            <a:endParaRPr lang="zh-CN" altLang="en-US"/>
+            <a:endParaRPr lang="en-US"/>
           </a:p>
         </p:txBody>
       </p:sp>
     </p:spTree>
     <p:extLst>
       <p:ext uri="{BB962C8B-B14F-4D97-AF65-F5344CB8AC3E}">
-        <p14:creationId xmlns:p14="http://schemas.microsoft.com/office/powerpoint/2010/main" val="283675285"/>
+        <p14:creationId xmlns:p14="http://schemas.microsoft.com/office/powerpoint/2010/main" val="617822589"/>
       </p:ext>
     </p:extLst>
   </p:cSld>
@@ -1473,7 +1292,7 @@
 
 <file path=ppt/slideLayouts/slideLayout5.xml><?xml version="1.0" encoding="utf-8"?>
 <p:sldLayout xmlns:a="http://schemas.openxmlformats.org/drawingml/2006/main" xmlns:r="http://schemas.openxmlformats.org/officeDocument/2006/relationships" xmlns:p="http://schemas.openxmlformats.org/presentationml/2006/main" type="twoTxTwoObj" preserve="1">
-  <p:cSld name="比较">
+  <p:cSld name="Comparison">
     <p:spTree>
       <p:nvGrpSpPr>
         <p:cNvPr id="1" name=""/>
@@ -1490,13 +1309,7 @@
       </p:grpSpPr>
       <p:sp>
         <p:nvSpPr>
-          <p:cNvPr id="2" name="标题 1">
-            <a:extLst>
-              <a:ext uri="{FF2B5EF4-FFF2-40B4-BE49-F238E27FC236}">
-                <a16:creationId xmlns:a16="http://schemas.microsoft.com/office/drawing/2014/main" id="{5A16154C-DE6B-45C3-8B51-0019DCB42412}"/>
-              </a:ext>
-            </a:extLst>
-          </p:cNvPr>
+          <p:cNvPr id="2" name="Title 1"/>
           <p:cNvSpPr>
             <a:spLocks noGrp="1"/>
           </p:cNvSpPr>
@@ -1515,21 +1328,15 @@
           <a:lstStyle/>
           <a:p>
             <a:r>
-              <a:rPr lang="zh-CN" altLang="en-US"/>
-              <a:t>单击此处编辑母版标题样式</a:t>
-            </a:r>
-          </a:p>
-        </p:txBody>
-      </p:sp>
-      <p:sp>
-        <p:nvSpPr>
-          <p:cNvPr id="3" name="文本占位符 2">
-            <a:extLst>
-              <a:ext uri="{FF2B5EF4-FFF2-40B4-BE49-F238E27FC236}">
-                <a16:creationId xmlns:a16="http://schemas.microsoft.com/office/drawing/2014/main" id="{F553BC3D-C6B9-4198-8428-55E496410D74}"/>
-              </a:ext>
-            </a:extLst>
-          </p:cNvPr>
+              <a:rPr lang="en-US"/>
+              <a:t>Click to edit Master title style</a:t>
+            </a:r>
+          </a:p>
+        </p:txBody>
+      </p:sp>
+      <p:sp>
+        <p:nvSpPr>
+          <p:cNvPr id="3" name="Text Placeholder 2"/>
           <p:cNvSpPr>
             <a:spLocks noGrp="1"/>
           </p:cNvSpPr>
@@ -1586,21 +1393,15 @@
           <a:p>
             <a:pPr lvl="0"/>
             <a:r>
-              <a:rPr lang="zh-CN" altLang="en-US"/>
-              <a:t>单击此处编辑母版文本样式</a:t>
-            </a:r>
-          </a:p>
-        </p:txBody>
-      </p:sp>
-      <p:sp>
-        <p:nvSpPr>
-          <p:cNvPr id="4" name="内容占位符 3">
-            <a:extLst>
-              <a:ext uri="{FF2B5EF4-FFF2-40B4-BE49-F238E27FC236}">
-                <a16:creationId xmlns:a16="http://schemas.microsoft.com/office/drawing/2014/main" id="{D55D7306-B8AA-463D-ABF2-6B8A04E87C71}"/>
-              </a:ext>
-            </a:extLst>
-          </p:cNvPr>
+              <a:rPr lang="en-US"/>
+              <a:t>Click to edit Master text styles</a:t>
+            </a:r>
+          </a:p>
+        </p:txBody>
+      </p:sp>
+      <p:sp>
+        <p:nvSpPr>
+          <p:cNvPr id="4" name="Content Placeholder 3"/>
           <p:cNvSpPr>
             <a:spLocks noGrp="1"/>
           </p:cNvSpPr>
@@ -1620,49 +1421,43 @@
           <a:p>
             <a:pPr lvl="0"/>
             <a:r>
-              <a:rPr lang="zh-CN" altLang="en-US"/>
-              <a:t>单击此处编辑母版文本样式</a:t>
+              <a:rPr lang="en-US"/>
+              <a:t>Click to edit Master text styles</a:t>
             </a:r>
           </a:p>
           <a:p>
             <a:pPr lvl="1"/>
             <a:r>
-              <a:rPr lang="zh-CN" altLang="en-US"/>
-              <a:t>二级</a:t>
+              <a:rPr lang="en-US"/>
+              <a:t>Second level</a:t>
             </a:r>
           </a:p>
           <a:p>
             <a:pPr lvl="2"/>
             <a:r>
-              <a:rPr lang="zh-CN" altLang="en-US"/>
-              <a:t>三级</a:t>
+              <a:rPr lang="en-US"/>
+              <a:t>Third level</a:t>
             </a:r>
           </a:p>
           <a:p>
             <a:pPr lvl="3"/>
             <a:r>
-              <a:rPr lang="zh-CN" altLang="en-US"/>
-              <a:t>四级</a:t>
+              <a:rPr lang="en-US"/>
+              <a:t>Fourth level</a:t>
             </a:r>
           </a:p>
           <a:p>
             <a:pPr lvl="4"/>
             <a:r>
-              <a:rPr lang="zh-CN" altLang="en-US"/>
-              <a:t>五级</a:t>
-            </a:r>
-          </a:p>
-        </p:txBody>
-      </p:sp>
-      <p:sp>
-        <p:nvSpPr>
-          <p:cNvPr id="5" name="文本占位符 4">
-            <a:extLst>
-              <a:ext uri="{FF2B5EF4-FFF2-40B4-BE49-F238E27FC236}">
-                <a16:creationId xmlns:a16="http://schemas.microsoft.com/office/drawing/2014/main" id="{429A6106-10D3-449C-B11C-1B3DE367EDAD}"/>
-              </a:ext>
-            </a:extLst>
-          </p:cNvPr>
+              <a:rPr lang="en-US"/>
+              <a:t>Fifth level</a:t>
+            </a:r>
+          </a:p>
+        </p:txBody>
+      </p:sp>
+      <p:sp>
+        <p:nvSpPr>
+          <p:cNvPr id="5" name="Text Placeholder 4"/>
           <p:cNvSpPr>
             <a:spLocks noGrp="1"/>
           </p:cNvSpPr>
@@ -1719,21 +1514,15 @@
           <a:p>
             <a:pPr lvl="0"/>
             <a:r>
-              <a:rPr lang="zh-CN" altLang="en-US"/>
-              <a:t>单击此处编辑母版文本样式</a:t>
-            </a:r>
-          </a:p>
-        </p:txBody>
-      </p:sp>
-      <p:sp>
-        <p:nvSpPr>
-          <p:cNvPr id="6" name="内容占位符 5">
-            <a:extLst>
-              <a:ext uri="{FF2B5EF4-FFF2-40B4-BE49-F238E27FC236}">
-                <a16:creationId xmlns:a16="http://schemas.microsoft.com/office/drawing/2014/main" id="{8EE846C3-E1A7-41F7-A16B-A748FA8AF438}"/>
-              </a:ext>
-            </a:extLst>
-          </p:cNvPr>
+              <a:rPr lang="en-US"/>
+              <a:t>Click to edit Master text styles</a:t>
+            </a:r>
+          </a:p>
+        </p:txBody>
+      </p:sp>
+      <p:sp>
+        <p:nvSpPr>
+          <p:cNvPr id="6" name="Content Placeholder 5"/>
           <p:cNvSpPr>
             <a:spLocks noGrp="1"/>
           </p:cNvSpPr>
@@ -1753,49 +1542,43 @@
           <a:p>
             <a:pPr lvl="0"/>
             <a:r>
-              <a:rPr lang="zh-CN" altLang="en-US"/>
-              <a:t>单击此处编辑母版文本样式</a:t>
+              <a:rPr lang="en-US"/>
+              <a:t>Click to edit Master text styles</a:t>
             </a:r>
           </a:p>
           <a:p>
             <a:pPr lvl="1"/>
             <a:r>
-              <a:rPr lang="zh-CN" altLang="en-US"/>
-              <a:t>二级</a:t>
+              <a:rPr lang="en-US"/>
+              <a:t>Second level</a:t>
             </a:r>
           </a:p>
           <a:p>
             <a:pPr lvl="2"/>
             <a:r>
-              <a:rPr lang="zh-CN" altLang="en-US"/>
-              <a:t>三级</a:t>
+              <a:rPr lang="en-US"/>
+              <a:t>Third level</a:t>
             </a:r>
           </a:p>
           <a:p>
             <a:pPr lvl="3"/>
             <a:r>
-              <a:rPr lang="zh-CN" altLang="en-US"/>
-              <a:t>四级</a:t>
+              <a:rPr lang="en-US"/>
+              <a:t>Fourth level</a:t>
             </a:r>
           </a:p>
           <a:p>
             <a:pPr lvl="4"/>
             <a:r>
-              <a:rPr lang="zh-CN" altLang="en-US"/>
-              <a:t>五级</a:t>
-            </a:r>
-          </a:p>
-        </p:txBody>
-      </p:sp>
-      <p:sp>
-        <p:nvSpPr>
-          <p:cNvPr id="7" name="日期占位符 6">
-            <a:extLst>
-              <a:ext uri="{FF2B5EF4-FFF2-40B4-BE49-F238E27FC236}">
-                <a16:creationId xmlns:a16="http://schemas.microsoft.com/office/drawing/2014/main" id="{47B93BB4-43B7-4994-B393-E96C41D52BF1}"/>
-              </a:ext>
-            </a:extLst>
-          </p:cNvPr>
+              <a:rPr lang="en-US"/>
+              <a:t>Fifth level</a:t>
+            </a:r>
+          </a:p>
+        </p:txBody>
+      </p:sp>
+      <p:sp>
+        <p:nvSpPr>
+          <p:cNvPr id="7" name="Date Placeholder 6"/>
           <p:cNvSpPr>
             <a:spLocks noGrp="1"/>
           </p:cNvSpPr>
@@ -1808,23 +1591,17 @@
           <a:bodyPr/>
           <a:lstStyle/>
           <a:p>
-            <a:fld id="{488607AE-241E-4541-9A94-40C722101DE2}" type="datetimeFigureOut">
-              <a:rPr lang="zh-CN" altLang="en-US" smtClean="0"/>
-              <a:t>2019/6/27</a:t>
+            <a:fld id="{9ED3734C-ACA2-CD44-9419-3EA4E9A728CC}" type="datetimeFigureOut">
+              <a:rPr lang="en-US" smtClean="0"/>
+              <a:t>12/5/2019</a:t>
             </a:fld>
-            <a:endParaRPr lang="zh-CN" altLang="en-US"/>
-          </a:p>
-        </p:txBody>
-      </p:sp>
-      <p:sp>
-        <p:nvSpPr>
-          <p:cNvPr id="8" name="页脚占位符 7">
-            <a:extLst>
-              <a:ext uri="{FF2B5EF4-FFF2-40B4-BE49-F238E27FC236}">
-                <a16:creationId xmlns:a16="http://schemas.microsoft.com/office/drawing/2014/main" id="{6712D3D2-2017-4C85-AAB3-53E39B4ACE6C}"/>
-              </a:ext>
-            </a:extLst>
-          </p:cNvPr>
+            <a:endParaRPr lang="en-US"/>
+          </a:p>
+        </p:txBody>
+      </p:sp>
+      <p:sp>
+        <p:nvSpPr>
+          <p:cNvPr id="8" name="Footer Placeholder 7"/>
           <p:cNvSpPr>
             <a:spLocks noGrp="1"/>
           </p:cNvSpPr>
@@ -1837,19 +1614,13 @@
           <a:bodyPr/>
           <a:lstStyle/>
           <a:p>
-            <a:endParaRPr lang="zh-CN" altLang="en-US"/>
-          </a:p>
-        </p:txBody>
-      </p:sp>
-      <p:sp>
-        <p:nvSpPr>
-          <p:cNvPr id="9" name="灯片编号占位符 8">
-            <a:extLst>
-              <a:ext uri="{FF2B5EF4-FFF2-40B4-BE49-F238E27FC236}">
-                <a16:creationId xmlns:a16="http://schemas.microsoft.com/office/drawing/2014/main" id="{DB8B9B62-4692-4D0F-AED0-598E7B179323}"/>
-              </a:ext>
-            </a:extLst>
-          </p:cNvPr>
+            <a:endParaRPr lang="en-US"/>
+          </a:p>
+        </p:txBody>
+      </p:sp>
+      <p:sp>
+        <p:nvSpPr>
+          <p:cNvPr id="9" name="Slide Number Placeholder 8"/>
           <p:cNvSpPr>
             <a:spLocks noGrp="1"/>
           </p:cNvSpPr>
@@ -1862,18 +1633,18 @@
           <a:bodyPr/>
           <a:lstStyle/>
           <a:p>
-            <a:fld id="{7673EE0C-0863-498C-9054-DB8CCFC87F4C}" type="slidenum">
-              <a:rPr lang="zh-CN" altLang="en-US" smtClean="0"/>
+            <a:fld id="{1F412440-1B23-604B-B178-CB159C9EC6EA}" type="slidenum">
+              <a:rPr lang="en-US" smtClean="0"/>
               <a:t>‹#›</a:t>
             </a:fld>
-            <a:endParaRPr lang="zh-CN" altLang="en-US"/>
+            <a:endParaRPr lang="en-US"/>
           </a:p>
         </p:txBody>
       </p:sp>
     </p:spTree>
     <p:extLst>
       <p:ext uri="{BB962C8B-B14F-4D97-AF65-F5344CB8AC3E}">
-        <p14:creationId xmlns:p14="http://schemas.microsoft.com/office/powerpoint/2010/main" val="622414609"/>
+        <p14:creationId xmlns:p14="http://schemas.microsoft.com/office/powerpoint/2010/main" val="660820078"/>
       </p:ext>
     </p:extLst>
   </p:cSld>
@@ -1885,7 +1656,7 @@
 
 <file path=ppt/slideLayouts/slideLayout6.xml><?xml version="1.0" encoding="utf-8"?>
 <p:sldLayout xmlns:a="http://schemas.openxmlformats.org/drawingml/2006/main" xmlns:r="http://schemas.openxmlformats.org/officeDocument/2006/relationships" xmlns:p="http://schemas.openxmlformats.org/presentationml/2006/main" type="titleOnly" preserve="1">
-  <p:cSld name="仅标题">
+  <p:cSld name="Title Only">
     <p:spTree>
       <p:nvGrpSpPr>
         <p:cNvPr id="1" name=""/>
@@ -1902,13 +1673,7 @@
       </p:grpSpPr>
       <p:sp>
         <p:nvSpPr>
-          <p:cNvPr id="2" name="标题 1">
-            <a:extLst>
-              <a:ext uri="{FF2B5EF4-FFF2-40B4-BE49-F238E27FC236}">
-                <a16:creationId xmlns:a16="http://schemas.microsoft.com/office/drawing/2014/main" id="{79B3E16C-98CB-4547-A8E8-2B30BB6A149C}"/>
-              </a:ext>
-            </a:extLst>
-          </p:cNvPr>
+          <p:cNvPr id="2" name="Title 1"/>
           <p:cNvSpPr>
             <a:spLocks noGrp="1"/>
           </p:cNvSpPr>
@@ -1922,21 +1687,15 @@
           <a:lstStyle/>
           <a:p>
             <a:r>
-              <a:rPr lang="zh-CN" altLang="en-US"/>
-              <a:t>单击此处编辑母版标题样式</a:t>
-            </a:r>
-          </a:p>
-        </p:txBody>
-      </p:sp>
-      <p:sp>
-        <p:nvSpPr>
-          <p:cNvPr id="3" name="日期占位符 2">
-            <a:extLst>
-              <a:ext uri="{FF2B5EF4-FFF2-40B4-BE49-F238E27FC236}">
-                <a16:creationId xmlns:a16="http://schemas.microsoft.com/office/drawing/2014/main" id="{D075FEB9-43B7-47BA-A36E-0BAC21F24696}"/>
-              </a:ext>
-            </a:extLst>
-          </p:cNvPr>
+              <a:rPr lang="en-US"/>
+              <a:t>Click to edit Master title style</a:t>
+            </a:r>
+          </a:p>
+        </p:txBody>
+      </p:sp>
+      <p:sp>
+        <p:nvSpPr>
+          <p:cNvPr id="3" name="Date Placeholder 2"/>
           <p:cNvSpPr>
             <a:spLocks noGrp="1"/>
           </p:cNvSpPr>
@@ -1949,23 +1708,17 @@
           <a:bodyPr/>
           <a:lstStyle/>
           <a:p>
-            <a:fld id="{488607AE-241E-4541-9A94-40C722101DE2}" type="datetimeFigureOut">
-              <a:rPr lang="zh-CN" altLang="en-US" smtClean="0"/>
-              <a:t>2019/6/27</a:t>
+            <a:fld id="{9ED3734C-ACA2-CD44-9419-3EA4E9A728CC}" type="datetimeFigureOut">
+              <a:rPr lang="en-US" smtClean="0"/>
+              <a:t>12/5/2019</a:t>
             </a:fld>
-            <a:endParaRPr lang="zh-CN" altLang="en-US"/>
-          </a:p>
-        </p:txBody>
-      </p:sp>
-      <p:sp>
-        <p:nvSpPr>
-          <p:cNvPr id="4" name="页脚占位符 3">
-            <a:extLst>
-              <a:ext uri="{FF2B5EF4-FFF2-40B4-BE49-F238E27FC236}">
-                <a16:creationId xmlns:a16="http://schemas.microsoft.com/office/drawing/2014/main" id="{46E47B75-9BA0-415E-842A-1DF7A6CABF20}"/>
-              </a:ext>
-            </a:extLst>
-          </p:cNvPr>
+            <a:endParaRPr lang="en-US"/>
+          </a:p>
+        </p:txBody>
+      </p:sp>
+      <p:sp>
+        <p:nvSpPr>
+          <p:cNvPr id="4" name="Footer Placeholder 3"/>
           <p:cNvSpPr>
             <a:spLocks noGrp="1"/>
           </p:cNvSpPr>
@@ -1978,19 +1731,13 @@
           <a:bodyPr/>
           <a:lstStyle/>
           <a:p>
-            <a:endParaRPr lang="zh-CN" altLang="en-US"/>
-          </a:p>
-        </p:txBody>
-      </p:sp>
-      <p:sp>
-        <p:nvSpPr>
-          <p:cNvPr id="5" name="灯片编号占位符 4">
-            <a:extLst>
-              <a:ext uri="{FF2B5EF4-FFF2-40B4-BE49-F238E27FC236}">
-                <a16:creationId xmlns:a16="http://schemas.microsoft.com/office/drawing/2014/main" id="{D97145D7-24FD-4EF7-A86B-1AE8A4CD7CA2}"/>
-              </a:ext>
-            </a:extLst>
-          </p:cNvPr>
+            <a:endParaRPr lang="en-US"/>
+          </a:p>
+        </p:txBody>
+      </p:sp>
+      <p:sp>
+        <p:nvSpPr>
+          <p:cNvPr id="5" name="Slide Number Placeholder 4"/>
           <p:cNvSpPr>
             <a:spLocks noGrp="1"/>
           </p:cNvSpPr>
@@ -2003,18 +1750,18 @@
           <a:bodyPr/>
           <a:lstStyle/>
           <a:p>
-            <a:fld id="{7673EE0C-0863-498C-9054-DB8CCFC87F4C}" type="slidenum">
-              <a:rPr lang="zh-CN" altLang="en-US" smtClean="0"/>
+            <a:fld id="{1F412440-1B23-604B-B178-CB159C9EC6EA}" type="slidenum">
+              <a:rPr lang="en-US" smtClean="0"/>
               <a:t>‹#›</a:t>
             </a:fld>
-            <a:endParaRPr lang="zh-CN" altLang="en-US"/>
+            <a:endParaRPr lang="en-US"/>
           </a:p>
         </p:txBody>
       </p:sp>
     </p:spTree>
     <p:extLst>
       <p:ext uri="{BB962C8B-B14F-4D97-AF65-F5344CB8AC3E}">
-        <p14:creationId xmlns:p14="http://schemas.microsoft.com/office/powerpoint/2010/main" val="2491300841"/>
+        <p14:creationId xmlns:p14="http://schemas.microsoft.com/office/powerpoint/2010/main" val="1765112309"/>
       </p:ext>
     </p:extLst>
   </p:cSld>
@@ -2026,7 +1773,7 @@
 
 <file path=ppt/slideLayouts/slideLayout7.xml><?xml version="1.0" encoding="utf-8"?>
 <p:sldLayout xmlns:a="http://schemas.openxmlformats.org/drawingml/2006/main" xmlns:r="http://schemas.openxmlformats.org/officeDocument/2006/relationships" xmlns:p="http://schemas.openxmlformats.org/presentationml/2006/main" type="blank" preserve="1">
-  <p:cSld name="空白">
+  <p:cSld name="Blank">
     <p:spTree>
       <p:nvGrpSpPr>
         <p:cNvPr id="1" name=""/>
@@ -2043,13 +1790,7 @@
       </p:grpSpPr>
       <p:sp>
         <p:nvSpPr>
-          <p:cNvPr id="2" name="日期占位符 1">
-            <a:extLst>
-              <a:ext uri="{FF2B5EF4-FFF2-40B4-BE49-F238E27FC236}">
-                <a16:creationId xmlns:a16="http://schemas.microsoft.com/office/drawing/2014/main" id="{A5B4FC42-EA87-43A9-A5B3-E0EA7EB6E42F}"/>
-              </a:ext>
-            </a:extLst>
-          </p:cNvPr>
+          <p:cNvPr id="2" name="Date Placeholder 1"/>
           <p:cNvSpPr>
             <a:spLocks noGrp="1"/>
           </p:cNvSpPr>
@@ -2062,23 +1803,17 @@
           <a:bodyPr/>
           <a:lstStyle/>
           <a:p>
-            <a:fld id="{488607AE-241E-4541-9A94-40C722101DE2}" type="datetimeFigureOut">
-              <a:rPr lang="zh-CN" altLang="en-US" smtClean="0"/>
-              <a:t>2019/6/27</a:t>
+            <a:fld id="{9ED3734C-ACA2-CD44-9419-3EA4E9A728CC}" type="datetimeFigureOut">
+              <a:rPr lang="en-US" smtClean="0"/>
+              <a:t>12/5/2019</a:t>
             </a:fld>
-            <a:endParaRPr lang="zh-CN" altLang="en-US"/>
-          </a:p>
-        </p:txBody>
-      </p:sp>
-      <p:sp>
-        <p:nvSpPr>
-          <p:cNvPr id="3" name="页脚占位符 2">
-            <a:extLst>
-              <a:ext uri="{FF2B5EF4-FFF2-40B4-BE49-F238E27FC236}">
-                <a16:creationId xmlns:a16="http://schemas.microsoft.com/office/drawing/2014/main" id="{9C8F498C-73BF-431F-BF78-2FBD1B41F0BC}"/>
-              </a:ext>
-            </a:extLst>
-          </p:cNvPr>
+            <a:endParaRPr lang="en-US"/>
+          </a:p>
+        </p:txBody>
+      </p:sp>
+      <p:sp>
+        <p:nvSpPr>
+          <p:cNvPr id="3" name="Footer Placeholder 2"/>
           <p:cNvSpPr>
             <a:spLocks noGrp="1"/>
           </p:cNvSpPr>
@@ -2091,19 +1826,13 @@
           <a:bodyPr/>
           <a:lstStyle/>
           <a:p>
-            <a:endParaRPr lang="zh-CN" altLang="en-US"/>
-          </a:p>
-        </p:txBody>
-      </p:sp>
-      <p:sp>
-        <p:nvSpPr>
-          <p:cNvPr id="4" name="灯片编号占位符 3">
-            <a:extLst>
-              <a:ext uri="{FF2B5EF4-FFF2-40B4-BE49-F238E27FC236}">
-                <a16:creationId xmlns:a16="http://schemas.microsoft.com/office/drawing/2014/main" id="{7682BD3E-BD51-40CC-9C45-E9D9D819AA31}"/>
-              </a:ext>
-            </a:extLst>
-          </p:cNvPr>
+            <a:endParaRPr lang="en-US"/>
+          </a:p>
+        </p:txBody>
+      </p:sp>
+      <p:sp>
+        <p:nvSpPr>
+          <p:cNvPr id="4" name="Slide Number Placeholder 3"/>
           <p:cNvSpPr>
             <a:spLocks noGrp="1"/>
           </p:cNvSpPr>
@@ -2116,18 +1845,18 @@
           <a:bodyPr/>
           <a:lstStyle/>
           <a:p>
-            <a:fld id="{7673EE0C-0863-498C-9054-DB8CCFC87F4C}" type="slidenum">
-              <a:rPr lang="zh-CN" altLang="en-US" smtClean="0"/>
+            <a:fld id="{1F412440-1B23-604B-B178-CB159C9EC6EA}" type="slidenum">
+              <a:rPr lang="en-US" smtClean="0"/>
               <a:t>‹#›</a:t>
             </a:fld>
-            <a:endParaRPr lang="zh-CN" altLang="en-US"/>
+            <a:endParaRPr lang="en-US"/>
           </a:p>
         </p:txBody>
       </p:sp>
     </p:spTree>
     <p:extLst>
       <p:ext uri="{BB962C8B-B14F-4D97-AF65-F5344CB8AC3E}">
-        <p14:creationId xmlns:p14="http://schemas.microsoft.com/office/powerpoint/2010/main" val="3867863073"/>
+        <p14:creationId xmlns:p14="http://schemas.microsoft.com/office/powerpoint/2010/main" val="903477705"/>
       </p:ext>
     </p:extLst>
   </p:cSld>
@@ -2139,7 +1868,7 @@
 
 <file path=ppt/slideLayouts/slideLayout8.xml><?xml version="1.0" encoding="utf-8"?>
 <p:sldLayout xmlns:a="http://schemas.openxmlformats.org/drawingml/2006/main" xmlns:r="http://schemas.openxmlformats.org/officeDocument/2006/relationships" xmlns:p="http://schemas.openxmlformats.org/presentationml/2006/main" type="objTx" preserve="1">
-  <p:cSld name="内容与标题">
+  <p:cSld name="Content with Caption">
     <p:spTree>
       <p:nvGrpSpPr>
         <p:cNvPr id="1" name=""/>
@@ -2156,13 +1885,7 @@
       </p:grpSpPr>
       <p:sp>
         <p:nvSpPr>
-          <p:cNvPr id="2" name="标题 1">
-            <a:extLst>
-              <a:ext uri="{FF2B5EF4-FFF2-40B4-BE49-F238E27FC236}">
-                <a16:creationId xmlns:a16="http://schemas.microsoft.com/office/drawing/2014/main" id="{600F5306-FD7F-4A7D-AB28-8F7E352DD415}"/>
-              </a:ext>
-            </a:extLst>
-          </p:cNvPr>
+          <p:cNvPr id="2" name="Title 1"/>
           <p:cNvSpPr>
             <a:spLocks noGrp="1"/>
           </p:cNvSpPr>
@@ -2185,21 +1908,15 @@
           </a:lstStyle>
           <a:p>
             <a:r>
-              <a:rPr lang="zh-CN" altLang="en-US"/>
-              <a:t>单击此处编辑母版标题样式</a:t>
-            </a:r>
-          </a:p>
-        </p:txBody>
-      </p:sp>
-      <p:sp>
-        <p:nvSpPr>
-          <p:cNvPr id="3" name="内容占位符 2">
-            <a:extLst>
-              <a:ext uri="{FF2B5EF4-FFF2-40B4-BE49-F238E27FC236}">
-                <a16:creationId xmlns:a16="http://schemas.microsoft.com/office/drawing/2014/main" id="{99811D2F-F46F-4B13-A18D-43D793816504}"/>
-              </a:ext>
-            </a:extLst>
-          </p:cNvPr>
+              <a:rPr lang="en-US"/>
+              <a:t>Click to edit Master title style</a:t>
+            </a:r>
+          </a:p>
+        </p:txBody>
+      </p:sp>
+      <p:sp>
+        <p:nvSpPr>
+          <p:cNvPr id="3" name="Content Placeholder 2"/>
           <p:cNvSpPr>
             <a:spLocks noGrp="1"/>
           </p:cNvSpPr>
@@ -2247,49 +1964,43 @@
           <a:p>
             <a:pPr lvl="0"/>
             <a:r>
-              <a:rPr lang="zh-CN" altLang="en-US"/>
-              <a:t>单击此处编辑母版文本样式</a:t>
+              <a:rPr lang="en-US"/>
+              <a:t>Click to edit Master text styles</a:t>
             </a:r>
           </a:p>
           <a:p>
             <a:pPr lvl="1"/>
             <a:r>
-              <a:rPr lang="zh-CN" altLang="en-US"/>
-              <a:t>二级</a:t>
+              <a:rPr lang="en-US"/>
+              <a:t>Second level</a:t>
             </a:r>
           </a:p>
           <a:p>
             <a:pPr lvl="2"/>
             <a:r>
-              <a:rPr lang="zh-CN" altLang="en-US"/>
-              <a:t>三级</a:t>
+              <a:rPr lang="en-US"/>
+              <a:t>Third level</a:t>
             </a:r>
           </a:p>
           <a:p>
             <a:pPr lvl="3"/>
             <a:r>
-              <a:rPr lang="zh-CN" altLang="en-US"/>
-              <a:t>四级</a:t>
+              <a:rPr lang="en-US"/>
+              <a:t>Fourth level</a:t>
             </a:r>
           </a:p>
           <a:p>
             <a:pPr lvl="4"/>
             <a:r>
-              <a:rPr lang="zh-CN" altLang="en-US"/>
-              <a:t>五级</a:t>
-            </a:r>
-          </a:p>
-        </p:txBody>
-      </p:sp>
-      <p:sp>
-        <p:nvSpPr>
-          <p:cNvPr id="4" name="文本占位符 3">
-            <a:extLst>
-              <a:ext uri="{FF2B5EF4-FFF2-40B4-BE49-F238E27FC236}">
-                <a16:creationId xmlns:a16="http://schemas.microsoft.com/office/drawing/2014/main" id="{5AB78C7E-00C5-44CE-B2D5-5E4E75FF8227}"/>
-              </a:ext>
-            </a:extLst>
-          </p:cNvPr>
+              <a:rPr lang="en-US"/>
+              <a:t>Fifth level</a:t>
+            </a:r>
+          </a:p>
+        </p:txBody>
+      </p:sp>
+      <p:sp>
+        <p:nvSpPr>
+          <p:cNvPr id="4" name="Text Placeholder 3"/>
           <p:cNvSpPr>
             <a:spLocks noGrp="1"/>
           </p:cNvSpPr>
@@ -2346,21 +2057,15 @@
           <a:p>
             <a:pPr lvl="0"/>
             <a:r>
-              <a:rPr lang="zh-CN" altLang="en-US"/>
-              <a:t>单击此处编辑母版文本样式</a:t>
-            </a:r>
-          </a:p>
-        </p:txBody>
-      </p:sp>
-      <p:sp>
-        <p:nvSpPr>
-          <p:cNvPr id="5" name="日期占位符 4">
-            <a:extLst>
-              <a:ext uri="{FF2B5EF4-FFF2-40B4-BE49-F238E27FC236}">
-                <a16:creationId xmlns:a16="http://schemas.microsoft.com/office/drawing/2014/main" id="{E6666960-CB33-41BE-80BC-22061B991134}"/>
-              </a:ext>
-            </a:extLst>
-          </p:cNvPr>
+              <a:rPr lang="en-US"/>
+              <a:t>Click to edit Master text styles</a:t>
+            </a:r>
+          </a:p>
+        </p:txBody>
+      </p:sp>
+      <p:sp>
+        <p:nvSpPr>
+          <p:cNvPr id="5" name="Date Placeholder 4"/>
           <p:cNvSpPr>
             <a:spLocks noGrp="1"/>
           </p:cNvSpPr>
@@ -2373,23 +2078,17 @@
           <a:bodyPr/>
           <a:lstStyle/>
           <a:p>
-            <a:fld id="{488607AE-241E-4541-9A94-40C722101DE2}" type="datetimeFigureOut">
-              <a:rPr lang="zh-CN" altLang="en-US" smtClean="0"/>
-              <a:t>2019/6/27</a:t>
+            <a:fld id="{9ED3734C-ACA2-CD44-9419-3EA4E9A728CC}" type="datetimeFigureOut">
+              <a:rPr lang="en-US" smtClean="0"/>
+              <a:t>12/5/2019</a:t>
             </a:fld>
-            <a:endParaRPr lang="zh-CN" altLang="en-US"/>
-          </a:p>
-        </p:txBody>
-      </p:sp>
-      <p:sp>
-        <p:nvSpPr>
-          <p:cNvPr id="6" name="页脚占位符 5">
-            <a:extLst>
-              <a:ext uri="{FF2B5EF4-FFF2-40B4-BE49-F238E27FC236}">
-                <a16:creationId xmlns:a16="http://schemas.microsoft.com/office/drawing/2014/main" id="{D2364734-4F34-494B-89C6-C673D4800F7A}"/>
-              </a:ext>
-            </a:extLst>
-          </p:cNvPr>
+            <a:endParaRPr lang="en-US"/>
+          </a:p>
+        </p:txBody>
+      </p:sp>
+      <p:sp>
+        <p:nvSpPr>
+          <p:cNvPr id="6" name="Footer Placeholder 5"/>
           <p:cNvSpPr>
             <a:spLocks noGrp="1"/>
           </p:cNvSpPr>
@@ -2402,19 +2101,13 @@
           <a:bodyPr/>
           <a:lstStyle/>
           <a:p>
-            <a:endParaRPr lang="zh-CN" altLang="en-US"/>
-          </a:p>
-        </p:txBody>
-      </p:sp>
-      <p:sp>
-        <p:nvSpPr>
-          <p:cNvPr id="7" name="灯片编号占位符 6">
-            <a:extLst>
-              <a:ext uri="{FF2B5EF4-FFF2-40B4-BE49-F238E27FC236}">
-                <a16:creationId xmlns:a16="http://schemas.microsoft.com/office/drawing/2014/main" id="{DF2FB5E5-156C-42F3-9C47-B96E50EDC8E2}"/>
-              </a:ext>
-            </a:extLst>
-          </p:cNvPr>
+            <a:endParaRPr lang="en-US"/>
+          </a:p>
+        </p:txBody>
+      </p:sp>
+      <p:sp>
+        <p:nvSpPr>
+          <p:cNvPr id="7" name="Slide Number Placeholder 6"/>
           <p:cNvSpPr>
             <a:spLocks noGrp="1"/>
           </p:cNvSpPr>
@@ -2427,18 +2120,18 @@
           <a:bodyPr/>
           <a:lstStyle/>
           <a:p>
-            <a:fld id="{7673EE0C-0863-498C-9054-DB8CCFC87F4C}" type="slidenum">
-              <a:rPr lang="zh-CN" altLang="en-US" smtClean="0"/>
+            <a:fld id="{1F412440-1B23-604B-B178-CB159C9EC6EA}" type="slidenum">
+              <a:rPr lang="en-US" smtClean="0"/>
               <a:t>‹#›</a:t>
             </a:fld>
-            <a:endParaRPr lang="zh-CN" altLang="en-US"/>
+            <a:endParaRPr lang="en-US"/>
           </a:p>
         </p:txBody>
       </p:sp>
     </p:spTree>
     <p:extLst>
       <p:ext uri="{BB962C8B-B14F-4D97-AF65-F5344CB8AC3E}">
-        <p14:creationId xmlns:p14="http://schemas.microsoft.com/office/powerpoint/2010/main" val="1385819109"/>
+        <p14:creationId xmlns:p14="http://schemas.microsoft.com/office/powerpoint/2010/main" val="2040403645"/>
       </p:ext>
     </p:extLst>
   </p:cSld>
@@ -2450,7 +2143,7 @@
 
 <file path=ppt/slideLayouts/slideLayout9.xml><?xml version="1.0" encoding="utf-8"?>
 <p:sldLayout xmlns:a="http://schemas.openxmlformats.org/drawingml/2006/main" xmlns:r="http://schemas.openxmlformats.org/officeDocument/2006/relationships" xmlns:p="http://schemas.openxmlformats.org/presentationml/2006/main" type="picTx" preserve="1">
-  <p:cSld name="图片与标题">
+  <p:cSld name="Picture with Caption">
     <p:spTree>
       <p:nvGrpSpPr>
         <p:cNvPr id="1" name=""/>
@@ -2467,13 +2160,7 @@
       </p:grpSpPr>
       <p:sp>
         <p:nvSpPr>
-          <p:cNvPr id="2" name="标题 1">
-            <a:extLst>
-              <a:ext uri="{FF2B5EF4-FFF2-40B4-BE49-F238E27FC236}">
-                <a16:creationId xmlns:a16="http://schemas.microsoft.com/office/drawing/2014/main" id="{DD88D7A8-C7C4-424F-BF11-FA156677EAF4}"/>
-              </a:ext>
-            </a:extLst>
-          </p:cNvPr>
+          <p:cNvPr id="2" name="Title 1"/>
           <p:cNvSpPr>
             <a:spLocks noGrp="1"/>
           </p:cNvSpPr>
@@ -2496,21 +2183,15 @@
           </a:lstStyle>
           <a:p>
             <a:r>
-              <a:rPr lang="zh-CN" altLang="en-US"/>
-              <a:t>单击此处编辑母版标题样式</a:t>
-            </a:r>
-          </a:p>
-        </p:txBody>
-      </p:sp>
-      <p:sp>
-        <p:nvSpPr>
-          <p:cNvPr id="3" name="图片占位符 2">
-            <a:extLst>
-              <a:ext uri="{FF2B5EF4-FFF2-40B4-BE49-F238E27FC236}">
-                <a16:creationId xmlns:a16="http://schemas.microsoft.com/office/drawing/2014/main" id="{4E31ECBB-F15A-4D8A-864F-8A342BD35868}"/>
-              </a:ext>
-            </a:extLst>
-          </p:cNvPr>
+              <a:rPr lang="en-US"/>
+              <a:t>Click to edit Master title style</a:t>
+            </a:r>
+          </a:p>
+        </p:txBody>
+      </p:sp>
+      <p:sp>
+        <p:nvSpPr>
+          <p:cNvPr id="3" name="Picture Placeholder 2"/>
           <p:cNvSpPr>
             <a:spLocks noGrp="1"/>
           </p:cNvSpPr>
@@ -2565,19 +2246,13 @@
             </a:lvl9pPr>
           </a:lstStyle>
           <a:p>
-            <a:endParaRPr lang="zh-CN" altLang="en-US"/>
-          </a:p>
-        </p:txBody>
-      </p:sp>
-      <p:sp>
-        <p:nvSpPr>
-          <p:cNvPr id="4" name="文本占位符 3">
-            <a:extLst>
-              <a:ext uri="{FF2B5EF4-FFF2-40B4-BE49-F238E27FC236}">
-                <a16:creationId xmlns:a16="http://schemas.microsoft.com/office/drawing/2014/main" id="{FF797284-BBAF-424E-93DC-E282D87651FE}"/>
-              </a:ext>
-            </a:extLst>
-          </p:cNvPr>
+            <a:endParaRPr lang="en-US"/>
+          </a:p>
+        </p:txBody>
+      </p:sp>
+      <p:sp>
+        <p:nvSpPr>
+          <p:cNvPr id="4" name="Text Placeholder 3"/>
           <p:cNvSpPr>
             <a:spLocks noGrp="1"/>
           </p:cNvSpPr>
@@ -2634,21 +2309,15 @@
           <a:p>
             <a:pPr lvl="0"/>
             <a:r>
-              <a:rPr lang="zh-CN" altLang="en-US"/>
-              <a:t>单击此处编辑母版文本样式</a:t>
-            </a:r>
-          </a:p>
-        </p:txBody>
-      </p:sp>
-      <p:sp>
-        <p:nvSpPr>
-          <p:cNvPr id="5" name="日期占位符 4">
-            <a:extLst>
-              <a:ext uri="{FF2B5EF4-FFF2-40B4-BE49-F238E27FC236}">
-                <a16:creationId xmlns:a16="http://schemas.microsoft.com/office/drawing/2014/main" id="{C4DE0D4A-3DBA-44E1-AC81-FB907209E2AF}"/>
-              </a:ext>
-            </a:extLst>
-          </p:cNvPr>
+              <a:rPr lang="en-US"/>
+              <a:t>Click to edit Master text styles</a:t>
+            </a:r>
+          </a:p>
+        </p:txBody>
+      </p:sp>
+      <p:sp>
+        <p:nvSpPr>
+          <p:cNvPr id="5" name="Date Placeholder 4"/>
           <p:cNvSpPr>
             <a:spLocks noGrp="1"/>
           </p:cNvSpPr>
@@ -2661,23 +2330,17 @@
           <a:bodyPr/>
           <a:lstStyle/>
           <a:p>
-            <a:fld id="{488607AE-241E-4541-9A94-40C722101DE2}" type="datetimeFigureOut">
-              <a:rPr lang="zh-CN" altLang="en-US" smtClean="0"/>
-              <a:t>2019/6/27</a:t>
+            <a:fld id="{9ED3734C-ACA2-CD44-9419-3EA4E9A728CC}" type="datetimeFigureOut">
+              <a:rPr lang="en-US" smtClean="0"/>
+              <a:t>12/5/2019</a:t>
             </a:fld>
-            <a:endParaRPr lang="zh-CN" altLang="en-US"/>
-          </a:p>
-        </p:txBody>
-      </p:sp>
-      <p:sp>
-        <p:nvSpPr>
-          <p:cNvPr id="6" name="页脚占位符 5">
-            <a:extLst>
-              <a:ext uri="{FF2B5EF4-FFF2-40B4-BE49-F238E27FC236}">
-                <a16:creationId xmlns:a16="http://schemas.microsoft.com/office/drawing/2014/main" id="{823EA6D8-BF61-4F4C-9374-1FEB497D6AE2}"/>
-              </a:ext>
-            </a:extLst>
-          </p:cNvPr>
+            <a:endParaRPr lang="en-US"/>
+          </a:p>
+        </p:txBody>
+      </p:sp>
+      <p:sp>
+        <p:nvSpPr>
+          <p:cNvPr id="6" name="Footer Placeholder 5"/>
           <p:cNvSpPr>
             <a:spLocks noGrp="1"/>
           </p:cNvSpPr>
@@ -2690,19 +2353,13 @@
           <a:bodyPr/>
           <a:lstStyle/>
           <a:p>
-            <a:endParaRPr lang="zh-CN" altLang="en-US"/>
-          </a:p>
-        </p:txBody>
-      </p:sp>
-      <p:sp>
-        <p:nvSpPr>
-          <p:cNvPr id="7" name="灯片编号占位符 6">
-            <a:extLst>
-              <a:ext uri="{FF2B5EF4-FFF2-40B4-BE49-F238E27FC236}">
-                <a16:creationId xmlns:a16="http://schemas.microsoft.com/office/drawing/2014/main" id="{B59D433D-DB02-46C0-8FA4-DAD4E4E05D53}"/>
-              </a:ext>
-            </a:extLst>
-          </p:cNvPr>
+            <a:endParaRPr lang="en-US"/>
+          </a:p>
+        </p:txBody>
+      </p:sp>
+      <p:sp>
+        <p:nvSpPr>
+          <p:cNvPr id="7" name="Slide Number Placeholder 6"/>
           <p:cNvSpPr>
             <a:spLocks noGrp="1"/>
           </p:cNvSpPr>
@@ -2715,18 +2372,18 @@
           <a:bodyPr/>
           <a:lstStyle/>
           <a:p>
-            <a:fld id="{7673EE0C-0863-498C-9054-DB8CCFC87F4C}" type="slidenum">
-              <a:rPr lang="zh-CN" altLang="en-US" smtClean="0"/>
+            <a:fld id="{1F412440-1B23-604B-B178-CB159C9EC6EA}" type="slidenum">
+              <a:rPr lang="en-US" smtClean="0"/>
               <a:t>‹#›</a:t>
             </a:fld>
-            <a:endParaRPr lang="zh-CN" altLang="en-US"/>
+            <a:endParaRPr lang="en-US"/>
           </a:p>
         </p:txBody>
       </p:sp>
     </p:spTree>
     <p:extLst>
       <p:ext uri="{BB962C8B-B14F-4D97-AF65-F5344CB8AC3E}">
-        <p14:creationId xmlns:p14="http://schemas.microsoft.com/office/powerpoint/2010/main" val="1611851724"/>
+        <p14:creationId xmlns:p14="http://schemas.microsoft.com/office/powerpoint/2010/main" val="2045186219"/>
       </p:ext>
     </p:extLst>
   </p:cSld>
@@ -2760,13 +2417,7 @@
       </p:grpSpPr>
       <p:sp>
         <p:nvSpPr>
-          <p:cNvPr id="2" name="标题占位符 1">
-            <a:extLst>
-              <a:ext uri="{FF2B5EF4-FFF2-40B4-BE49-F238E27FC236}">
-                <a16:creationId xmlns:a16="http://schemas.microsoft.com/office/drawing/2014/main" id="{6FB56C91-644C-48B3-8DD3-CF13FCEF411B}"/>
-              </a:ext>
-            </a:extLst>
-          </p:cNvPr>
+          <p:cNvPr id="2" name="Title Placeholder 1"/>
           <p:cNvSpPr>
             <a:spLocks noGrp="1"/>
           </p:cNvSpPr>
@@ -2790,21 +2441,15 @@
           <a:lstStyle/>
           <a:p>
             <a:r>
-              <a:rPr lang="zh-CN" altLang="en-US"/>
-              <a:t>单击此处编辑母版标题样式</a:t>
-            </a:r>
-          </a:p>
-        </p:txBody>
-      </p:sp>
-      <p:sp>
-        <p:nvSpPr>
-          <p:cNvPr id="3" name="文本占位符 2">
-            <a:extLst>
-              <a:ext uri="{FF2B5EF4-FFF2-40B4-BE49-F238E27FC236}">
-                <a16:creationId xmlns:a16="http://schemas.microsoft.com/office/drawing/2014/main" id="{F50E978C-4894-423D-89A6-D7839C472B1E}"/>
-              </a:ext>
-            </a:extLst>
-          </p:cNvPr>
+              <a:rPr lang="en-US"/>
+              <a:t>Click to edit Master title style</a:t>
+            </a:r>
+          </a:p>
+        </p:txBody>
+      </p:sp>
+      <p:sp>
+        <p:nvSpPr>
+          <p:cNvPr id="3" name="Text Placeholder 2"/>
           <p:cNvSpPr>
             <a:spLocks noGrp="1"/>
           </p:cNvSpPr>
@@ -2829,49 +2474,43 @@
           <a:p>
             <a:pPr lvl="0"/>
             <a:r>
-              <a:rPr lang="zh-CN" altLang="en-US"/>
-              <a:t>单击此处编辑母版文本样式</a:t>
+              <a:rPr lang="en-US"/>
+              <a:t>Click to edit Master text styles</a:t>
             </a:r>
           </a:p>
           <a:p>
             <a:pPr lvl="1"/>
             <a:r>
-              <a:rPr lang="zh-CN" altLang="en-US"/>
-              <a:t>二级</a:t>
+              <a:rPr lang="en-US"/>
+              <a:t>Second level</a:t>
             </a:r>
           </a:p>
           <a:p>
             <a:pPr lvl="2"/>
             <a:r>
-              <a:rPr lang="zh-CN" altLang="en-US"/>
-              <a:t>三级</a:t>
+              <a:rPr lang="en-US"/>
+              <a:t>Third level</a:t>
             </a:r>
           </a:p>
           <a:p>
             <a:pPr lvl="3"/>
             <a:r>
-              <a:rPr lang="zh-CN" altLang="en-US"/>
-              <a:t>四级</a:t>
+              <a:rPr lang="en-US"/>
+              <a:t>Fourth level</a:t>
             </a:r>
           </a:p>
           <a:p>
             <a:pPr lvl="4"/>
             <a:r>
-              <a:rPr lang="zh-CN" altLang="en-US"/>
-              <a:t>五级</a:t>
-            </a:r>
-          </a:p>
-        </p:txBody>
-      </p:sp>
-      <p:sp>
-        <p:nvSpPr>
-          <p:cNvPr id="4" name="日期占位符 3">
-            <a:extLst>
-              <a:ext uri="{FF2B5EF4-FFF2-40B4-BE49-F238E27FC236}">
-                <a16:creationId xmlns:a16="http://schemas.microsoft.com/office/drawing/2014/main" id="{A712BD29-F643-4C6B-8AEA-B203C167AD6D}"/>
-              </a:ext>
-            </a:extLst>
-          </p:cNvPr>
+              <a:rPr lang="en-US"/>
+              <a:t>Fifth level</a:t>
+            </a:r>
+          </a:p>
+        </p:txBody>
+      </p:sp>
+      <p:sp>
+        <p:nvSpPr>
+          <p:cNvPr id="4" name="Date Placeholder 3"/>
           <p:cNvSpPr>
             <a:spLocks noGrp="1"/>
           </p:cNvSpPr>
@@ -2902,23 +2541,17 @@
             </a:lvl1pPr>
           </a:lstStyle>
           <a:p>
-            <a:fld id="{488607AE-241E-4541-9A94-40C722101DE2}" type="datetimeFigureOut">
-              <a:rPr lang="zh-CN" altLang="en-US" smtClean="0"/>
-              <a:t>2019/6/27</a:t>
+            <a:fld id="{9ED3734C-ACA2-CD44-9419-3EA4E9A728CC}" type="datetimeFigureOut">
+              <a:rPr lang="en-US" smtClean="0"/>
+              <a:t>12/5/2019</a:t>
             </a:fld>
-            <a:endParaRPr lang="zh-CN" altLang="en-US"/>
-          </a:p>
-        </p:txBody>
-      </p:sp>
-      <p:sp>
-        <p:nvSpPr>
-          <p:cNvPr id="5" name="页脚占位符 4">
-            <a:extLst>
-              <a:ext uri="{FF2B5EF4-FFF2-40B4-BE49-F238E27FC236}">
-                <a16:creationId xmlns:a16="http://schemas.microsoft.com/office/drawing/2014/main" id="{94738361-0FAF-4A25-BD49-534FE676CBAC}"/>
-              </a:ext>
-            </a:extLst>
-          </p:cNvPr>
+            <a:endParaRPr lang="en-US"/>
+          </a:p>
+        </p:txBody>
+      </p:sp>
+      <p:sp>
+        <p:nvSpPr>
+          <p:cNvPr id="5" name="Footer Placeholder 4"/>
           <p:cNvSpPr>
             <a:spLocks noGrp="1"/>
           </p:cNvSpPr>
@@ -2949,19 +2582,13 @@
             </a:lvl1pPr>
           </a:lstStyle>
           <a:p>
-            <a:endParaRPr lang="zh-CN" altLang="en-US"/>
-          </a:p>
-        </p:txBody>
-      </p:sp>
-      <p:sp>
-        <p:nvSpPr>
-          <p:cNvPr id="6" name="灯片编号占位符 5">
-            <a:extLst>
-              <a:ext uri="{FF2B5EF4-FFF2-40B4-BE49-F238E27FC236}">
-                <a16:creationId xmlns:a16="http://schemas.microsoft.com/office/drawing/2014/main" id="{3DE68FFF-3748-46C4-8F3F-D0AE6BF538C4}"/>
-              </a:ext>
-            </a:extLst>
-          </p:cNvPr>
+            <a:endParaRPr lang="en-US"/>
+          </a:p>
+        </p:txBody>
+      </p:sp>
+      <p:sp>
+        <p:nvSpPr>
+          <p:cNvPr id="6" name="Slide Number Placeholder 5"/>
           <p:cNvSpPr>
             <a:spLocks noGrp="1"/>
           </p:cNvSpPr>
@@ -2992,18 +2619,18 @@
             </a:lvl1pPr>
           </a:lstStyle>
           <a:p>
-            <a:fld id="{7673EE0C-0863-498C-9054-DB8CCFC87F4C}" type="slidenum">
-              <a:rPr lang="zh-CN" altLang="en-US" smtClean="0"/>
+            <a:fld id="{1F412440-1B23-604B-B178-CB159C9EC6EA}" type="slidenum">
+              <a:rPr lang="en-US" smtClean="0"/>
               <a:t>‹#›</a:t>
             </a:fld>
-            <a:endParaRPr lang="zh-CN" altLang="en-US"/>
+            <a:endParaRPr lang="en-US"/>
           </a:p>
         </p:txBody>
       </p:sp>
     </p:spTree>
     <p:extLst>
       <p:ext uri="{BB962C8B-B14F-4D97-AF65-F5344CB8AC3E}">
-        <p14:creationId xmlns:p14="http://schemas.microsoft.com/office/powerpoint/2010/main" val="1526870456"/>
+        <p14:creationId xmlns:p14="http://schemas.microsoft.com/office/powerpoint/2010/main" val="1014290460"/>
       </p:ext>
     </p:extLst>
   </p:cSld>
@@ -3049,7 +2676,7 @@
         <a:spcBef>
           <a:spcPts val="1000"/>
         </a:spcBef>
-        <a:buFont typeface="Arial" panose="020B0604020202020204" pitchFamily="34" charset="0"/>
+        <a:buFont typeface="Arial"/>
         <a:buChar char="•"/>
         <a:defRPr sz="2800" kern="1200">
           <a:solidFill>
@@ -3067,7 +2694,7 @@
         <a:spcBef>
           <a:spcPts val="500"/>
         </a:spcBef>
-        <a:buFont typeface="Arial" panose="020B0604020202020204" pitchFamily="34" charset="0"/>
+        <a:buFont typeface="Arial"/>
         <a:buChar char="•"/>
         <a:defRPr sz="2400" kern="1200">
           <a:solidFill>
@@ -3085,7 +2712,7 @@
         <a:spcBef>
           <a:spcPts val="500"/>
         </a:spcBef>
-        <a:buFont typeface="Arial" panose="020B0604020202020204" pitchFamily="34" charset="0"/>
+        <a:buFont typeface="Arial"/>
         <a:buChar char="•"/>
         <a:defRPr sz="2000" kern="1200">
           <a:solidFill>
@@ -3103,7 +2730,7 @@
         <a:spcBef>
           <a:spcPts val="500"/>
         </a:spcBef>
-        <a:buFont typeface="Arial" panose="020B0604020202020204" pitchFamily="34" charset="0"/>
+        <a:buFont typeface="Arial"/>
         <a:buChar char="•"/>
         <a:defRPr sz="1800" kern="1200">
           <a:solidFill>
@@ -3121,7 +2748,7 @@
         <a:spcBef>
           <a:spcPts val="500"/>
         </a:spcBef>
-        <a:buFont typeface="Arial" panose="020B0604020202020204" pitchFamily="34" charset="0"/>
+        <a:buFont typeface="Arial"/>
         <a:buChar char="•"/>
         <a:defRPr sz="1800" kern="1200">
           <a:solidFill>
@@ -3139,7 +2766,7 @@
         <a:spcBef>
           <a:spcPts val="500"/>
         </a:spcBef>
-        <a:buFont typeface="Arial" panose="020B0604020202020204" pitchFamily="34" charset="0"/>
+        <a:buFont typeface="Arial"/>
         <a:buChar char="•"/>
         <a:defRPr sz="1800" kern="1200">
           <a:solidFill>
@@ -3157,7 +2784,7 @@
         <a:spcBef>
           <a:spcPts val="500"/>
         </a:spcBef>
-        <a:buFont typeface="Arial" panose="020B0604020202020204" pitchFamily="34" charset="0"/>
+        <a:buFont typeface="Arial"/>
         <a:buChar char="•"/>
         <a:defRPr sz="1800" kern="1200">
           <a:solidFill>
@@ -3175,7 +2802,7 @@
         <a:spcBef>
           <a:spcPts val="500"/>
         </a:spcBef>
-        <a:buFont typeface="Arial" panose="020B0604020202020204" pitchFamily="34" charset="0"/>
+        <a:buFont typeface="Arial"/>
         <a:buChar char="•"/>
         <a:defRPr sz="1800" kern="1200">
           <a:solidFill>
@@ -3193,7 +2820,7 @@
         <a:spcBef>
           <a:spcPts val="500"/>
         </a:spcBef>
-        <a:buFont typeface="Arial" panose="020B0604020202020204" pitchFamily="34" charset="0"/>
+        <a:buFont typeface="Arial"/>
         <a:buChar char="•"/>
         <a:defRPr sz="1800" kern="1200">
           <a:solidFill>
@@ -3207,7 +2834,7 @@
     </p:bodyStyle>
     <p:otherStyle>
       <a:defPPr>
-        <a:defRPr lang="zh-CN"/>
+        <a:defRPr lang="en-US"/>
       </a:defPPr>
       <a:lvl1pPr marL="0" algn="l" defTabSz="914400" rtl="0" eaLnBrk="1" latinLnBrk="0" hangingPunct="1">
         <a:defRPr sz="1800" kern="1200">
@@ -3323,13 +2950,7 @@
       </p:grpSpPr>
       <p:sp>
         <p:nvSpPr>
-          <p:cNvPr id="2" name="标题 1">
-            <a:extLst>
-              <a:ext uri="{FF2B5EF4-FFF2-40B4-BE49-F238E27FC236}">
-                <a16:creationId xmlns:a16="http://schemas.microsoft.com/office/drawing/2014/main" id="{4462AB00-C0E5-47EF-B24A-2CB4ADD44025}"/>
-              </a:ext>
-            </a:extLst>
-          </p:cNvPr>
+          <p:cNvPr id="2" name="Title 1"/>
           <p:cNvSpPr>
             <a:spLocks noGrp="1"/>
           </p:cNvSpPr>
@@ -3342,19 +2963,13 @@
           <a:bodyPr/>
           <a:lstStyle/>
           <a:p>
-            <a:endParaRPr lang="zh-CN" altLang="en-US"/>
-          </a:p>
-        </p:txBody>
-      </p:sp>
-      <p:sp>
-        <p:nvSpPr>
-          <p:cNvPr id="3" name="副标题 2">
-            <a:extLst>
-              <a:ext uri="{FF2B5EF4-FFF2-40B4-BE49-F238E27FC236}">
-                <a16:creationId xmlns:a16="http://schemas.microsoft.com/office/drawing/2014/main" id="{CAF8F5EC-E1DD-4D94-AFA4-89A911697633}"/>
-              </a:ext>
-            </a:extLst>
-          </p:cNvPr>
+            <a:endParaRPr lang="en-US"/>
+          </a:p>
+        </p:txBody>
+      </p:sp>
+      <p:sp>
+        <p:nvSpPr>
+          <p:cNvPr id="3" name="Subtitle 2"/>
           <p:cNvSpPr>
             <a:spLocks noGrp="1"/>
           </p:cNvSpPr>
@@ -3367,14 +2982,14 @@
           <a:bodyPr/>
           <a:lstStyle/>
           <a:p>
-            <a:endParaRPr lang="zh-CN" altLang="en-US"/>
+            <a:endParaRPr lang="en-US"/>
           </a:p>
         </p:txBody>
       </p:sp>
     </p:spTree>
     <p:extLst>
       <p:ext uri="{BB962C8B-B14F-4D97-AF65-F5344CB8AC3E}">
-        <p14:creationId xmlns:p14="http://schemas.microsoft.com/office/powerpoint/2010/main" val="4182125411"/>
+        <p14:creationId xmlns:p14="http://schemas.microsoft.com/office/powerpoint/2010/main" val="2053717610"/>
       </p:ext>
     </p:extLst>
   </p:cSld>
@@ -3385,7 +3000,7 @@
 </file>
 
 <file path=ppt/theme/theme1.xml><?xml version="1.0" encoding="utf-8"?>
-<a:theme xmlns:a="http://schemas.openxmlformats.org/drawingml/2006/main" name="Office 主题​​">
+<a:theme xmlns:a="http://schemas.openxmlformats.org/drawingml/2006/main" name="Office Theme">
   <a:themeElements>
     <a:clrScheme name="Office">
       <a:dk1>
@@ -3401,7 +3016,7 @@
         <a:srgbClr val="E7E6E6"/>
       </a:lt2>
       <a:accent1>
-        <a:srgbClr val="4472C4"/>
+        <a:srgbClr val="5B9BD5"/>
       </a:accent1>
       <a:accent2>
         <a:srgbClr val="ED7D31"/>
@@ -3413,7 +3028,7 @@
         <a:srgbClr val="FFC000"/>
       </a:accent4>
       <a:accent5>
-        <a:srgbClr val="5B9BD5"/>
+        <a:srgbClr val="4472C4"/>
       </a:accent5>
       <a:accent6>
         <a:srgbClr val="70AD47"/>
@@ -3427,12 +3042,12 @@
     </a:clrScheme>
     <a:fontScheme name="Office">
       <a:majorFont>
-        <a:latin typeface="等线 Light" panose="020F0302020204030204"/>
+        <a:latin typeface="Calibri Light" panose="020F0302020204030204"/>
         <a:ea typeface=""/>
         <a:cs typeface=""/>
-        <a:font script="Jpan" typeface="游ゴシック Light"/>
+        <a:font script="Jpan" typeface="Yu Gothic Light"/>
         <a:font script="Hang" typeface="맑은 고딕"/>
-        <a:font script="Hans" typeface="等线 Light"/>
+        <a:font script="Hans" typeface="DengXian Light"/>
         <a:font script="Hant" typeface="新細明體"/>
         <a:font script="Arab" typeface="Times New Roman"/>
         <a:font script="Hebr" typeface="Times New Roman"/>
@@ -3460,31 +3075,14 @@
         <a:font script="Viet" typeface="Times New Roman"/>
         <a:font script="Uigh" typeface="Microsoft Uighur"/>
         <a:font script="Geor" typeface="Sylfaen"/>
-        <a:font script="Armn" typeface="Arial"/>
-        <a:font script="Bugi" typeface="Leelawadee UI"/>
-        <a:font script="Bopo" typeface="Microsoft JhengHei"/>
-        <a:font script="Java" typeface="Javanese Text"/>
-        <a:font script="Lisu" typeface="Segoe UI"/>
-        <a:font script="Mymr" typeface="Myanmar Text"/>
-        <a:font script="Nkoo" typeface="Ebrima"/>
-        <a:font script="Olck" typeface="Nirmala UI"/>
-        <a:font script="Osma" typeface="Ebrima"/>
-        <a:font script="Phag" typeface="Phagspa"/>
-        <a:font script="Syrn" typeface="Estrangelo Edessa"/>
-        <a:font script="Syrj" typeface="Estrangelo Edessa"/>
-        <a:font script="Syre" typeface="Estrangelo Edessa"/>
-        <a:font script="Sora" typeface="Nirmala UI"/>
-        <a:font script="Tale" typeface="Microsoft Tai Le"/>
-        <a:font script="Talu" typeface="Microsoft New Tai Lue"/>
-        <a:font script="Tfng" typeface="Ebrima"/>
       </a:majorFont>
       <a:minorFont>
-        <a:latin typeface="等线" panose="020F0502020204030204"/>
+        <a:latin typeface="Calibri" panose="020F0502020204030204"/>
         <a:ea typeface=""/>
         <a:cs typeface=""/>
-        <a:font script="Jpan" typeface="游ゴシック"/>
+        <a:font script="Jpan" typeface="Yu Gothic"/>
         <a:font script="Hang" typeface="맑은 고딕"/>
-        <a:font script="Hans" typeface="等线"/>
+        <a:font script="Hans" typeface="DengXian"/>
         <a:font script="Hant" typeface="新細明體"/>
         <a:font script="Arab" typeface="Arial"/>
         <a:font script="Hebr" typeface="Arial"/>
@@ -3512,23 +3110,6 @@
         <a:font script="Viet" typeface="Arial"/>
         <a:font script="Uigh" typeface="Microsoft Uighur"/>
         <a:font script="Geor" typeface="Sylfaen"/>
-        <a:font script="Armn" typeface="Arial"/>
-        <a:font script="Bugi" typeface="Leelawadee UI"/>
-        <a:font script="Bopo" typeface="Microsoft JhengHei"/>
-        <a:font script="Java" typeface="Javanese Text"/>
-        <a:font script="Lisu" typeface="Segoe UI"/>
-        <a:font script="Mymr" typeface="Myanmar Text"/>
-        <a:font script="Nkoo" typeface="Ebrima"/>
-        <a:font script="Olck" typeface="Nirmala UI"/>
-        <a:font script="Osma" typeface="Ebrima"/>
-        <a:font script="Phag" typeface="Phagspa"/>
-        <a:font script="Syrn" typeface="Estrangelo Edessa"/>
-        <a:font script="Syrj" typeface="Estrangelo Edessa"/>
-        <a:font script="Syre" typeface="Estrangelo Edessa"/>
-        <a:font script="Sora" typeface="Nirmala UI"/>
-        <a:font script="Tale" typeface="Microsoft Tai Le"/>
-        <a:font script="Talu" typeface="Microsoft New Tai Lue"/>
-        <a:font script="Tfng" typeface="Ebrima"/>
       </a:minorFont>
     </a:fontScheme>
     <a:fmtScheme name="Office">

</xml_diff>

<commit_message>
update pptx/xlsx office template (#4340)
</commit_message>
<xml_diff>
--- a/media/office-template/empty.pptx
+++ b/media/office-template/empty.pptx
@@ -1,6 +1,6 @@
 
 <file path=ppt/presentation.xml><?xml version="1.0" encoding="utf-8"?>
-<p:presentation xmlns:a="http://schemas.openxmlformats.org/drawingml/2006/main" xmlns:r="http://schemas.openxmlformats.org/officeDocument/2006/relationships" xmlns:p="http://schemas.openxmlformats.org/presentationml/2006/main" saveSubsetFonts="1">
+<p:presentation xmlns:a="http://schemas.openxmlformats.org/drawingml/2006/main" xmlns:r="http://schemas.openxmlformats.org/officeDocument/2006/relationships" xmlns:p="http://schemas.openxmlformats.org/presentationml/2006/main" removePersonalInfoOnSave="1" saveSubsetFonts="1" autoCompressPictures="0">
   <p:sldMasterIdLst>
     <p:sldMasterId id="2147483648" r:id="rId1"/>
   </p:sldMasterIdLst>
@@ -11,7 +11,7 @@
   <p:notesSz cx="6858000" cy="9144000"/>
   <p:defaultTextStyle>
     <a:defPPr>
-      <a:defRPr lang="zh-CN"/>
+      <a:defRPr lang="en-US"/>
     </a:defPPr>
     <a:lvl1pPr marL="0" algn="l" defTabSz="914400" rtl="0" eaLnBrk="1" latinLnBrk="0" hangingPunct="1">
       <a:defRPr sz="1800" kern="1200">
@@ -104,12 +104,17 @@
       </a:defRPr>
     </a:lvl9pPr>
   </p:defaultTextStyle>
+  <p:extLst>
+    <p:ext uri="{EFAFB233-063F-42B5-8137-9DF3F51BA10A}">
+      <p15:sldGuideLst xmlns:p15="http://schemas.microsoft.com/office/powerpoint/2012/main"/>
+    </p:ext>
+  </p:extLst>
 </p:presentation>
 </file>
 
 <file path=ppt/slideLayouts/slideLayout1.xml><?xml version="1.0" encoding="utf-8"?>
 <p:sldLayout xmlns:a="http://schemas.openxmlformats.org/drawingml/2006/main" xmlns:r="http://schemas.openxmlformats.org/officeDocument/2006/relationships" xmlns:p="http://schemas.openxmlformats.org/presentationml/2006/main" type="title" preserve="1">
-  <p:cSld name="标题幻灯片">
+  <p:cSld name="Title Slide">
     <p:spTree>
       <p:nvGrpSpPr>
         <p:cNvPr id="1" name=""/>
@@ -126,13 +131,7 @@
       </p:grpSpPr>
       <p:sp>
         <p:nvSpPr>
-          <p:cNvPr id="2" name="标题 1">
-            <a:extLst>
-              <a:ext uri="{FF2B5EF4-FFF2-40B4-BE49-F238E27FC236}">
-                <a16:creationId xmlns:a16="http://schemas.microsoft.com/office/drawing/2014/main" id="{24C8F438-DBB6-40FA-A5A1-EB55F7B24EB2}"/>
-              </a:ext>
-            </a:extLst>
-          </p:cNvPr>
+          <p:cNvPr id="2" name="Title 1"/>
           <p:cNvSpPr>
             <a:spLocks noGrp="1"/>
           </p:cNvSpPr>
@@ -155,21 +154,15 @@
           </a:lstStyle>
           <a:p>
             <a:r>
-              <a:rPr lang="zh-CN" altLang="en-US"/>
-              <a:t>单击此处编辑母版标题样式</a:t>
-            </a:r>
-          </a:p>
-        </p:txBody>
-      </p:sp>
-      <p:sp>
-        <p:nvSpPr>
-          <p:cNvPr id="3" name="副标题 2">
-            <a:extLst>
-              <a:ext uri="{FF2B5EF4-FFF2-40B4-BE49-F238E27FC236}">
-                <a16:creationId xmlns:a16="http://schemas.microsoft.com/office/drawing/2014/main" id="{0C5BE3EB-E61B-4C3B-8D2A-5E6D66672E55}"/>
-              </a:ext>
-            </a:extLst>
-          </p:cNvPr>
+              <a:rPr lang="en-US"/>
+              <a:t>Click to edit Master title style</a:t>
+            </a:r>
+          </a:p>
+        </p:txBody>
+      </p:sp>
+      <p:sp>
+        <p:nvSpPr>
+          <p:cNvPr id="3" name="Subtitle 2"/>
           <p:cNvSpPr>
             <a:spLocks noGrp="1"/>
           </p:cNvSpPr>
@@ -225,21 +218,15 @@
           </a:lstStyle>
           <a:p>
             <a:r>
-              <a:rPr lang="zh-CN" altLang="en-US"/>
-              <a:t>单击此处编辑母版副标题样式</a:t>
-            </a:r>
-          </a:p>
-        </p:txBody>
-      </p:sp>
-      <p:sp>
-        <p:nvSpPr>
-          <p:cNvPr id="4" name="日期占位符 3">
-            <a:extLst>
-              <a:ext uri="{FF2B5EF4-FFF2-40B4-BE49-F238E27FC236}">
-                <a16:creationId xmlns:a16="http://schemas.microsoft.com/office/drawing/2014/main" id="{9C0AA3EF-F806-4546-A871-02C5B9192A3C}"/>
-              </a:ext>
-            </a:extLst>
-          </p:cNvPr>
+              <a:rPr lang="en-US"/>
+              <a:t>Click to edit Master subtitle style</a:t>
+            </a:r>
+          </a:p>
+        </p:txBody>
+      </p:sp>
+      <p:sp>
+        <p:nvSpPr>
+          <p:cNvPr id="4" name="Date Placeholder 3"/>
           <p:cNvSpPr>
             <a:spLocks noGrp="1"/>
           </p:cNvSpPr>
@@ -252,23 +239,17 @@
           <a:bodyPr/>
           <a:lstStyle/>
           <a:p>
-            <a:fld id="{488607AE-241E-4541-9A94-40C722101DE2}" type="datetimeFigureOut">
-              <a:rPr lang="zh-CN" altLang="en-US" smtClean="0"/>
-              <a:t>2019/6/27</a:t>
+            <a:fld id="{9ED3734C-ACA2-CD44-9419-3EA4E9A728CC}" type="datetimeFigureOut">
+              <a:rPr lang="en-US" smtClean="0"/>
+              <a:t>12/5/2019</a:t>
             </a:fld>
-            <a:endParaRPr lang="zh-CN" altLang="en-US"/>
-          </a:p>
-        </p:txBody>
-      </p:sp>
-      <p:sp>
-        <p:nvSpPr>
-          <p:cNvPr id="5" name="页脚占位符 4">
-            <a:extLst>
-              <a:ext uri="{FF2B5EF4-FFF2-40B4-BE49-F238E27FC236}">
-                <a16:creationId xmlns:a16="http://schemas.microsoft.com/office/drawing/2014/main" id="{35A8D405-0BBF-4F59-A3C0-C27993C5E74C}"/>
-              </a:ext>
-            </a:extLst>
-          </p:cNvPr>
+            <a:endParaRPr lang="en-US"/>
+          </a:p>
+        </p:txBody>
+      </p:sp>
+      <p:sp>
+        <p:nvSpPr>
+          <p:cNvPr id="5" name="Footer Placeholder 4"/>
           <p:cNvSpPr>
             <a:spLocks noGrp="1"/>
           </p:cNvSpPr>
@@ -281,19 +262,13 @@
           <a:bodyPr/>
           <a:lstStyle/>
           <a:p>
-            <a:endParaRPr lang="zh-CN" altLang="en-US"/>
-          </a:p>
-        </p:txBody>
-      </p:sp>
-      <p:sp>
-        <p:nvSpPr>
-          <p:cNvPr id="6" name="灯片编号占位符 5">
-            <a:extLst>
-              <a:ext uri="{FF2B5EF4-FFF2-40B4-BE49-F238E27FC236}">
-                <a16:creationId xmlns:a16="http://schemas.microsoft.com/office/drawing/2014/main" id="{B37B6A98-35F3-49A4-8DBD-E38FF1856B64}"/>
-              </a:ext>
-            </a:extLst>
-          </p:cNvPr>
+            <a:endParaRPr lang="en-US"/>
+          </a:p>
+        </p:txBody>
+      </p:sp>
+      <p:sp>
+        <p:nvSpPr>
+          <p:cNvPr id="6" name="Slide Number Placeholder 5"/>
           <p:cNvSpPr>
             <a:spLocks noGrp="1"/>
           </p:cNvSpPr>
@@ -306,18 +281,18 @@
           <a:bodyPr/>
           <a:lstStyle/>
           <a:p>
-            <a:fld id="{7673EE0C-0863-498C-9054-DB8CCFC87F4C}" type="slidenum">
-              <a:rPr lang="zh-CN" altLang="en-US" smtClean="0"/>
+            <a:fld id="{1F412440-1B23-604B-B178-CB159C9EC6EA}" type="slidenum">
+              <a:rPr lang="en-US" smtClean="0"/>
               <a:t>‹#›</a:t>
             </a:fld>
-            <a:endParaRPr lang="zh-CN" altLang="en-US"/>
+            <a:endParaRPr lang="en-US"/>
           </a:p>
         </p:txBody>
       </p:sp>
     </p:spTree>
     <p:extLst>
       <p:ext uri="{BB962C8B-B14F-4D97-AF65-F5344CB8AC3E}">
-        <p14:creationId xmlns:p14="http://schemas.microsoft.com/office/powerpoint/2010/main" val="654707259"/>
+        <p14:creationId xmlns:p14="http://schemas.microsoft.com/office/powerpoint/2010/main" val="454571334"/>
       </p:ext>
     </p:extLst>
   </p:cSld>
@@ -329,7 +304,7 @@
 
 <file path=ppt/slideLayouts/slideLayout10.xml><?xml version="1.0" encoding="utf-8"?>
 <p:sldLayout xmlns:a="http://schemas.openxmlformats.org/drawingml/2006/main" xmlns:r="http://schemas.openxmlformats.org/officeDocument/2006/relationships" xmlns:p="http://schemas.openxmlformats.org/presentationml/2006/main" type="vertTx" preserve="1">
-  <p:cSld name="标题和竖排文字">
+  <p:cSld name="Title and Vertical Text">
     <p:spTree>
       <p:nvGrpSpPr>
         <p:cNvPr id="1" name=""/>
@@ -346,13 +321,7 @@
       </p:grpSpPr>
       <p:sp>
         <p:nvSpPr>
-          <p:cNvPr id="2" name="标题 1">
-            <a:extLst>
-              <a:ext uri="{FF2B5EF4-FFF2-40B4-BE49-F238E27FC236}">
-                <a16:creationId xmlns:a16="http://schemas.microsoft.com/office/drawing/2014/main" id="{577275BE-E30C-4305-999D-8BC0AA7A54AF}"/>
-              </a:ext>
-            </a:extLst>
-          </p:cNvPr>
+          <p:cNvPr id="2" name="Title 1"/>
           <p:cNvSpPr>
             <a:spLocks noGrp="1"/>
           </p:cNvSpPr>
@@ -366,21 +335,15 @@
           <a:lstStyle/>
           <a:p>
             <a:r>
-              <a:rPr lang="zh-CN" altLang="en-US"/>
-              <a:t>单击此处编辑母版标题样式</a:t>
-            </a:r>
-          </a:p>
-        </p:txBody>
-      </p:sp>
-      <p:sp>
-        <p:nvSpPr>
-          <p:cNvPr id="3" name="竖排文字占位符 2">
-            <a:extLst>
-              <a:ext uri="{FF2B5EF4-FFF2-40B4-BE49-F238E27FC236}">
-                <a16:creationId xmlns:a16="http://schemas.microsoft.com/office/drawing/2014/main" id="{80D329F8-9884-44CB-A831-6EA4CA413555}"/>
-              </a:ext>
-            </a:extLst>
-          </p:cNvPr>
+              <a:rPr lang="en-US"/>
+              <a:t>Click to edit Master title style</a:t>
+            </a:r>
+          </a:p>
+        </p:txBody>
+      </p:sp>
+      <p:sp>
+        <p:nvSpPr>
+          <p:cNvPr id="3" name="Vertical Text Placeholder 2"/>
           <p:cNvSpPr>
             <a:spLocks noGrp="1"/>
           </p:cNvSpPr>
@@ -395,49 +358,43 @@
           <a:p>
             <a:pPr lvl="0"/>
             <a:r>
-              <a:rPr lang="zh-CN" altLang="en-US"/>
-              <a:t>单击此处编辑母版文本样式</a:t>
+              <a:rPr lang="en-US"/>
+              <a:t>Click to edit Master text styles</a:t>
             </a:r>
           </a:p>
           <a:p>
             <a:pPr lvl="1"/>
             <a:r>
-              <a:rPr lang="zh-CN" altLang="en-US"/>
-              <a:t>二级</a:t>
+              <a:rPr lang="en-US"/>
+              <a:t>Second level</a:t>
             </a:r>
           </a:p>
           <a:p>
             <a:pPr lvl="2"/>
             <a:r>
-              <a:rPr lang="zh-CN" altLang="en-US"/>
-              <a:t>三级</a:t>
+              <a:rPr lang="en-US"/>
+              <a:t>Third level</a:t>
             </a:r>
           </a:p>
           <a:p>
             <a:pPr lvl="3"/>
             <a:r>
-              <a:rPr lang="zh-CN" altLang="en-US"/>
-              <a:t>四级</a:t>
+              <a:rPr lang="en-US"/>
+              <a:t>Fourth level</a:t>
             </a:r>
           </a:p>
           <a:p>
             <a:pPr lvl="4"/>
             <a:r>
-              <a:rPr lang="zh-CN" altLang="en-US"/>
-              <a:t>五级</a:t>
-            </a:r>
-          </a:p>
-        </p:txBody>
-      </p:sp>
-      <p:sp>
-        <p:nvSpPr>
-          <p:cNvPr id="4" name="日期占位符 3">
-            <a:extLst>
-              <a:ext uri="{FF2B5EF4-FFF2-40B4-BE49-F238E27FC236}">
-                <a16:creationId xmlns:a16="http://schemas.microsoft.com/office/drawing/2014/main" id="{DEF50CB3-8937-4101-BABB-9A4BF947A78D}"/>
-              </a:ext>
-            </a:extLst>
-          </p:cNvPr>
+              <a:rPr lang="en-US"/>
+              <a:t>Fifth level</a:t>
+            </a:r>
+          </a:p>
+        </p:txBody>
+      </p:sp>
+      <p:sp>
+        <p:nvSpPr>
+          <p:cNvPr id="4" name="Date Placeholder 3"/>
           <p:cNvSpPr>
             <a:spLocks noGrp="1"/>
           </p:cNvSpPr>
@@ -450,23 +407,17 @@
           <a:bodyPr/>
           <a:lstStyle/>
           <a:p>
-            <a:fld id="{488607AE-241E-4541-9A94-40C722101DE2}" type="datetimeFigureOut">
-              <a:rPr lang="zh-CN" altLang="en-US" smtClean="0"/>
-              <a:t>2019/6/27</a:t>
+            <a:fld id="{9ED3734C-ACA2-CD44-9419-3EA4E9A728CC}" type="datetimeFigureOut">
+              <a:rPr lang="en-US" smtClean="0"/>
+              <a:t>12/5/2019</a:t>
             </a:fld>
-            <a:endParaRPr lang="zh-CN" altLang="en-US"/>
-          </a:p>
-        </p:txBody>
-      </p:sp>
-      <p:sp>
-        <p:nvSpPr>
-          <p:cNvPr id="5" name="页脚占位符 4">
-            <a:extLst>
-              <a:ext uri="{FF2B5EF4-FFF2-40B4-BE49-F238E27FC236}">
-                <a16:creationId xmlns:a16="http://schemas.microsoft.com/office/drawing/2014/main" id="{4D1C46FA-35B6-43F3-B54F-446C800A52AA}"/>
-              </a:ext>
-            </a:extLst>
-          </p:cNvPr>
+            <a:endParaRPr lang="en-US"/>
+          </a:p>
+        </p:txBody>
+      </p:sp>
+      <p:sp>
+        <p:nvSpPr>
+          <p:cNvPr id="5" name="Footer Placeholder 4"/>
           <p:cNvSpPr>
             <a:spLocks noGrp="1"/>
           </p:cNvSpPr>
@@ -479,19 +430,13 @@
           <a:bodyPr/>
           <a:lstStyle/>
           <a:p>
-            <a:endParaRPr lang="zh-CN" altLang="en-US"/>
-          </a:p>
-        </p:txBody>
-      </p:sp>
-      <p:sp>
-        <p:nvSpPr>
-          <p:cNvPr id="6" name="灯片编号占位符 5">
-            <a:extLst>
-              <a:ext uri="{FF2B5EF4-FFF2-40B4-BE49-F238E27FC236}">
-                <a16:creationId xmlns:a16="http://schemas.microsoft.com/office/drawing/2014/main" id="{ECA19D81-4324-4E78-BBCB-28D16A1EBF3B}"/>
-              </a:ext>
-            </a:extLst>
-          </p:cNvPr>
+            <a:endParaRPr lang="en-US"/>
+          </a:p>
+        </p:txBody>
+      </p:sp>
+      <p:sp>
+        <p:nvSpPr>
+          <p:cNvPr id="6" name="Slide Number Placeholder 5"/>
           <p:cNvSpPr>
             <a:spLocks noGrp="1"/>
           </p:cNvSpPr>
@@ -504,18 +449,18 @@
           <a:bodyPr/>
           <a:lstStyle/>
           <a:p>
-            <a:fld id="{7673EE0C-0863-498C-9054-DB8CCFC87F4C}" type="slidenum">
-              <a:rPr lang="zh-CN" altLang="en-US" smtClean="0"/>
+            <a:fld id="{1F412440-1B23-604B-B178-CB159C9EC6EA}" type="slidenum">
+              <a:rPr lang="en-US" smtClean="0"/>
               <a:t>‹#›</a:t>
             </a:fld>
-            <a:endParaRPr lang="zh-CN" altLang="en-US"/>
+            <a:endParaRPr lang="en-US"/>
           </a:p>
         </p:txBody>
       </p:sp>
     </p:spTree>
     <p:extLst>
       <p:ext uri="{BB962C8B-B14F-4D97-AF65-F5344CB8AC3E}">
-        <p14:creationId xmlns:p14="http://schemas.microsoft.com/office/powerpoint/2010/main" val="4007917575"/>
+        <p14:creationId xmlns:p14="http://schemas.microsoft.com/office/powerpoint/2010/main" val="821528851"/>
       </p:ext>
     </p:extLst>
   </p:cSld>
@@ -527,7 +472,7 @@
 
 <file path=ppt/slideLayouts/slideLayout11.xml><?xml version="1.0" encoding="utf-8"?>
 <p:sldLayout xmlns:a="http://schemas.openxmlformats.org/drawingml/2006/main" xmlns:r="http://schemas.openxmlformats.org/officeDocument/2006/relationships" xmlns:p="http://schemas.openxmlformats.org/presentationml/2006/main" type="vertTitleAndTx" preserve="1">
-  <p:cSld name="竖排标题与文本">
+  <p:cSld name="Vertical Title and Text">
     <p:spTree>
       <p:nvGrpSpPr>
         <p:cNvPr id="1" name=""/>
@@ -544,13 +489,7 @@
       </p:grpSpPr>
       <p:sp>
         <p:nvSpPr>
-          <p:cNvPr id="2" name="竖排标题 1">
-            <a:extLst>
-              <a:ext uri="{FF2B5EF4-FFF2-40B4-BE49-F238E27FC236}">
-                <a16:creationId xmlns:a16="http://schemas.microsoft.com/office/drawing/2014/main" id="{76B62B14-6685-44B4-BB6D-0C469F412C1A}"/>
-              </a:ext>
-            </a:extLst>
-          </p:cNvPr>
+          <p:cNvPr id="2" name="Vertical Title 1"/>
           <p:cNvSpPr>
             <a:spLocks noGrp="1"/>
           </p:cNvSpPr>
@@ -569,21 +508,15 @@
           <a:lstStyle/>
           <a:p>
             <a:r>
-              <a:rPr lang="zh-CN" altLang="en-US"/>
-              <a:t>单击此处编辑母版标题样式</a:t>
-            </a:r>
-          </a:p>
-        </p:txBody>
-      </p:sp>
-      <p:sp>
-        <p:nvSpPr>
-          <p:cNvPr id="3" name="竖排文字占位符 2">
-            <a:extLst>
-              <a:ext uri="{FF2B5EF4-FFF2-40B4-BE49-F238E27FC236}">
-                <a16:creationId xmlns:a16="http://schemas.microsoft.com/office/drawing/2014/main" id="{B46C389E-3F8A-4740-AFD3-17659AF5A3AF}"/>
-              </a:ext>
-            </a:extLst>
-          </p:cNvPr>
+              <a:rPr lang="en-US"/>
+              <a:t>Click to edit Master title style</a:t>
+            </a:r>
+          </a:p>
+        </p:txBody>
+      </p:sp>
+      <p:sp>
+        <p:nvSpPr>
+          <p:cNvPr id="3" name="Vertical Text Placeholder 2"/>
           <p:cNvSpPr>
             <a:spLocks noGrp="1"/>
           </p:cNvSpPr>
@@ -603,49 +536,43 @@
           <a:p>
             <a:pPr lvl="0"/>
             <a:r>
-              <a:rPr lang="zh-CN" altLang="en-US"/>
-              <a:t>单击此处编辑母版文本样式</a:t>
+              <a:rPr lang="en-US"/>
+              <a:t>Click to edit Master text styles</a:t>
             </a:r>
           </a:p>
           <a:p>
             <a:pPr lvl="1"/>
             <a:r>
-              <a:rPr lang="zh-CN" altLang="en-US"/>
-              <a:t>二级</a:t>
+              <a:rPr lang="en-US"/>
+              <a:t>Second level</a:t>
             </a:r>
           </a:p>
           <a:p>
             <a:pPr lvl="2"/>
             <a:r>
-              <a:rPr lang="zh-CN" altLang="en-US"/>
-              <a:t>三级</a:t>
+              <a:rPr lang="en-US"/>
+              <a:t>Third level</a:t>
             </a:r>
           </a:p>
           <a:p>
             <a:pPr lvl="3"/>
             <a:r>
-              <a:rPr lang="zh-CN" altLang="en-US"/>
-              <a:t>四级</a:t>
+              <a:rPr lang="en-US"/>
+              <a:t>Fourth level</a:t>
             </a:r>
           </a:p>
           <a:p>
             <a:pPr lvl="4"/>
             <a:r>
-              <a:rPr lang="zh-CN" altLang="en-US"/>
-              <a:t>五级</a:t>
-            </a:r>
-          </a:p>
-        </p:txBody>
-      </p:sp>
-      <p:sp>
-        <p:nvSpPr>
-          <p:cNvPr id="4" name="日期占位符 3">
-            <a:extLst>
-              <a:ext uri="{FF2B5EF4-FFF2-40B4-BE49-F238E27FC236}">
-                <a16:creationId xmlns:a16="http://schemas.microsoft.com/office/drawing/2014/main" id="{0E7E5460-3B8E-4763-9BF3-142F005C6EE4}"/>
-              </a:ext>
-            </a:extLst>
-          </p:cNvPr>
+              <a:rPr lang="en-US"/>
+              <a:t>Fifth level</a:t>
+            </a:r>
+          </a:p>
+        </p:txBody>
+      </p:sp>
+      <p:sp>
+        <p:nvSpPr>
+          <p:cNvPr id="4" name="Date Placeholder 3"/>
           <p:cNvSpPr>
             <a:spLocks noGrp="1"/>
           </p:cNvSpPr>
@@ -658,23 +585,17 @@
           <a:bodyPr/>
           <a:lstStyle/>
           <a:p>
-            <a:fld id="{488607AE-241E-4541-9A94-40C722101DE2}" type="datetimeFigureOut">
-              <a:rPr lang="zh-CN" altLang="en-US" smtClean="0"/>
-              <a:t>2019/6/27</a:t>
+            <a:fld id="{9ED3734C-ACA2-CD44-9419-3EA4E9A728CC}" type="datetimeFigureOut">
+              <a:rPr lang="en-US" smtClean="0"/>
+              <a:t>12/5/2019</a:t>
             </a:fld>
-            <a:endParaRPr lang="zh-CN" altLang="en-US"/>
-          </a:p>
-        </p:txBody>
-      </p:sp>
-      <p:sp>
-        <p:nvSpPr>
-          <p:cNvPr id="5" name="页脚占位符 4">
-            <a:extLst>
-              <a:ext uri="{FF2B5EF4-FFF2-40B4-BE49-F238E27FC236}">
-                <a16:creationId xmlns:a16="http://schemas.microsoft.com/office/drawing/2014/main" id="{F7DADC92-471A-46C6-9F60-128130E8BB1B}"/>
-              </a:ext>
-            </a:extLst>
-          </p:cNvPr>
+            <a:endParaRPr lang="en-US"/>
+          </a:p>
+        </p:txBody>
+      </p:sp>
+      <p:sp>
+        <p:nvSpPr>
+          <p:cNvPr id="5" name="Footer Placeholder 4"/>
           <p:cNvSpPr>
             <a:spLocks noGrp="1"/>
           </p:cNvSpPr>
@@ -687,19 +608,13 @@
           <a:bodyPr/>
           <a:lstStyle/>
           <a:p>
-            <a:endParaRPr lang="zh-CN" altLang="en-US"/>
-          </a:p>
-        </p:txBody>
-      </p:sp>
-      <p:sp>
-        <p:nvSpPr>
-          <p:cNvPr id="6" name="灯片编号占位符 5">
-            <a:extLst>
-              <a:ext uri="{FF2B5EF4-FFF2-40B4-BE49-F238E27FC236}">
-                <a16:creationId xmlns:a16="http://schemas.microsoft.com/office/drawing/2014/main" id="{3CF9632D-97D0-456E-B34C-2F1934F13BB8}"/>
-              </a:ext>
-            </a:extLst>
-          </p:cNvPr>
+            <a:endParaRPr lang="en-US"/>
+          </a:p>
+        </p:txBody>
+      </p:sp>
+      <p:sp>
+        <p:nvSpPr>
+          <p:cNvPr id="6" name="Slide Number Placeholder 5"/>
           <p:cNvSpPr>
             <a:spLocks noGrp="1"/>
           </p:cNvSpPr>
@@ -712,18 +627,18 @@
           <a:bodyPr/>
           <a:lstStyle/>
           <a:p>
-            <a:fld id="{7673EE0C-0863-498C-9054-DB8CCFC87F4C}" type="slidenum">
-              <a:rPr lang="zh-CN" altLang="en-US" smtClean="0"/>
+            <a:fld id="{1F412440-1B23-604B-B178-CB159C9EC6EA}" type="slidenum">
+              <a:rPr lang="en-US" smtClean="0"/>
               <a:t>‹#›</a:t>
             </a:fld>
-            <a:endParaRPr lang="zh-CN" altLang="en-US"/>
+            <a:endParaRPr lang="en-US"/>
           </a:p>
         </p:txBody>
       </p:sp>
     </p:spTree>
     <p:extLst>
       <p:ext uri="{BB962C8B-B14F-4D97-AF65-F5344CB8AC3E}">
-        <p14:creationId xmlns:p14="http://schemas.microsoft.com/office/powerpoint/2010/main" val="3746448495"/>
+        <p14:creationId xmlns:p14="http://schemas.microsoft.com/office/powerpoint/2010/main" val="1263032194"/>
       </p:ext>
     </p:extLst>
   </p:cSld>
@@ -735,7 +650,7 @@
 
 <file path=ppt/slideLayouts/slideLayout2.xml><?xml version="1.0" encoding="utf-8"?>
 <p:sldLayout xmlns:a="http://schemas.openxmlformats.org/drawingml/2006/main" xmlns:r="http://schemas.openxmlformats.org/officeDocument/2006/relationships" xmlns:p="http://schemas.openxmlformats.org/presentationml/2006/main" type="obj" preserve="1">
-  <p:cSld name="标题和内容">
+  <p:cSld name="Title and Content">
     <p:spTree>
       <p:nvGrpSpPr>
         <p:cNvPr id="1" name=""/>
@@ -752,13 +667,7 @@
       </p:grpSpPr>
       <p:sp>
         <p:nvSpPr>
-          <p:cNvPr id="2" name="标题 1">
-            <a:extLst>
-              <a:ext uri="{FF2B5EF4-FFF2-40B4-BE49-F238E27FC236}">
-                <a16:creationId xmlns:a16="http://schemas.microsoft.com/office/drawing/2014/main" id="{8F557C3E-EC16-4486-882E-2C6E324B695D}"/>
-              </a:ext>
-            </a:extLst>
-          </p:cNvPr>
+          <p:cNvPr id="2" name="Title 1"/>
           <p:cNvSpPr>
             <a:spLocks noGrp="1"/>
           </p:cNvSpPr>
@@ -772,21 +681,15 @@
           <a:lstStyle/>
           <a:p>
             <a:r>
-              <a:rPr lang="zh-CN" altLang="en-US"/>
-              <a:t>单击此处编辑母版标题样式</a:t>
-            </a:r>
-          </a:p>
-        </p:txBody>
-      </p:sp>
-      <p:sp>
-        <p:nvSpPr>
-          <p:cNvPr id="3" name="内容占位符 2">
-            <a:extLst>
-              <a:ext uri="{FF2B5EF4-FFF2-40B4-BE49-F238E27FC236}">
-                <a16:creationId xmlns:a16="http://schemas.microsoft.com/office/drawing/2014/main" id="{EA26A6B4-CB26-4DC2-A984-6269BA37FBA0}"/>
-              </a:ext>
-            </a:extLst>
-          </p:cNvPr>
+              <a:rPr lang="en-US"/>
+              <a:t>Click to edit Master title style</a:t>
+            </a:r>
+          </a:p>
+        </p:txBody>
+      </p:sp>
+      <p:sp>
+        <p:nvSpPr>
+          <p:cNvPr id="3" name="Content Placeholder 2"/>
           <p:cNvSpPr>
             <a:spLocks noGrp="1"/>
           </p:cNvSpPr>
@@ -801,49 +704,43 @@
           <a:p>
             <a:pPr lvl="0"/>
             <a:r>
-              <a:rPr lang="zh-CN" altLang="en-US"/>
-              <a:t>单击此处编辑母版文本样式</a:t>
+              <a:rPr lang="en-US"/>
+              <a:t>Click to edit Master text styles</a:t>
             </a:r>
           </a:p>
           <a:p>
             <a:pPr lvl="1"/>
             <a:r>
-              <a:rPr lang="zh-CN" altLang="en-US"/>
-              <a:t>二级</a:t>
+              <a:rPr lang="en-US"/>
+              <a:t>Second level</a:t>
             </a:r>
           </a:p>
           <a:p>
             <a:pPr lvl="2"/>
             <a:r>
-              <a:rPr lang="zh-CN" altLang="en-US"/>
-              <a:t>三级</a:t>
+              <a:rPr lang="en-US"/>
+              <a:t>Third level</a:t>
             </a:r>
           </a:p>
           <a:p>
             <a:pPr lvl="3"/>
             <a:r>
-              <a:rPr lang="zh-CN" altLang="en-US"/>
-              <a:t>四级</a:t>
+              <a:rPr lang="en-US"/>
+              <a:t>Fourth level</a:t>
             </a:r>
           </a:p>
           <a:p>
             <a:pPr lvl="4"/>
             <a:r>
-              <a:rPr lang="zh-CN" altLang="en-US"/>
-              <a:t>五级</a:t>
-            </a:r>
-          </a:p>
-        </p:txBody>
-      </p:sp>
-      <p:sp>
-        <p:nvSpPr>
-          <p:cNvPr id="4" name="日期占位符 3">
-            <a:extLst>
-              <a:ext uri="{FF2B5EF4-FFF2-40B4-BE49-F238E27FC236}">
-                <a16:creationId xmlns:a16="http://schemas.microsoft.com/office/drawing/2014/main" id="{362AC28E-3054-4EB5-9C9B-2775408AE85F}"/>
-              </a:ext>
-            </a:extLst>
-          </p:cNvPr>
+              <a:rPr lang="en-US"/>
+              <a:t>Fifth level</a:t>
+            </a:r>
+          </a:p>
+        </p:txBody>
+      </p:sp>
+      <p:sp>
+        <p:nvSpPr>
+          <p:cNvPr id="4" name="Date Placeholder 3"/>
           <p:cNvSpPr>
             <a:spLocks noGrp="1"/>
           </p:cNvSpPr>
@@ -856,23 +753,17 @@
           <a:bodyPr/>
           <a:lstStyle/>
           <a:p>
-            <a:fld id="{488607AE-241E-4541-9A94-40C722101DE2}" type="datetimeFigureOut">
-              <a:rPr lang="zh-CN" altLang="en-US" smtClean="0"/>
-              <a:t>2019/6/27</a:t>
+            <a:fld id="{9ED3734C-ACA2-CD44-9419-3EA4E9A728CC}" type="datetimeFigureOut">
+              <a:rPr lang="en-US" smtClean="0"/>
+              <a:t>12/5/2019</a:t>
             </a:fld>
-            <a:endParaRPr lang="zh-CN" altLang="en-US"/>
-          </a:p>
-        </p:txBody>
-      </p:sp>
-      <p:sp>
-        <p:nvSpPr>
-          <p:cNvPr id="5" name="页脚占位符 4">
-            <a:extLst>
-              <a:ext uri="{FF2B5EF4-FFF2-40B4-BE49-F238E27FC236}">
-                <a16:creationId xmlns:a16="http://schemas.microsoft.com/office/drawing/2014/main" id="{3C806D0D-EF2C-4485-BA8B-569B2044C9C0}"/>
-              </a:ext>
-            </a:extLst>
-          </p:cNvPr>
+            <a:endParaRPr lang="en-US"/>
+          </a:p>
+        </p:txBody>
+      </p:sp>
+      <p:sp>
+        <p:nvSpPr>
+          <p:cNvPr id="5" name="Footer Placeholder 4"/>
           <p:cNvSpPr>
             <a:spLocks noGrp="1"/>
           </p:cNvSpPr>
@@ -885,19 +776,13 @@
           <a:bodyPr/>
           <a:lstStyle/>
           <a:p>
-            <a:endParaRPr lang="zh-CN" altLang="en-US"/>
-          </a:p>
-        </p:txBody>
-      </p:sp>
-      <p:sp>
-        <p:nvSpPr>
-          <p:cNvPr id="6" name="灯片编号占位符 5">
-            <a:extLst>
-              <a:ext uri="{FF2B5EF4-FFF2-40B4-BE49-F238E27FC236}">
-                <a16:creationId xmlns:a16="http://schemas.microsoft.com/office/drawing/2014/main" id="{85EF0BF0-0B18-4976-9DE3-3B3FEB358D8C}"/>
-              </a:ext>
-            </a:extLst>
-          </p:cNvPr>
+            <a:endParaRPr lang="en-US"/>
+          </a:p>
+        </p:txBody>
+      </p:sp>
+      <p:sp>
+        <p:nvSpPr>
+          <p:cNvPr id="6" name="Slide Number Placeholder 5"/>
           <p:cNvSpPr>
             <a:spLocks noGrp="1"/>
           </p:cNvSpPr>
@@ -910,18 +795,18 @@
           <a:bodyPr/>
           <a:lstStyle/>
           <a:p>
-            <a:fld id="{7673EE0C-0863-498C-9054-DB8CCFC87F4C}" type="slidenum">
-              <a:rPr lang="zh-CN" altLang="en-US" smtClean="0"/>
+            <a:fld id="{1F412440-1B23-604B-B178-CB159C9EC6EA}" type="slidenum">
+              <a:rPr lang="en-US" smtClean="0"/>
               <a:t>‹#›</a:t>
             </a:fld>
-            <a:endParaRPr lang="zh-CN" altLang="en-US"/>
+            <a:endParaRPr lang="en-US"/>
           </a:p>
         </p:txBody>
       </p:sp>
     </p:spTree>
     <p:extLst>
       <p:ext uri="{BB962C8B-B14F-4D97-AF65-F5344CB8AC3E}">
-        <p14:creationId xmlns:p14="http://schemas.microsoft.com/office/powerpoint/2010/main" val="3664822978"/>
+        <p14:creationId xmlns:p14="http://schemas.microsoft.com/office/powerpoint/2010/main" val="1381078159"/>
       </p:ext>
     </p:extLst>
   </p:cSld>
@@ -933,7 +818,7 @@
 
 <file path=ppt/slideLayouts/slideLayout3.xml><?xml version="1.0" encoding="utf-8"?>
 <p:sldLayout xmlns:a="http://schemas.openxmlformats.org/drawingml/2006/main" xmlns:r="http://schemas.openxmlformats.org/officeDocument/2006/relationships" xmlns:p="http://schemas.openxmlformats.org/presentationml/2006/main" type="secHead" preserve="1">
-  <p:cSld name="节标题">
+  <p:cSld name="Section Header">
     <p:spTree>
       <p:nvGrpSpPr>
         <p:cNvPr id="1" name=""/>
@@ -950,13 +835,7 @@
       </p:grpSpPr>
       <p:sp>
         <p:nvSpPr>
-          <p:cNvPr id="2" name="标题 1">
-            <a:extLst>
-              <a:ext uri="{FF2B5EF4-FFF2-40B4-BE49-F238E27FC236}">
-                <a16:creationId xmlns:a16="http://schemas.microsoft.com/office/drawing/2014/main" id="{959E0B99-83E0-4AE9-8103-6C4F39AD7EC6}"/>
-              </a:ext>
-            </a:extLst>
-          </p:cNvPr>
+          <p:cNvPr id="2" name="Title 1"/>
           <p:cNvSpPr>
             <a:spLocks noGrp="1"/>
           </p:cNvSpPr>
@@ -979,21 +858,15 @@
           </a:lstStyle>
           <a:p>
             <a:r>
-              <a:rPr lang="zh-CN" altLang="en-US"/>
-              <a:t>单击此处编辑母版标题样式</a:t>
-            </a:r>
-          </a:p>
-        </p:txBody>
-      </p:sp>
-      <p:sp>
-        <p:nvSpPr>
-          <p:cNvPr id="3" name="文本占位符 2">
-            <a:extLst>
-              <a:ext uri="{FF2B5EF4-FFF2-40B4-BE49-F238E27FC236}">
-                <a16:creationId xmlns:a16="http://schemas.microsoft.com/office/drawing/2014/main" id="{1BFB71F3-927C-4A83-9643-5356F61B284B}"/>
-              </a:ext>
-            </a:extLst>
-          </p:cNvPr>
+              <a:rPr lang="en-US"/>
+              <a:t>Click to edit Master title style</a:t>
+            </a:r>
+          </a:p>
+        </p:txBody>
+      </p:sp>
+      <p:sp>
+        <p:nvSpPr>
+          <p:cNvPr id="3" name="Text Placeholder 2"/>
           <p:cNvSpPr>
             <a:spLocks noGrp="1"/>
           </p:cNvSpPr>
@@ -1104,21 +977,15 @@
           <a:p>
             <a:pPr lvl="0"/>
             <a:r>
-              <a:rPr lang="zh-CN" altLang="en-US"/>
-              <a:t>单击此处编辑母版文本样式</a:t>
-            </a:r>
-          </a:p>
-        </p:txBody>
-      </p:sp>
-      <p:sp>
-        <p:nvSpPr>
-          <p:cNvPr id="4" name="日期占位符 3">
-            <a:extLst>
-              <a:ext uri="{FF2B5EF4-FFF2-40B4-BE49-F238E27FC236}">
-                <a16:creationId xmlns:a16="http://schemas.microsoft.com/office/drawing/2014/main" id="{7169643B-C09C-4627-9E70-E410C8232114}"/>
-              </a:ext>
-            </a:extLst>
-          </p:cNvPr>
+              <a:rPr lang="en-US"/>
+              <a:t>Click to edit Master text styles</a:t>
+            </a:r>
+          </a:p>
+        </p:txBody>
+      </p:sp>
+      <p:sp>
+        <p:nvSpPr>
+          <p:cNvPr id="4" name="Date Placeholder 3"/>
           <p:cNvSpPr>
             <a:spLocks noGrp="1"/>
           </p:cNvSpPr>
@@ -1131,23 +998,17 @@
           <a:bodyPr/>
           <a:lstStyle/>
           <a:p>
-            <a:fld id="{488607AE-241E-4541-9A94-40C722101DE2}" type="datetimeFigureOut">
-              <a:rPr lang="zh-CN" altLang="en-US" smtClean="0"/>
-              <a:t>2019/6/27</a:t>
+            <a:fld id="{9ED3734C-ACA2-CD44-9419-3EA4E9A728CC}" type="datetimeFigureOut">
+              <a:rPr lang="en-US" smtClean="0"/>
+              <a:t>12/5/2019</a:t>
             </a:fld>
-            <a:endParaRPr lang="zh-CN" altLang="en-US"/>
-          </a:p>
-        </p:txBody>
-      </p:sp>
-      <p:sp>
-        <p:nvSpPr>
-          <p:cNvPr id="5" name="页脚占位符 4">
-            <a:extLst>
-              <a:ext uri="{FF2B5EF4-FFF2-40B4-BE49-F238E27FC236}">
-                <a16:creationId xmlns:a16="http://schemas.microsoft.com/office/drawing/2014/main" id="{677DBE73-F4E8-44E0-85E6-8594492A7C29}"/>
-              </a:ext>
-            </a:extLst>
-          </p:cNvPr>
+            <a:endParaRPr lang="en-US"/>
+          </a:p>
+        </p:txBody>
+      </p:sp>
+      <p:sp>
+        <p:nvSpPr>
+          <p:cNvPr id="5" name="Footer Placeholder 4"/>
           <p:cNvSpPr>
             <a:spLocks noGrp="1"/>
           </p:cNvSpPr>
@@ -1160,19 +1021,13 @@
           <a:bodyPr/>
           <a:lstStyle/>
           <a:p>
-            <a:endParaRPr lang="zh-CN" altLang="en-US"/>
-          </a:p>
-        </p:txBody>
-      </p:sp>
-      <p:sp>
-        <p:nvSpPr>
-          <p:cNvPr id="6" name="灯片编号占位符 5">
-            <a:extLst>
-              <a:ext uri="{FF2B5EF4-FFF2-40B4-BE49-F238E27FC236}">
-                <a16:creationId xmlns:a16="http://schemas.microsoft.com/office/drawing/2014/main" id="{B9C2310E-0EAC-48B4-9B09-4F5DA4394FF8}"/>
-              </a:ext>
-            </a:extLst>
-          </p:cNvPr>
+            <a:endParaRPr lang="en-US"/>
+          </a:p>
+        </p:txBody>
+      </p:sp>
+      <p:sp>
+        <p:nvSpPr>
+          <p:cNvPr id="6" name="Slide Number Placeholder 5"/>
           <p:cNvSpPr>
             <a:spLocks noGrp="1"/>
           </p:cNvSpPr>
@@ -1185,18 +1040,18 @@
           <a:bodyPr/>
           <a:lstStyle/>
           <a:p>
-            <a:fld id="{7673EE0C-0863-498C-9054-DB8CCFC87F4C}" type="slidenum">
-              <a:rPr lang="zh-CN" altLang="en-US" smtClean="0"/>
+            <a:fld id="{1F412440-1B23-604B-B178-CB159C9EC6EA}" type="slidenum">
+              <a:rPr lang="en-US" smtClean="0"/>
               <a:t>‹#›</a:t>
             </a:fld>
-            <a:endParaRPr lang="zh-CN" altLang="en-US"/>
+            <a:endParaRPr lang="en-US"/>
           </a:p>
         </p:txBody>
       </p:sp>
     </p:spTree>
     <p:extLst>
       <p:ext uri="{BB962C8B-B14F-4D97-AF65-F5344CB8AC3E}">
-        <p14:creationId xmlns:p14="http://schemas.microsoft.com/office/powerpoint/2010/main" val="2143164232"/>
+        <p14:creationId xmlns:p14="http://schemas.microsoft.com/office/powerpoint/2010/main" val="1777361537"/>
       </p:ext>
     </p:extLst>
   </p:cSld>
@@ -1208,7 +1063,7 @@
 
 <file path=ppt/slideLayouts/slideLayout4.xml><?xml version="1.0" encoding="utf-8"?>
 <p:sldLayout xmlns:a="http://schemas.openxmlformats.org/drawingml/2006/main" xmlns:r="http://schemas.openxmlformats.org/officeDocument/2006/relationships" xmlns:p="http://schemas.openxmlformats.org/presentationml/2006/main" type="twoObj" preserve="1">
-  <p:cSld name="两栏内容">
+  <p:cSld name="Two Content">
     <p:spTree>
       <p:nvGrpSpPr>
         <p:cNvPr id="1" name=""/>
@@ -1225,13 +1080,7 @@
       </p:grpSpPr>
       <p:sp>
         <p:nvSpPr>
-          <p:cNvPr id="2" name="标题 1">
-            <a:extLst>
-              <a:ext uri="{FF2B5EF4-FFF2-40B4-BE49-F238E27FC236}">
-                <a16:creationId xmlns:a16="http://schemas.microsoft.com/office/drawing/2014/main" id="{33EB559B-B464-4960-97B2-A3D6DE11759E}"/>
-              </a:ext>
-            </a:extLst>
-          </p:cNvPr>
+          <p:cNvPr id="2" name="Title 1"/>
           <p:cNvSpPr>
             <a:spLocks noGrp="1"/>
           </p:cNvSpPr>
@@ -1245,21 +1094,15 @@
           <a:lstStyle/>
           <a:p>
             <a:r>
-              <a:rPr lang="zh-CN" altLang="en-US"/>
-              <a:t>单击此处编辑母版标题样式</a:t>
-            </a:r>
-          </a:p>
-        </p:txBody>
-      </p:sp>
-      <p:sp>
-        <p:nvSpPr>
-          <p:cNvPr id="3" name="内容占位符 2">
-            <a:extLst>
-              <a:ext uri="{FF2B5EF4-FFF2-40B4-BE49-F238E27FC236}">
-                <a16:creationId xmlns:a16="http://schemas.microsoft.com/office/drawing/2014/main" id="{84EB285A-1A1B-42BC-B6A3-3044E86753A4}"/>
-              </a:ext>
-            </a:extLst>
-          </p:cNvPr>
+              <a:rPr lang="en-US"/>
+              <a:t>Click to edit Master title style</a:t>
+            </a:r>
+          </a:p>
+        </p:txBody>
+      </p:sp>
+      <p:sp>
+        <p:nvSpPr>
+          <p:cNvPr id="3" name="Content Placeholder 2"/>
           <p:cNvSpPr>
             <a:spLocks noGrp="1"/>
           </p:cNvSpPr>
@@ -1279,49 +1122,43 @@
           <a:p>
             <a:pPr lvl="0"/>
             <a:r>
-              <a:rPr lang="zh-CN" altLang="en-US"/>
-              <a:t>单击此处编辑母版文本样式</a:t>
+              <a:rPr lang="en-US"/>
+              <a:t>Click to edit Master text styles</a:t>
             </a:r>
           </a:p>
           <a:p>
             <a:pPr lvl="1"/>
             <a:r>
-              <a:rPr lang="zh-CN" altLang="en-US"/>
-              <a:t>二级</a:t>
+              <a:rPr lang="en-US"/>
+              <a:t>Second level</a:t>
             </a:r>
           </a:p>
           <a:p>
             <a:pPr lvl="2"/>
             <a:r>
-              <a:rPr lang="zh-CN" altLang="en-US"/>
-              <a:t>三级</a:t>
+              <a:rPr lang="en-US"/>
+              <a:t>Third level</a:t>
             </a:r>
           </a:p>
           <a:p>
             <a:pPr lvl="3"/>
             <a:r>
-              <a:rPr lang="zh-CN" altLang="en-US"/>
-              <a:t>四级</a:t>
+              <a:rPr lang="en-US"/>
+              <a:t>Fourth level</a:t>
             </a:r>
           </a:p>
           <a:p>
             <a:pPr lvl="4"/>
             <a:r>
-              <a:rPr lang="zh-CN" altLang="en-US"/>
-              <a:t>五级</a:t>
-            </a:r>
-          </a:p>
-        </p:txBody>
-      </p:sp>
-      <p:sp>
-        <p:nvSpPr>
-          <p:cNvPr id="4" name="内容占位符 3">
-            <a:extLst>
-              <a:ext uri="{FF2B5EF4-FFF2-40B4-BE49-F238E27FC236}">
-                <a16:creationId xmlns:a16="http://schemas.microsoft.com/office/drawing/2014/main" id="{84DD7182-3EB6-42C3-8751-45D001CA0E69}"/>
-              </a:ext>
-            </a:extLst>
-          </p:cNvPr>
+              <a:rPr lang="en-US"/>
+              <a:t>Fifth level</a:t>
+            </a:r>
+          </a:p>
+        </p:txBody>
+      </p:sp>
+      <p:sp>
+        <p:nvSpPr>
+          <p:cNvPr id="4" name="Content Placeholder 3"/>
           <p:cNvSpPr>
             <a:spLocks noGrp="1"/>
           </p:cNvSpPr>
@@ -1341,49 +1178,43 @@
           <a:p>
             <a:pPr lvl="0"/>
             <a:r>
-              <a:rPr lang="zh-CN" altLang="en-US"/>
-              <a:t>单击此处编辑母版文本样式</a:t>
+              <a:rPr lang="en-US"/>
+              <a:t>Click to edit Master text styles</a:t>
             </a:r>
           </a:p>
           <a:p>
             <a:pPr lvl="1"/>
             <a:r>
-              <a:rPr lang="zh-CN" altLang="en-US"/>
-              <a:t>二级</a:t>
+              <a:rPr lang="en-US"/>
+              <a:t>Second level</a:t>
             </a:r>
           </a:p>
           <a:p>
             <a:pPr lvl="2"/>
             <a:r>
-              <a:rPr lang="zh-CN" altLang="en-US"/>
-              <a:t>三级</a:t>
+              <a:rPr lang="en-US"/>
+              <a:t>Third level</a:t>
             </a:r>
           </a:p>
           <a:p>
             <a:pPr lvl="3"/>
             <a:r>
-              <a:rPr lang="zh-CN" altLang="en-US"/>
-              <a:t>四级</a:t>
+              <a:rPr lang="en-US"/>
+              <a:t>Fourth level</a:t>
             </a:r>
           </a:p>
           <a:p>
             <a:pPr lvl="4"/>
             <a:r>
-              <a:rPr lang="zh-CN" altLang="en-US"/>
-              <a:t>五级</a:t>
-            </a:r>
-          </a:p>
-        </p:txBody>
-      </p:sp>
-      <p:sp>
-        <p:nvSpPr>
-          <p:cNvPr id="5" name="日期占位符 4">
-            <a:extLst>
-              <a:ext uri="{FF2B5EF4-FFF2-40B4-BE49-F238E27FC236}">
-                <a16:creationId xmlns:a16="http://schemas.microsoft.com/office/drawing/2014/main" id="{8C5E1537-4603-4812-8D28-CECDA6FEFCE9}"/>
-              </a:ext>
-            </a:extLst>
-          </p:cNvPr>
+              <a:rPr lang="en-US"/>
+              <a:t>Fifth level</a:t>
+            </a:r>
+          </a:p>
+        </p:txBody>
+      </p:sp>
+      <p:sp>
+        <p:nvSpPr>
+          <p:cNvPr id="5" name="Date Placeholder 4"/>
           <p:cNvSpPr>
             <a:spLocks noGrp="1"/>
           </p:cNvSpPr>
@@ -1396,23 +1227,17 @@
           <a:bodyPr/>
           <a:lstStyle/>
           <a:p>
-            <a:fld id="{488607AE-241E-4541-9A94-40C722101DE2}" type="datetimeFigureOut">
-              <a:rPr lang="zh-CN" altLang="en-US" smtClean="0"/>
-              <a:t>2019/6/27</a:t>
+            <a:fld id="{9ED3734C-ACA2-CD44-9419-3EA4E9A728CC}" type="datetimeFigureOut">
+              <a:rPr lang="en-US" smtClean="0"/>
+              <a:t>12/5/2019</a:t>
             </a:fld>
-            <a:endParaRPr lang="zh-CN" altLang="en-US"/>
-          </a:p>
-        </p:txBody>
-      </p:sp>
-      <p:sp>
-        <p:nvSpPr>
-          <p:cNvPr id="6" name="页脚占位符 5">
-            <a:extLst>
-              <a:ext uri="{FF2B5EF4-FFF2-40B4-BE49-F238E27FC236}">
-                <a16:creationId xmlns:a16="http://schemas.microsoft.com/office/drawing/2014/main" id="{B32E3E13-B791-4266-8D7F-74E98A441083}"/>
-              </a:ext>
-            </a:extLst>
-          </p:cNvPr>
+            <a:endParaRPr lang="en-US"/>
+          </a:p>
+        </p:txBody>
+      </p:sp>
+      <p:sp>
+        <p:nvSpPr>
+          <p:cNvPr id="6" name="Footer Placeholder 5"/>
           <p:cNvSpPr>
             <a:spLocks noGrp="1"/>
           </p:cNvSpPr>
@@ -1425,19 +1250,13 @@
           <a:bodyPr/>
           <a:lstStyle/>
           <a:p>
-            <a:endParaRPr lang="zh-CN" altLang="en-US"/>
-          </a:p>
-        </p:txBody>
-      </p:sp>
-      <p:sp>
-        <p:nvSpPr>
-          <p:cNvPr id="7" name="灯片编号占位符 6">
-            <a:extLst>
-              <a:ext uri="{FF2B5EF4-FFF2-40B4-BE49-F238E27FC236}">
-                <a16:creationId xmlns:a16="http://schemas.microsoft.com/office/drawing/2014/main" id="{AB1AEA81-91A1-465B-8AAA-2FD5DCB56DB5}"/>
-              </a:ext>
-            </a:extLst>
-          </p:cNvPr>
+            <a:endParaRPr lang="en-US"/>
+          </a:p>
+        </p:txBody>
+      </p:sp>
+      <p:sp>
+        <p:nvSpPr>
+          <p:cNvPr id="7" name="Slide Number Placeholder 6"/>
           <p:cNvSpPr>
             <a:spLocks noGrp="1"/>
           </p:cNvSpPr>
@@ -1450,18 +1269,18 @@
           <a:bodyPr/>
           <a:lstStyle/>
           <a:p>
-            <a:fld id="{7673EE0C-0863-498C-9054-DB8CCFC87F4C}" type="slidenum">
-              <a:rPr lang="zh-CN" altLang="en-US" smtClean="0"/>
+            <a:fld id="{1F412440-1B23-604B-B178-CB159C9EC6EA}" type="slidenum">
+              <a:rPr lang="en-US" smtClean="0"/>
               <a:t>‹#›</a:t>
             </a:fld>
-            <a:endParaRPr lang="zh-CN" altLang="en-US"/>
+            <a:endParaRPr lang="en-US"/>
           </a:p>
         </p:txBody>
       </p:sp>
     </p:spTree>
     <p:extLst>
       <p:ext uri="{BB962C8B-B14F-4D97-AF65-F5344CB8AC3E}">
-        <p14:creationId xmlns:p14="http://schemas.microsoft.com/office/powerpoint/2010/main" val="283675285"/>
+        <p14:creationId xmlns:p14="http://schemas.microsoft.com/office/powerpoint/2010/main" val="617822589"/>
       </p:ext>
     </p:extLst>
   </p:cSld>
@@ -1473,7 +1292,7 @@
 
 <file path=ppt/slideLayouts/slideLayout5.xml><?xml version="1.0" encoding="utf-8"?>
 <p:sldLayout xmlns:a="http://schemas.openxmlformats.org/drawingml/2006/main" xmlns:r="http://schemas.openxmlformats.org/officeDocument/2006/relationships" xmlns:p="http://schemas.openxmlformats.org/presentationml/2006/main" type="twoTxTwoObj" preserve="1">
-  <p:cSld name="比较">
+  <p:cSld name="Comparison">
     <p:spTree>
       <p:nvGrpSpPr>
         <p:cNvPr id="1" name=""/>
@@ -1490,13 +1309,7 @@
       </p:grpSpPr>
       <p:sp>
         <p:nvSpPr>
-          <p:cNvPr id="2" name="标题 1">
-            <a:extLst>
-              <a:ext uri="{FF2B5EF4-FFF2-40B4-BE49-F238E27FC236}">
-                <a16:creationId xmlns:a16="http://schemas.microsoft.com/office/drawing/2014/main" id="{5A16154C-DE6B-45C3-8B51-0019DCB42412}"/>
-              </a:ext>
-            </a:extLst>
-          </p:cNvPr>
+          <p:cNvPr id="2" name="Title 1"/>
           <p:cNvSpPr>
             <a:spLocks noGrp="1"/>
           </p:cNvSpPr>
@@ -1515,21 +1328,15 @@
           <a:lstStyle/>
           <a:p>
             <a:r>
-              <a:rPr lang="zh-CN" altLang="en-US"/>
-              <a:t>单击此处编辑母版标题样式</a:t>
-            </a:r>
-          </a:p>
-        </p:txBody>
-      </p:sp>
-      <p:sp>
-        <p:nvSpPr>
-          <p:cNvPr id="3" name="文本占位符 2">
-            <a:extLst>
-              <a:ext uri="{FF2B5EF4-FFF2-40B4-BE49-F238E27FC236}">
-                <a16:creationId xmlns:a16="http://schemas.microsoft.com/office/drawing/2014/main" id="{F553BC3D-C6B9-4198-8428-55E496410D74}"/>
-              </a:ext>
-            </a:extLst>
-          </p:cNvPr>
+              <a:rPr lang="en-US"/>
+              <a:t>Click to edit Master title style</a:t>
+            </a:r>
+          </a:p>
+        </p:txBody>
+      </p:sp>
+      <p:sp>
+        <p:nvSpPr>
+          <p:cNvPr id="3" name="Text Placeholder 2"/>
           <p:cNvSpPr>
             <a:spLocks noGrp="1"/>
           </p:cNvSpPr>
@@ -1586,21 +1393,15 @@
           <a:p>
             <a:pPr lvl="0"/>
             <a:r>
-              <a:rPr lang="zh-CN" altLang="en-US"/>
-              <a:t>单击此处编辑母版文本样式</a:t>
-            </a:r>
-          </a:p>
-        </p:txBody>
-      </p:sp>
-      <p:sp>
-        <p:nvSpPr>
-          <p:cNvPr id="4" name="内容占位符 3">
-            <a:extLst>
-              <a:ext uri="{FF2B5EF4-FFF2-40B4-BE49-F238E27FC236}">
-                <a16:creationId xmlns:a16="http://schemas.microsoft.com/office/drawing/2014/main" id="{D55D7306-B8AA-463D-ABF2-6B8A04E87C71}"/>
-              </a:ext>
-            </a:extLst>
-          </p:cNvPr>
+              <a:rPr lang="en-US"/>
+              <a:t>Click to edit Master text styles</a:t>
+            </a:r>
+          </a:p>
+        </p:txBody>
+      </p:sp>
+      <p:sp>
+        <p:nvSpPr>
+          <p:cNvPr id="4" name="Content Placeholder 3"/>
           <p:cNvSpPr>
             <a:spLocks noGrp="1"/>
           </p:cNvSpPr>
@@ -1620,49 +1421,43 @@
           <a:p>
             <a:pPr lvl="0"/>
             <a:r>
-              <a:rPr lang="zh-CN" altLang="en-US"/>
-              <a:t>单击此处编辑母版文本样式</a:t>
+              <a:rPr lang="en-US"/>
+              <a:t>Click to edit Master text styles</a:t>
             </a:r>
           </a:p>
           <a:p>
             <a:pPr lvl="1"/>
             <a:r>
-              <a:rPr lang="zh-CN" altLang="en-US"/>
-              <a:t>二级</a:t>
+              <a:rPr lang="en-US"/>
+              <a:t>Second level</a:t>
             </a:r>
           </a:p>
           <a:p>
             <a:pPr lvl="2"/>
             <a:r>
-              <a:rPr lang="zh-CN" altLang="en-US"/>
-              <a:t>三级</a:t>
+              <a:rPr lang="en-US"/>
+              <a:t>Third level</a:t>
             </a:r>
           </a:p>
           <a:p>
             <a:pPr lvl="3"/>
             <a:r>
-              <a:rPr lang="zh-CN" altLang="en-US"/>
-              <a:t>四级</a:t>
+              <a:rPr lang="en-US"/>
+              <a:t>Fourth level</a:t>
             </a:r>
           </a:p>
           <a:p>
             <a:pPr lvl="4"/>
             <a:r>
-              <a:rPr lang="zh-CN" altLang="en-US"/>
-              <a:t>五级</a:t>
-            </a:r>
-          </a:p>
-        </p:txBody>
-      </p:sp>
-      <p:sp>
-        <p:nvSpPr>
-          <p:cNvPr id="5" name="文本占位符 4">
-            <a:extLst>
-              <a:ext uri="{FF2B5EF4-FFF2-40B4-BE49-F238E27FC236}">
-                <a16:creationId xmlns:a16="http://schemas.microsoft.com/office/drawing/2014/main" id="{429A6106-10D3-449C-B11C-1B3DE367EDAD}"/>
-              </a:ext>
-            </a:extLst>
-          </p:cNvPr>
+              <a:rPr lang="en-US"/>
+              <a:t>Fifth level</a:t>
+            </a:r>
+          </a:p>
+        </p:txBody>
+      </p:sp>
+      <p:sp>
+        <p:nvSpPr>
+          <p:cNvPr id="5" name="Text Placeholder 4"/>
           <p:cNvSpPr>
             <a:spLocks noGrp="1"/>
           </p:cNvSpPr>
@@ -1719,21 +1514,15 @@
           <a:p>
             <a:pPr lvl="0"/>
             <a:r>
-              <a:rPr lang="zh-CN" altLang="en-US"/>
-              <a:t>单击此处编辑母版文本样式</a:t>
-            </a:r>
-          </a:p>
-        </p:txBody>
-      </p:sp>
-      <p:sp>
-        <p:nvSpPr>
-          <p:cNvPr id="6" name="内容占位符 5">
-            <a:extLst>
-              <a:ext uri="{FF2B5EF4-FFF2-40B4-BE49-F238E27FC236}">
-                <a16:creationId xmlns:a16="http://schemas.microsoft.com/office/drawing/2014/main" id="{8EE846C3-E1A7-41F7-A16B-A748FA8AF438}"/>
-              </a:ext>
-            </a:extLst>
-          </p:cNvPr>
+              <a:rPr lang="en-US"/>
+              <a:t>Click to edit Master text styles</a:t>
+            </a:r>
+          </a:p>
+        </p:txBody>
+      </p:sp>
+      <p:sp>
+        <p:nvSpPr>
+          <p:cNvPr id="6" name="Content Placeholder 5"/>
           <p:cNvSpPr>
             <a:spLocks noGrp="1"/>
           </p:cNvSpPr>
@@ -1753,49 +1542,43 @@
           <a:p>
             <a:pPr lvl="0"/>
             <a:r>
-              <a:rPr lang="zh-CN" altLang="en-US"/>
-              <a:t>单击此处编辑母版文本样式</a:t>
+              <a:rPr lang="en-US"/>
+              <a:t>Click to edit Master text styles</a:t>
             </a:r>
           </a:p>
           <a:p>
             <a:pPr lvl="1"/>
             <a:r>
-              <a:rPr lang="zh-CN" altLang="en-US"/>
-              <a:t>二级</a:t>
+              <a:rPr lang="en-US"/>
+              <a:t>Second level</a:t>
             </a:r>
           </a:p>
           <a:p>
             <a:pPr lvl="2"/>
             <a:r>
-              <a:rPr lang="zh-CN" altLang="en-US"/>
-              <a:t>三级</a:t>
+              <a:rPr lang="en-US"/>
+              <a:t>Third level</a:t>
             </a:r>
           </a:p>
           <a:p>
             <a:pPr lvl="3"/>
             <a:r>
-              <a:rPr lang="zh-CN" altLang="en-US"/>
-              <a:t>四级</a:t>
+              <a:rPr lang="en-US"/>
+              <a:t>Fourth level</a:t>
             </a:r>
           </a:p>
           <a:p>
             <a:pPr lvl="4"/>
             <a:r>
-              <a:rPr lang="zh-CN" altLang="en-US"/>
-              <a:t>五级</a:t>
-            </a:r>
-          </a:p>
-        </p:txBody>
-      </p:sp>
-      <p:sp>
-        <p:nvSpPr>
-          <p:cNvPr id="7" name="日期占位符 6">
-            <a:extLst>
-              <a:ext uri="{FF2B5EF4-FFF2-40B4-BE49-F238E27FC236}">
-                <a16:creationId xmlns:a16="http://schemas.microsoft.com/office/drawing/2014/main" id="{47B93BB4-43B7-4994-B393-E96C41D52BF1}"/>
-              </a:ext>
-            </a:extLst>
-          </p:cNvPr>
+              <a:rPr lang="en-US"/>
+              <a:t>Fifth level</a:t>
+            </a:r>
+          </a:p>
+        </p:txBody>
+      </p:sp>
+      <p:sp>
+        <p:nvSpPr>
+          <p:cNvPr id="7" name="Date Placeholder 6"/>
           <p:cNvSpPr>
             <a:spLocks noGrp="1"/>
           </p:cNvSpPr>
@@ -1808,23 +1591,17 @@
           <a:bodyPr/>
           <a:lstStyle/>
           <a:p>
-            <a:fld id="{488607AE-241E-4541-9A94-40C722101DE2}" type="datetimeFigureOut">
-              <a:rPr lang="zh-CN" altLang="en-US" smtClean="0"/>
-              <a:t>2019/6/27</a:t>
+            <a:fld id="{9ED3734C-ACA2-CD44-9419-3EA4E9A728CC}" type="datetimeFigureOut">
+              <a:rPr lang="en-US" smtClean="0"/>
+              <a:t>12/5/2019</a:t>
             </a:fld>
-            <a:endParaRPr lang="zh-CN" altLang="en-US"/>
-          </a:p>
-        </p:txBody>
-      </p:sp>
-      <p:sp>
-        <p:nvSpPr>
-          <p:cNvPr id="8" name="页脚占位符 7">
-            <a:extLst>
-              <a:ext uri="{FF2B5EF4-FFF2-40B4-BE49-F238E27FC236}">
-                <a16:creationId xmlns:a16="http://schemas.microsoft.com/office/drawing/2014/main" id="{6712D3D2-2017-4C85-AAB3-53E39B4ACE6C}"/>
-              </a:ext>
-            </a:extLst>
-          </p:cNvPr>
+            <a:endParaRPr lang="en-US"/>
+          </a:p>
+        </p:txBody>
+      </p:sp>
+      <p:sp>
+        <p:nvSpPr>
+          <p:cNvPr id="8" name="Footer Placeholder 7"/>
           <p:cNvSpPr>
             <a:spLocks noGrp="1"/>
           </p:cNvSpPr>
@@ -1837,19 +1614,13 @@
           <a:bodyPr/>
           <a:lstStyle/>
           <a:p>
-            <a:endParaRPr lang="zh-CN" altLang="en-US"/>
-          </a:p>
-        </p:txBody>
-      </p:sp>
-      <p:sp>
-        <p:nvSpPr>
-          <p:cNvPr id="9" name="灯片编号占位符 8">
-            <a:extLst>
-              <a:ext uri="{FF2B5EF4-FFF2-40B4-BE49-F238E27FC236}">
-                <a16:creationId xmlns:a16="http://schemas.microsoft.com/office/drawing/2014/main" id="{DB8B9B62-4692-4D0F-AED0-598E7B179323}"/>
-              </a:ext>
-            </a:extLst>
-          </p:cNvPr>
+            <a:endParaRPr lang="en-US"/>
+          </a:p>
+        </p:txBody>
+      </p:sp>
+      <p:sp>
+        <p:nvSpPr>
+          <p:cNvPr id="9" name="Slide Number Placeholder 8"/>
           <p:cNvSpPr>
             <a:spLocks noGrp="1"/>
           </p:cNvSpPr>
@@ -1862,18 +1633,18 @@
           <a:bodyPr/>
           <a:lstStyle/>
           <a:p>
-            <a:fld id="{7673EE0C-0863-498C-9054-DB8CCFC87F4C}" type="slidenum">
-              <a:rPr lang="zh-CN" altLang="en-US" smtClean="0"/>
+            <a:fld id="{1F412440-1B23-604B-B178-CB159C9EC6EA}" type="slidenum">
+              <a:rPr lang="en-US" smtClean="0"/>
               <a:t>‹#›</a:t>
             </a:fld>
-            <a:endParaRPr lang="zh-CN" altLang="en-US"/>
+            <a:endParaRPr lang="en-US"/>
           </a:p>
         </p:txBody>
       </p:sp>
     </p:spTree>
     <p:extLst>
       <p:ext uri="{BB962C8B-B14F-4D97-AF65-F5344CB8AC3E}">
-        <p14:creationId xmlns:p14="http://schemas.microsoft.com/office/powerpoint/2010/main" val="622414609"/>
+        <p14:creationId xmlns:p14="http://schemas.microsoft.com/office/powerpoint/2010/main" val="660820078"/>
       </p:ext>
     </p:extLst>
   </p:cSld>
@@ -1885,7 +1656,7 @@
 
 <file path=ppt/slideLayouts/slideLayout6.xml><?xml version="1.0" encoding="utf-8"?>
 <p:sldLayout xmlns:a="http://schemas.openxmlformats.org/drawingml/2006/main" xmlns:r="http://schemas.openxmlformats.org/officeDocument/2006/relationships" xmlns:p="http://schemas.openxmlformats.org/presentationml/2006/main" type="titleOnly" preserve="1">
-  <p:cSld name="仅标题">
+  <p:cSld name="Title Only">
     <p:spTree>
       <p:nvGrpSpPr>
         <p:cNvPr id="1" name=""/>
@@ -1902,13 +1673,7 @@
       </p:grpSpPr>
       <p:sp>
         <p:nvSpPr>
-          <p:cNvPr id="2" name="标题 1">
-            <a:extLst>
-              <a:ext uri="{FF2B5EF4-FFF2-40B4-BE49-F238E27FC236}">
-                <a16:creationId xmlns:a16="http://schemas.microsoft.com/office/drawing/2014/main" id="{79B3E16C-98CB-4547-A8E8-2B30BB6A149C}"/>
-              </a:ext>
-            </a:extLst>
-          </p:cNvPr>
+          <p:cNvPr id="2" name="Title 1"/>
           <p:cNvSpPr>
             <a:spLocks noGrp="1"/>
           </p:cNvSpPr>
@@ -1922,21 +1687,15 @@
           <a:lstStyle/>
           <a:p>
             <a:r>
-              <a:rPr lang="zh-CN" altLang="en-US"/>
-              <a:t>单击此处编辑母版标题样式</a:t>
-            </a:r>
-          </a:p>
-        </p:txBody>
-      </p:sp>
-      <p:sp>
-        <p:nvSpPr>
-          <p:cNvPr id="3" name="日期占位符 2">
-            <a:extLst>
-              <a:ext uri="{FF2B5EF4-FFF2-40B4-BE49-F238E27FC236}">
-                <a16:creationId xmlns:a16="http://schemas.microsoft.com/office/drawing/2014/main" id="{D075FEB9-43B7-47BA-A36E-0BAC21F24696}"/>
-              </a:ext>
-            </a:extLst>
-          </p:cNvPr>
+              <a:rPr lang="en-US"/>
+              <a:t>Click to edit Master title style</a:t>
+            </a:r>
+          </a:p>
+        </p:txBody>
+      </p:sp>
+      <p:sp>
+        <p:nvSpPr>
+          <p:cNvPr id="3" name="Date Placeholder 2"/>
           <p:cNvSpPr>
             <a:spLocks noGrp="1"/>
           </p:cNvSpPr>
@@ -1949,23 +1708,17 @@
           <a:bodyPr/>
           <a:lstStyle/>
           <a:p>
-            <a:fld id="{488607AE-241E-4541-9A94-40C722101DE2}" type="datetimeFigureOut">
-              <a:rPr lang="zh-CN" altLang="en-US" smtClean="0"/>
-              <a:t>2019/6/27</a:t>
+            <a:fld id="{9ED3734C-ACA2-CD44-9419-3EA4E9A728CC}" type="datetimeFigureOut">
+              <a:rPr lang="en-US" smtClean="0"/>
+              <a:t>12/5/2019</a:t>
             </a:fld>
-            <a:endParaRPr lang="zh-CN" altLang="en-US"/>
-          </a:p>
-        </p:txBody>
-      </p:sp>
-      <p:sp>
-        <p:nvSpPr>
-          <p:cNvPr id="4" name="页脚占位符 3">
-            <a:extLst>
-              <a:ext uri="{FF2B5EF4-FFF2-40B4-BE49-F238E27FC236}">
-                <a16:creationId xmlns:a16="http://schemas.microsoft.com/office/drawing/2014/main" id="{46E47B75-9BA0-415E-842A-1DF7A6CABF20}"/>
-              </a:ext>
-            </a:extLst>
-          </p:cNvPr>
+            <a:endParaRPr lang="en-US"/>
+          </a:p>
+        </p:txBody>
+      </p:sp>
+      <p:sp>
+        <p:nvSpPr>
+          <p:cNvPr id="4" name="Footer Placeholder 3"/>
           <p:cNvSpPr>
             <a:spLocks noGrp="1"/>
           </p:cNvSpPr>
@@ -1978,19 +1731,13 @@
           <a:bodyPr/>
           <a:lstStyle/>
           <a:p>
-            <a:endParaRPr lang="zh-CN" altLang="en-US"/>
-          </a:p>
-        </p:txBody>
-      </p:sp>
-      <p:sp>
-        <p:nvSpPr>
-          <p:cNvPr id="5" name="灯片编号占位符 4">
-            <a:extLst>
-              <a:ext uri="{FF2B5EF4-FFF2-40B4-BE49-F238E27FC236}">
-                <a16:creationId xmlns:a16="http://schemas.microsoft.com/office/drawing/2014/main" id="{D97145D7-24FD-4EF7-A86B-1AE8A4CD7CA2}"/>
-              </a:ext>
-            </a:extLst>
-          </p:cNvPr>
+            <a:endParaRPr lang="en-US"/>
+          </a:p>
+        </p:txBody>
+      </p:sp>
+      <p:sp>
+        <p:nvSpPr>
+          <p:cNvPr id="5" name="Slide Number Placeholder 4"/>
           <p:cNvSpPr>
             <a:spLocks noGrp="1"/>
           </p:cNvSpPr>
@@ -2003,18 +1750,18 @@
           <a:bodyPr/>
           <a:lstStyle/>
           <a:p>
-            <a:fld id="{7673EE0C-0863-498C-9054-DB8CCFC87F4C}" type="slidenum">
-              <a:rPr lang="zh-CN" altLang="en-US" smtClean="0"/>
+            <a:fld id="{1F412440-1B23-604B-B178-CB159C9EC6EA}" type="slidenum">
+              <a:rPr lang="en-US" smtClean="0"/>
               <a:t>‹#›</a:t>
             </a:fld>
-            <a:endParaRPr lang="zh-CN" altLang="en-US"/>
+            <a:endParaRPr lang="en-US"/>
           </a:p>
         </p:txBody>
       </p:sp>
     </p:spTree>
     <p:extLst>
       <p:ext uri="{BB962C8B-B14F-4D97-AF65-F5344CB8AC3E}">
-        <p14:creationId xmlns:p14="http://schemas.microsoft.com/office/powerpoint/2010/main" val="2491300841"/>
+        <p14:creationId xmlns:p14="http://schemas.microsoft.com/office/powerpoint/2010/main" val="1765112309"/>
       </p:ext>
     </p:extLst>
   </p:cSld>
@@ -2026,7 +1773,7 @@
 
 <file path=ppt/slideLayouts/slideLayout7.xml><?xml version="1.0" encoding="utf-8"?>
 <p:sldLayout xmlns:a="http://schemas.openxmlformats.org/drawingml/2006/main" xmlns:r="http://schemas.openxmlformats.org/officeDocument/2006/relationships" xmlns:p="http://schemas.openxmlformats.org/presentationml/2006/main" type="blank" preserve="1">
-  <p:cSld name="空白">
+  <p:cSld name="Blank">
     <p:spTree>
       <p:nvGrpSpPr>
         <p:cNvPr id="1" name=""/>
@@ -2043,13 +1790,7 @@
       </p:grpSpPr>
       <p:sp>
         <p:nvSpPr>
-          <p:cNvPr id="2" name="日期占位符 1">
-            <a:extLst>
-              <a:ext uri="{FF2B5EF4-FFF2-40B4-BE49-F238E27FC236}">
-                <a16:creationId xmlns:a16="http://schemas.microsoft.com/office/drawing/2014/main" id="{A5B4FC42-EA87-43A9-A5B3-E0EA7EB6E42F}"/>
-              </a:ext>
-            </a:extLst>
-          </p:cNvPr>
+          <p:cNvPr id="2" name="Date Placeholder 1"/>
           <p:cNvSpPr>
             <a:spLocks noGrp="1"/>
           </p:cNvSpPr>
@@ -2062,23 +1803,17 @@
           <a:bodyPr/>
           <a:lstStyle/>
           <a:p>
-            <a:fld id="{488607AE-241E-4541-9A94-40C722101DE2}" type="datetimeFigureOut">
-              <a:rPr lang="zh-CN" altLang="en-US" smtClean="0"/>
-              <a:t>2019/6/27</a:t>
+            <a:fld id="{9ED3734C-ACA2-CD44-9419-3EA4E9A728CC}" type="datetimeFigureOut">
+              <a:rPr lang="en-US" smtClean="0"/>
+              <a:t>12/5/2019</a:t>
             </a:fld>
-            <a:endParaRPr lang="zh-CN" altLang="en-US"/>
-          </a:p>
-        </p:txBody>
-      </p:sp>
-      <p:sp>
-        <p:nvSpPr>
-          <p:cNvPr id="3" name="页脚占位符 2">
-            <a:extLst>
-              <a:ext uri="{FF2B5EF4-FFF2-40B4-BE49-F238E27FC236}">
-                <a16:creationId xmlns:a16="http://schemas.microsoft.com/office/drawing/2014/main" id="{9C8F498C-73BF-431F-BF78-2FBD1B41F0BC}"/>
-              </a:ext>
-            </a:extLst>
-          </p:cNvPr>
+            <a:endParaRPr lang="en-US"/>
+          </a:p>
+        </p:txBody>
+      </p:sp>
+      <p:sp>
+        <p:nvSpPr>
+          <p:cNvPr id="3" name="Footer Placeholder 2"/>
           <p:cNvSpPr>
             <a:spLocks noGrp="1"/>
           </p:cNvSpPr>
@@ -2091,19 +1826,13 @@
           <a:bodyPr/>
           <a:lstStyle/>
           <a:p>
-            <a:endParaRPr lang="zh-CN" altLang="en-US"/>
-          </a:p>
-        </p:txBody>
-      </p:sp>
-      <p:sp>
-        <p:nvSpPr>
-          <p:cNvPr id="4" name="灯片编号占位符 3">
-            <a:extLst>
-              <a:ext uri="{FF2B5EF4-FFF2-40B4-BE49-F238E27FC236}">
-                <a16:creationId xmlns:a16="http://schemas.microsoft.com/office/drawing/2014/main" id="{7682BD3E-BD51-40CC-9C45-E9D9D819AA31}"/>
-              </a:ext>
-            </a:extLst>
-          </p:cNvPr>
+            <a:endParaRPr lang="en-US"/>
+          </a:p>
+        </p:txBody>
+      </p:sp>
+      <p:sp>
+        <p:nvSpPr>
+          <p:cNvPr id="4" name="Slide Number Placeholder 3"/>
           <p:cNvSpPr>
             <a:spLocks noGrp="1"/>
           </p:cNvSpPr>
@@ -2116,18 +1845,18 @@
           <a:bodyPr/>
           <a:lstStyle/>
           <a:p>
-            <a:fld id="{7673EE0C-0863-498C-9054-DB8CCFC87F4C}" type="slidenum">
-              <a:rPr lang="zh-CN" altLang="en-US" smtClean="0"/>
+            <a:fld id="{1F412440-1B23-604B-B178-CB159C9EC6EA}" type="slidenum">
+              <a:rPr lang="en-US" smtClean="0"/>
               <a:t>‹#›</a:t>
             </a:fld>
-            <a:endParaRPr lang="zh-CN" altLang="en-US"/>
+            <a:endParaRPr lang="en-US"/>
           </a:p>
         </p:txBody>
       </p:sp>
     </p:spTree>
     <p:extLst>
       <p:ext uri="{BB962C8B-B14F-4D97-AF65-F5344CB8AC3E}">
-        <p14:creationId xmlns:p14="http://schemas.microsoft.com/office/powerpoint/2010/main" val="3867863073"/>
+        <p14:creationId xmlns:p14="http://schemas.microsoft.com/office/powerpoint/2010/main" val="903477705"/>
       </p:ext>
     </p:extLst>
   </p:cSld>
@@ -2139,7 +1868,7 @@
 
 <file path=ppt/slideLayouts/slideLayout8.xml><?xml version="1.0" encoding="utf-8"?>
 <p:sldLayout xmlns:a="http://schemas.openxmlformats.org/drawingml/2006/main" xmlns:r="http://schemas.openxmlformats.org/officeDocument/2006/relationships" xmlns:p="http://schemas.openxmlformats.org/presentationml/2006/main" type="objTx" preserve="1">
-  <p:cSld name="内容与标题">
+  <p:cSld name="Content with Caption">
     <p:spTree>
       <p:nvGrpSpPr>
         <p:cNvPr id="1" name=""/>
@@ -2156,13 +1885,7 @@
       </p:grpSpPr>
       <p:sp>
         <p:nvSpPr>
-          <p:cNvPr id="2" name="标题 1">
-            <a:extLst>
-              <a:ext uri="{FF2B5EF4-FFF2-40B4-BE49-F238E27FC236}">
-                <a16:creationId xmlns:a16="http://schemas.microsoft.com/office/drawing/2014/main" id="{600F5306-FD7F-4A7D-AB28-8F7E352DD415}"/>
-              </a:ext>
-            </a:extLst>
-          </p:cNvPr>
+          <p:cNvPr id="2" name="Title 1"/>
           <p:cNvSpPr>
             <a:spLocks noGrp="1"/>
           </p:cNvSpPr>
@@ -2185,21 +1908,15 @@
           </a:lstStyle>
           <a:p>
             <a:r>
-              <a:rPr lang="zh-CN" altLang="en-US"/>
-              <a:t>单击此处编辑母版标题样式</a:t>
-            </a:r>
-          </a:p>
-        </p:txBody>
-      </p:sp>
-      <p:sp>
-        <p:nvSpPr>
-          <p:cNvPr id="3" name="内容占位符 2">
-            <a:extLst>
-              <a:ext uri="{FF2B5EF4-FFF2-40B4-BE49-F238E27FC236}">
-                <a16:creationId xmlns:a16="http://schemas.microsoft.com/office/drawing/2014/main" id="{99811D2F-F46F-4B13-A18D-43D793816504}"/>
-              </a:ext>
-            </a:extLst>
-          </p:cNvPr>
+              <a:rPr lang="en-US"/>
+              <a:t>Click to edit Master title style</a:t>
+            </a:r>
+          </a:p>
+        </p:txBody>
+      </p:sp>
+      <p:sp>
+        <p:nvSpPr>
+          <p:cNvPr id="3" name="Content Placeholder 2"/>
           <p:cNvSpPr>
             <a:spLocks noGrp="1"/>
           </p:cNvSpPr>
@@ -2247,49 +1964,43 @@
           <a:p>
             <a:pPr lvl="0"/>
             <a:r>
-              <a:rPr lang="zh-CN" altLang="en-US"/>
-              <a:t>单击此处编辑母版文本样式</a:t>
+              <a:rPr lang="en-US"/>
+              <a:t>Click to edit Master text styles</a:t>
             </a:r>
           </a:p>
           <a:p>
             <a:pPr lvl="1"/>
             <a:r>
-              <a:rPr lang="zh-CN" altLang="en-US"/>
-              <a:t>二级</a:t>
+              <a:rPr lang="en-US"/>
+              <a:t>Second level</a:t>
             </a:r>
           </a:p>
           <a:p>
             <a:pPr lvl="2"/>
             <a:r>
-              <a:rPr lang="zh-CN" altLang="en-US"/>
-              <a:t>三级</a:t>
+              <a:rPr lang="en-US"/>
+              <a:t>Third level</a:t>
             </a:r>
           </a:p>
           <a:p>
             <a:pPr lvl="3"/>
             <a:r>
-              <a:rPr lang="zh-CN" altLang="en-US"/>
-              <a:t>四级</a:t>
+              <a:rPr lang="en-US"/>
+              <a:t>Fourth level</a:t>
             </a:r>
           </a:p>
           <a:p>
             <a:pPr lvl="4"/>
             <a:r>
-              <a:rPr lang="zh-CN" altLang="en-US"/>
-              <a:t>五级</a:t>
-            </a:r>
-          </a:p>
-        </p:txBody>
-      </p:sp>
-      <p:sp>
-        <p:nvSpPr>
-          <p:cNvPr id="4" name="文本占位符 3">
-            <a:extLst>
-              <a:ext uri="{FF2B5EF4-FFF2-40B4-BE49-F238E27FC236}">
-                <a16:creationId xmlns:a16="http://schemas.microsoft.com/office/drawing/2014/main" id="{5AB78C7E-00C5-44CE-B2D5-5E4E75FF8227}"/>
-              </a:ext>
-            </a:extLst>
-          </p:cNvPr>
+              <a:rPr lang="en-US"/>
+              <a:t>Fifth level</a:t>
+            </a:r>
+          </a:p>
+        </p:txBody>
+      </p:sp>
+      <p:sp>
+        <p:nvSpPr>
+          <p:cNvPr id="4" name="Text Placeholder 3"/>
           <p:cNvSpPr>
             <a:spLocks noGrp="1"/>
           </p:cNvSpPr>
@@ -2346,21 +2057,15 @@
           <a:p>
             <a:pPr lvl="0"/>
             <a:r>
-              <a:rPr lang="zh-CN" altLang="en-US"/>
-              <a:t>单击此处编辑母版文本样式</a:t>
-            </a:r>
-          </a:p>
-        </p:txBody>
-      </p:sp>
-      <p:sp>
-        <p:nvSpPr>
-          <p:cNvPr id="5" name="日期占位符 4">
-            <a:extLst>
-              <a:ext uri="{FF2B5EF4-FFF2-40B4-BE49-F238E27FC236}">
-                <a16:creationId xmlns:a16="http://schemas.microsoft.com/office/drawing/2014/main" id="{E6666960-CB33-41BE-80BC-22061B991134}"/>
-              </a:ext>
-            </a:extLst>
-          </p:cNvPr>
+              <a:rPr lang="en-US"/>
+              <a:t>Click to edit Master text styles</a:t>
+            </a:r>
+          </a:p>
+        </p:txBody>
+      </p:sp>
+      <p:sp>
+        <p:nvSpPr>
+          <p:cNvPr id="5" name="Date Placeholder 4"/>
           <p:cNvSpPr>
             <a:spLocks noGrp="1"/>
           </p:cNvSpPr>
@@ -2373,23 +2078,17 @@
           <a:bodyPr/>
           <a:lstStyle/>
           <a:p>
-            <a:fld id="{488607AE-241E-4541-9A94-40C722101DE2}" type="datetimeFigureOut">
-              <a:rPr lang="zh-CN" altLang="en-US" smtClean="0"/>
-              <a:t>2019/6/27</a:t>
+            <a:fld id="{9ED3734C-ACA2-CD44-9419-3EA4E9A728CC}" type="datetimeFigureOut">
+              <a:rPr lang="en-US" smtClean="0"/>
+              <a:t>12/5/2019</a:t>
             </a:fld>
-            <a:endParaRPr lang="zh-CN" altLang="en-US"/>
-          </a:p>
-        </p:txBody>
-      </p:sp>
-      <p:sp>
-        <p:nvSpPr>
-          <p:cNvPr id="6" name="页脚占位符 5">
-            <a:extLst>
-              <a:ext uri="{FF2B5EF4-FFF2-40B4-BE49-F238E27FC236}">
-                <a16:creationId xmlns:a16="http://schemas.microsoft.com/office/drawing/2014/main" id="{D2364734-4F34-494B-89C6-C673D4800F7A}"/>
-              </a:ext>
-            </a:extLst>
-          </p:cNvPr>
+            <a:endParaRPr lang="en-US"/>
+          </a:p>
+        </p:txBody>
+      </p:sp>
+      <p:sp>
+        <p:nvSpPr>
+          <p:cNvPr id="6" name="Footer Placeholder 5"/>
           <p:cNvSpPr>
             <a:spLocks noGrp="1"/>
           </p:cNvSpPr>
@@ -2402,19 +2101,13 @@
           <a:bodyPr/>
           <a:lstStyle/>
           <a:p>
-            <a:endParaRPr lang="zh-CN" altLang="en-US"/>
-          </a:p>
-        </p:txBody>
-      </p:sp>
-      <p:sp>
-        <p:nvSpPr>
-          <p:cNvPr id="7" name="灯片编号占位符 6">
-            <a:extLst>
-              <a:ext uri="{FF2B5EF4-FFF2-40B4-BE49-F238E27FC236}">
-                <a16:creationId xmlns:a16="http://schemas.microsoft.com/office/drawing/2014/main" id="{DF2FB5E5-156C-42F3-9C47-B96E50EDC8E2}"/>
-              </a:ext>
-            </a:extLst>
-          </p:cNvPr>
+            <a:endParaRPr lang="en-US"/>
+          </a:p>
+        </p:txBody>
+      </p:sp>
+      <p:sp>
+        <p:nvSpPr>
+          <p:cNvPr id="7" name="Slide Number Placeholder 6"/>
           <p:cNvSpPr>
             <a:spLocks noGrp="1"/>
           </p:cNvSpPr>
@@ -2427,18 +2120,18 @@
           <a:bodyPr/>
           <a:lstStyle/>
           <a:p>
-            <a:fld id="{7673EE0C-0863-498C-9054-DB8CCFC87F4C}" type="slidenum">
-              <a:rPr lang="zh-CN" altLang="en-US" smtClean="0"/>
+            <a:fld id="{1F412440-1B23-604B-B178-CB159C9EC6EA}" type="slidenum">
+              <a:rPr lang="en-US" smtClean="0"/>
               <a:t>‹#›</a:t>
             </a:fld>
-            <a:endParaRPr lang="zh-CN" altLang="en-US"/>
+            <a:endParaRPr lang="en-US"/>
           </a:p>
         </p:txBody>
       </p:sp>
     </p:spTree>
     <p:extLst>
       <p:ext uri="{BB962C8B-B14F-4D97-AF65-F5344CB8AC3E}">
-        <p14:creationId xmlns:p14="http://schemas.microsoft.com/office/powerpoint/2010/main" val="1385819109"/>
+        <p14:creationId xmlns:p14="http://schemas.microsoft.com/office/powerpoint/2010/main" val="2040403645"/>
       </p:ext>
     </p:extLst>
   </p:cSld>
@@ -2450,7 +2143,7 @@
 
 <file path=ppt/slideLayouts/slideLayout9.xml><?xml version="1.0" encoding="utf-8"?>
 <p:sldLayout xmlns:a="http://schemas.openxmlformats.org/drawingml/2006/main" xmlns:r="http://schemas.openxmlformats.org/officeDocument/2006/relationships" xmlns:p="http://schemas.openxmlformats.org/presentationml/2006/main" type="picTx" preserve="1">
-  <p:cSld name="图片与标题">
+  <p:cSld name="Picture with Caption">
     <p:spTree>
       <p:nvGrpSpPr>
         <p:cNvPr id="1" name=""/>
@@ -2467,13 +2160,7 @@
       </p:grpSpPr>
       <p:sp>
         <p:nvSpPr>
-          <p:cNvPr id="2" name="标题 1">
-            <a:extLst>
-              <a:ext uri="{FF2B5EF4-FFF2-40B4-BE49-F238E27FC236}">
-                <a16:creationId xmlns:a16="http://schemas.microsoft.com/office/drawing/2014/main" id="{DD88D7A8-C7C4-424F-BF11-FA156677EAF4}"/>
-              </a:ext>
-            </a:extLst>
-          </p:cNvPr>
+          <p:cNvPr id="2" name="Title 1"/>
           <p:cNvSpPr>
             <a:spLocks noGrp="1"/>
           </p:cNvSpPr>
@@ -2496,21 +2183,15 @@
           </a:lstStyle>
           <a:p>
             <a:r>
-              <a:rPr lang="zh-CN" altLang="en-US"/>
-              <a:t>单击此处编辑母版标题样式</a:t>
-            </a:r>
-          </a:p>
-        </p:txBody>
-      </p:sp>
-      <p:sp>
-        <p:nvSpPr>
-          <p:cNvPr id="3" name="图片占位符 2">
-            <a:extLst>
-              <a:ext uri="{FF2B5EF4-FFF2-40B4-BE49-F238E27FC236}">
-                <a16:creationId xmlns:a16="http://schemas.microsoft.com/office/drawing/2014/main" id="{4E31ECBB-F15A-4D8A-864F-8A342BD35868}"/>
-              </a:ext>
-            </a:extLst>
-          </p:cNvPr>
+              <a:rPr lang="en-US"/>
+              <a:t>Click to edit Master title style</a:t>
+            </a:r>
+          </a:p>
+        </p:txBody>
+      </p:sp>
+      <p:sp>
+        <p:nvSpPr>
+          <p:cNvPr id="3" name="Picture Placeholder 2"/>
           <p:cNvSpPr>
             <a:spLocks noGrp="1"/>
           </p:cNvSpPr>
@@ -2565,19 +2246,13 @@
             </a:lvl9pPr>
           </a:lstStyle>
           <a:p>
-            <a:endParaRPr lang="zh-CN" altLang="en-US"/>
-          </a:p>
-        </p:txBody>
-      </p:sp>
-      <p:sp>
-        <p:nvSpPr>
-          <p:cNvPr id="4" name="文本占位符 3">
-            <a:extLst>
-              <a:ext uri="{FF2B5EF4-FFF2-40B4-BE49-F238E27FC236}">
-                <a16:creationId xmlns:a16="http://schemas.microsoft.com/office/drawing/2014/main" id="{FF797284-BBAF-424E-93DC-E282D87651FE}"/>
-              </a:ext>
-            </a:extLst>
-          </p:cNvPr>
+            <a:endParaRPr lang="en-US"/>
+          </a:p>
+        </p:txBody>
+      </p:sp>
+      <p:sp>
+        <p:nvSpPr>
+          <p:cNvPr id="4" name="Text Placeholder 3"/>
           <p:cNvSpPr>
             <a:spLocks noGrp="1"/>
           </p:cNvSpPr>
@@ -2634,21 +2309,15 @@
           <a:p>
             <a:pPr lvl="0"/>
             <a:r>
-              <a:rPr lang="zh-CN" altLang="en-US"/>
-              <a:t>单击此处编辑母版文本样式</a:t>
-            </a:r>
-          </a:p>
-        </p:txBody>
-      </p:sp>
-      <p:sp>
-        <p:nvSpPr>
-          <p:cNvPr id="5" name="日期占位符 4">
-            <a:extLst>
-              <a:ext uri="{FF2B5EF4-FFF2-40B4-BE49-F238E27FC236}">
-                <a16:creationId xmlns:a16="http://schemas.microsoft.com/office/drawing/2014/main" id="{C4DE0D4A-3DBA-44E1-AC81-FB907209E2AF}"/>
-              </a:ext>
-            </a:extLst>
-          </p:cNvPr>
+              <a:rPr lang="en-US"/>
+              <a:t>Click to edit Master text styles</a:t>
+            </a:r>
+          </a:p>
+        </p:txBody>
+      </p:sp>
+      <p:sp>
+        <p:nvSpPr>
+          <p:cNvPr id="5" name="Date Placeholder 4"/>
           <p:cNvSpPr>
             <a:spLocks noGrp="1"/>
           </p:cNvSpPr>
@@ -2661,23 +2330,17 @@
           <a:bodyPr/>
           <a:lstStyle/>
           <a:p>
-            <a:fld id="{488607AE-241E-4541-9A94-40C722101DE2}" type="datetimeFigureOut">
-              <a:rPr lang="zh-CN" altLang="en-US" smtClean="0"/>
-              <a:t>2019/6/27</a:t>
+            <a:fld id="{9ED3734C-ACA2-CD44-9419-3EA4E9A728CC}" type="datetimeFigureOut">
+              <a:rPr lang="en-US" smtClean="0"/>
+              <a:t>12/5/2019</a:t>
             </a:fld>
-            <a:endParaRPr lang="zh-CN" altLang="en-US"/>
-          </a:p>
-        </p:txBody>
-      </p:sp>
-      <p:sp>
-        <p:nvSpPr>
-          <p:cNvPr id="6" name="页脚占位符 5">
-            <a:extLst>
-              <a:ext uri="{FF2B5EF4-FFF2-40B4-BE49-F238E27FC236}">
-                <a16:creationId xmlns:a16="http://schemas.microsoft.com/office/drawing/2014/main" id="{823EA6D8-BF61-4F4C-9374-1FEB497D6AE2}"/>
-              </a:ext>
-            </a:extLst>
-          </p:cNvPr>
+            <a:endParaRPr lang="en-US"/>
+          </a:p>
+        </p:txBody>
+      </p:sp>
+      <p:sp>
+        <p:nvSpPr>
+          <p:cNvPr id="6" name="Footer Placeholder 5"/>
           <p:cNvSpPr>
             <a:spLocks noGrp="1"/>
           </p:cNvSpPr>
@@ -2690,19 +2353,13 @@
           <a:bodyPr/>
           <a:lstStyle/>
           <a:p>
-            <a:endParaRPr lang="zh-CN" altLang="en-US"/>
-          </a:p>
-        </p:txBody>
-      </p:sp>
-      <p:sp>
-        <p:nvSpPr>
-          <p:cNvPr id="7" name="灯片编号占位符 6">
-            <a:extLst>
-              <a:ext uri="{FF2B5EF4-FFF2-40B4-BE49-F238E27FC236}">
-                <a16:creationId xmlns:a16="http://schemas.microsoft.com/office/drawing/2014/main" id="{B59D433D-DB02-46C0-8FA4-DAD4E4E05D53}"/>
-              </a:ext>
-            </a:extLst>
-          </p:cNvPr>
+            <a:endParaRPr lang="en-US"/>
+          </a:p>
+        </p:txBody>
+      </p:sp>
+      <p:sp>
+        <p:nvSpPr>
+          <p:cNvPr id="7" name="Slide Number Placeholder 6"/>
           <p:cNvSpPr>
             <a:spLocks noGrp="1"/>
           </p:cNvSpPr>
@@ -2715,18 +2372,18 @@
           <a:bodyPr/>
           <a:lstStyle/>
           <a:p>
-            <a:fld id="{7673EE0C-0863-498C-9054-DB8CCFC87F4C}" type="slidenum">
-              <a:rPr lang="zh-CN" altLang="en-US" smtClean="0"/>
+            <a:fld id="{1F412440-1B23-604B-B178-CB159C9EC6EA}" type="slidenum">
+              <a:rPr lang="en-US" smtClean="0"/>
               <a:t>‹#›</a:t>
             </a:fld>
-            <a:endParaRPr lang="zh-CN" altLang="en-US"/>
+            <a:endParaRPr lang="en-US"/>
           </a:p>
         </p:txBody>
       </p:sp>
     </p:spTree>
     <p:extLst>
       <p:ext uri="{BB962C8B-B14F-4D97-AF65-F5344CB8AC3E}">
-        <p14:creationId xmlns:p14="http://schemas.microsoft.com/office/powerpoint/2010/main" val="1611851724"/>
+        <p14:creationId xmlns:p14="http://schemas.microsoft.com/office/powerpoint/2010/main" val="2045186219"/>
       </p:ext>
     </p:extLst>
   </p:cSld>
@@ -2760,13 +2417,7 @@
       </p:grpSpPr>
       <p:sp>
         <p:nvSpPr>
-          <p:cNvPr id="2" name="标题占位符 1">
-            <a:extLst>
-              <a:ext uri="{FF2B5EF4-FFF2-40B4-BE49-F238E27FC236}">
-                <a16:creationId xmlns:a16="http://schemas.microsoft.com/office/drawing/2014/main" id="{6FB56C91-644C-48B3-8DD3-CF13FCEF411B}"/>
-              </a:ext>
-            </a:extLst>
-          </p:cNvPr>
+          <p:cNvPr id="2" name="Title Placeholder 1"/>
           <p:cNvSpPr>
             <a:spLocks noGrp="1"/>
           </p:cNvSpPr>
@@ -2790,21 +2441,15 @@
           <a:lstStyle/>
           <a:p>
             <a:r>
-              <a:rPr lang="zh-CN" altLang="en-US"/>
-              <a:t>单击此处编辑母版标题样式</a:t>
-            </a:r>
-          </a:p>
-        </p:txBody>
-      </p:sp>
-      <p:sp>
-        <p:nvSpPr>
-          <p:cNvPr id="3" name="文本占位符 2">
-            <a:extLst>
-              <a:ext uri="{FF2B5EF4-FFF2-40B4-BE49-F238E27FC236}">
-                <a16:creationId xmlns:a16="http://schemas.microsoft.com/office/drawing/2014/main" id="{F50E978C-4894-423D-89A6-D7839C472B1E}"/>
-              </a:ext>
-            </a:extLst>
-          </p:cNvPr>
+              <a:rPr lang="en-US"/>
+              <a:t>Click to edit Master title style</a:t>
+            </a:r>
+          </a:p>
+        </p:txBody>
+      </p:sp>
+      <p:sp>
+        <p:nvSpPr>
+          <p:cNvPr id="3" name="Text Placeholder 2"/>
           <p:cNvSpPr>
             <a:spLocks noGrp="1"/>
           </p:cNvSpPr>
@@ -2829,49 +2474,43 @@
           <a:p>
             <a:pPr lvl="0"/>
             <a:r>
-              <a:rPr lang="zh-CN" altLang="en-US"/>
-              <a:t>单击此处编辑母版文本样式</a:t>
+              <a:rPr lang="en-US"/>
+              <a:t>Click to edit Master text styles</a:t>
             </a:r>
           </a:p>
           <a:p>
             <a:pPr lvl="1"/>
             <a:r>
-              <a:rPr lang="zh-CN" altLang="en-US"/>
-              <a:t>二级</a:t>
+              <a:rPr lang="en-US"/>
+              <a:t>Second level</a:t>
             </a:r>
           </a:p>
           <a:p>
             <a:pPr lvl="2"/>
             <a:r>
-              <a:rPr lang="zh-CN" altLang="en-US"/>
-              <a:t>三级</a:t>
+              <a:rPr lang="en-US"/>
+              <a:t>Third level</a:t>
             </a:r>
           </a:p>
           <a:p>
             <a:pPr lvl="3"/>
             <a:r>
-              <a:rPr lang="zh-CN" altLang="en-US"/>
-              <a:t>四级</a:t>
+              <a:rPr lang="en-US"/>
+              <a:t>Fourth level</a:t>
             </a:r>
           </a:p>
           <a:p>
             <a:pPr lvl="4"/>
             <a:r>
-              <a:rPr lang="zh-CN" altLang="en-US"/>
-              <a:t>五级</a:t>
-            </a:r>
-          </a:p>
-        </p:txBody>
-      </p:sp>
-      <p:sp>
-        <p:nvSpPr>
-          <p:cNvPr id="4" name="日期占位符 3">
-            <a:extLst>
-              <a:ext uri="{FF2B5EF4-FFF2-40B4-BE49-F238E27FC236}">
-                <a16:creationId xmlns:a16="http://schemas.microsoft.com/office/drawing/2014/main" id="{A712BD29-F643-4C6B-8AEA-B203C167AD6D}"/>
-              </a:ext>
-            </a:extLst>
-          </p:cNvPr>
+              <a:rPr lang="en-US"/>
+              <a:t>Fifth level</a:t>
+            </a:r>
+          </a:p>
+        </p:txBody>
+      </p:sp>
+      <p:sp>
+        <p:nvSpPr>
+          <p:cNvPr id="4" name="Date Placeholder 3"/>
           <p:cNvSpPr>
             <a:spLocks noGrp="1"/>
           </p:cNvSpPr>
@@ -2902,23 +2541,17 @@
             </a:lvl1pPr>
           </a:lstStyle>
           <a:p>
-            <a:fld id="{488607AE-241E-4541-9A94-40C722101DE2}" type="datetimeFigureOut">
-              <a:rPr lang="zh-CN" altLang="en-US" smtClean="0"/>
-              <a:t>2019/6/27</a:t>
+            <a:fld id="{9ED3734C-ACA2-CD44-9419-3EA4E9A728CC}" type="datetimeFigureOut">
+              <a:rPr lang="en-US" smtClean="0"/>
+              <a:t>12/5/2019</a:t>
             </a:fld>
-            <a:endParaRPr lang="zh-CN" altLang="en-US"/>
-          </a:p>
-        </p:txBody>
-      </p:sp>
-      <p:sp>
-        <p:nvSpPr>
-          <p:cNvPr id="5" name="页脚占位符 4">
-            <a:extLst>
-              <a:ext uri="{FF2B5EF4-FFF2-40B4-BE49-F238E27FC236}">
-                <a16:creationId xmlns:a16="http://schemas.microsoft.com/office/drawing/2014/main" id="{94738361-0FAF-4A25-BD49-534FE676CBAC}"/>
-              </a:ext>
-            </a:extLst>
-          </p:cNvPr>
+            <a:endParaRPr lang="en-US"/>
+          </a:p>
+        </p:txBody>
+      </p:sp>
+      <p:sp>
+        <p:nvSpPr>
+          <p:cNvPr id="5" name="Footer Placeholder 4"/>
           <p:cNvSpPr>
             <a:spLocks noGrp="1"/>
           </p:cNvSpPr>
@@ -2949,19 +2582,13 @@
             </a:lvl1pPr>
           </a:lstStyle>
           <a:p>
-            <a:endParaRPr lang="zh-CN" altLang="en-US"/>
-          </a:p>
-        </p:txBody>
-      </p:sp>
-      <p:sp>
-        <p:nvSpPr>
-          <p:cNvPr id="6" name="灯片编号占位符 5">
-            <a:extLst>
-              <a:ext uri="{FF2B5EF4-FFF2-40B4-BE49-F238E27FC236}">
-                <a16:creationId xmlns:a16="http://schemas.microsoft.com/office/drawing/2014/main" id="{3DE68FFF-3748-46C4-8F3F-D0AE6BF538C4}"/>
-              </a:ext>
-            </a:extLst>
-          </p:cNvPr>
+            <a:endParaRPr lang="en-US"/>
+          </a:p>
+        </p:txBody>
+      </p:sp>
+      <p:sp>
+        <p:nvSpPr>
+          <p:cNvPr id="6" name="Slide Number Placeholder 5"/>
           <p:cNvSpPr>
             <a:spLocks noGrp="1"/>
           </p:cNvSpPr>
@@ -2992,18 +2619,18 @@
             </a:lvl1pPr>
           </a:lstStyle>
           <a:p>
-            <a:fld id="{7673EE0C-0863-498C-9054-DB8CCFC87F4C}" type="slidenum">
-              <a:rPr lang="zh-CN" altLang="en-US" smtClean="0"/>
+            <a:fld id="{1F412440-1B23-604B-B178-CB159C9EC6EA}" type="slidenum">
+              <a:rPr lang="en-US" smtClean="0"/>
               <a:t>‹#›</a:t>
             </a:fld>
-            <a:endParaRPr lang="zh-CN" altLang="en-US"/>
+            <a:endParaRPr lang="en-US"/>
           </a:p>
         </p:txBody>
       </p:sp>
     </p:spTree>
     <p:extLst>
       <p:ext uri="{BB962C8B-B14F-4D97-AF65-F5344CB8AC3E}">
-        <p14:creationId xmlns:p14="http://schemas.microsoft.com/office/powerpoint/2010/main" val="1526870456"/>
+        <p14:creationId xmlns:p14="http://schemas.microsoft.com/office/powerpoint/2010/main" val="1014290460"/>
       </p:ext>
     </p:extLst>
   </p:cSld>
@@ -3049,7 +2676,7 @@
         <a:spcBef>
           <a:spcPts val="1000"/>
         </a:spcBef>
-        <a:buFont typeface="Arial" panose="020B0604020202020204" pitchFamily="34" charset="0"/>
+        <a:buFont typeface="Arial"/>
         <a:buChar char="•"/>
         <a:defRPr sz="2800" kern="1200">
           <a:solidFill>
@@ -3067,7 +2694,7 @@
         <a:spcBef>
           <a:spcPts val="500"/>
         </a:spcBef>
-        <a:buFont typeface="Arial" panose="020B0604020202020204" pitchFamily="34" charset="0"/>
+        <a:buFont typeface="Arial"/>
         <a:buChar char="•"/>
         <a:defRPr sz="2400" kern="1200">
           <a:solidFill>
@@ -3085,7 +2712,7 @@
         <a:spcBef>
           <a:spcPts val="500"/>
         </a:spcBef>
-        <a:buFont typeface="Arial" panose="020B0604020202020204" pitchFamily="34" charset="0"/>
+        <a:buFont typeface="Arial"/>
         <a:buChar char="•"/>
         <a:defRPr sz="2000" kern="1200">
           <a:solidFill>
@@ -3103,7 +2730,7 @@
         <a:spcBef>
           <a:spcPts val="500"/>
         </a:spcBef>
-        <a:buFont typeface="Arial" panose="020B0604020202020204" pitchFamily="34" charset="0"/>
+        <a:buFont typeface="Arial"/>
         <a:buChar char="•"/>
         <a:defRPr sz="1800" kern="1200">
           <a:solidFill>
@@ -3121,7 +2748,7 @@
         <a:spcBef>
           <a:spcPts val="500"/>
         </a:spcBef>
-        <a:buFont typeface="Arial" panose="020B0604020202020204" pitchFamily="34" charset="0"/>
+        <a:buFont typeface="Arial"/>
         <a:buChar char="•"/>
         <a:defRPr sz="1800" kern="1200">
           <a:solidFill>
@@ -3139,7 +2766,7 @@
         <a:spcBef>
           <a:spcPts val="500"/>
         </a:spcBef>
-        <a:buFont typeface="Arial" panose="020B0604020202020204" pitchFamily="34" charset="0"/>
+        <a:buFont typeface="Arial"/>
         <a:buChar char="•"/>
         <a:defRPr sz="1800" kern="1200">
           <a:solidFill>
@@ -3157,7 +2784,7 @@
         <a:spcBef>
           <a:spcPts val="500"/>
         </a:spcBef>
-        <a:buFont typeface="Arial" panose="020B0604020202020204" pitchFamily="34" charset="0"/>
+        <a:buFont typeface="Arial"/>
         <a:buChar char="•"/>
         <a:defRPr sz="1800" kern="1200">
           <a:solidFill>
@@ -3175,7 +2802,7 @@
         <a:spcBef>
           <a:spcPts val="500"/>
         </a:spcBef>
-        <a:buFont typeface="Arial" panose="020B0604020202020204" pitchFamily="34" charset="0"/>
+        <a:buFont typeface="Arial"/>
         <a:buChar char="•"/>
         <a:defRPr sz="1800" kern="1200">
           <a:solidFill>
@@ -3193,7 +2820,7 @@
         <a:spcBef>
           <a:spcPts val="500"/>
         </a:spcBef>
-        <a:buFont typeface="Arial" panose="020B0604020202020204" pitchFamily="34" charset="0"/>
+        <a:buFont typeface="Arial"/>
         <a:buChar char="•"/>
         <a:defRPr sz="1800" kern="1200">
           <a:solidFill>
@@ -3207,7 +2834,7 @@
     </p:bodyStyle>
     <p:otherStyle>
       <a:defPPr>
-        <a:defRPr lang="zh-CN"/>
+        <a:defRPr lang="en-US"/>
       </a:defPPr>
       <a:lvl1pPr marL="0" algn="l" defTabSz="914400" rtl="0" eaLnBrk="1" latinLnBrk="0" hangingPunct="1">
         <a:defRPr sz="1800" kern="1200">
@@ -3323,13 +2950,7 @@
       </p:grpSpPr>
       <p:sp>
         <p:nvSpPr>
-          <p:cNvPr id="2" name="标题 1">
-            <a:extLst>
-              <a:ext uri="{FF2B5EF4-FFF2-40B4-BE49-F238E27FC236}">
-                <a16:creationId xmlns:a16="http://schemas.microsoft.com/office/drawing/2014/main" id="{4462AB00-C0E5-47EF-B24A-2CB4ADD44025}"/>
-              </a:ext>
-            </a:extLst>
-          </p:cNvPr>
+          <p:cNvPr id="2" name="Title 1"/>
           <p:cNvSpPr>
             <a:spLocks noGrp="1"/>
           </p:cNvSpPr>
@@ -3342,19 +2963,13 @@
           <a:bodyPr/>
           <a:lstStyle/>
           <a:p>
-            <a:endParaRPr lang="zh-CN" altLang="en-US"/>
-          </a:p>
-        </p:txBody>
-      </p:sp>
-      <p:sp>
-        <p:nvSpPr>
-          <p:cNvPr id="3" name="副标题 2">
-            <a:extLst>
-              <a:ext uri="{FF2B5EF4-FFF2-40B4-BE49-F238E27FC236}">
-                <a16:creationId xmlns:a16="http://schemas.microsoft.com/office/drawing/2014/main" id="{CAF8F5EC-E1DD-4D94-AFA4-89A911697633}"/>
-              </a:ext>
-            </a:extLst>
-          </p:cNvPr>
+            <a:endParaRPr lang="en-US"/>
+          </a:p>
+        </p:txBody>
+      </p:sp>
+      <p:sp>
+        <p:nvSpPr>
+          <p:cNvPr id="3" name="Subtitle 2"/>
           <p:cNvSpPr>
             <a:spLocks noGrp="1"/>
           </p:cNvSpPr>
@@ -3367,14 +2982,14 @@
           <a:bodyPr/>
           <a:lstStyle/>
           <a:p>
-            <a:endParaRPr lang="zh-CN" altLang="en-US"/>
+            <a:endParaRPr lang="en-US"/>
           </a:p>
         </p:txBody>
       </p:sp>
     </p:spTree>
     <p:extLst>
       <p:ext uri="{BB962C8B-B14F-4D97-AF65-F5344CB8AC3E}">
-        <p14:creationId xmlns:p14="http://schemas.microsoft.com/office/powerpoint/2010/main" val="4182125411"/>
+        <p14:creationId xmlns:p14="http://schemas.microsoft.com/office/powerpoint/2010/main" val="2053717610"/>
       </p:ext>
     </p:extLst>
   </p:cSld>
@@ -3385,7 +3000,7 @@
 </file>
 
 <file path=ppt/theme/theme1.xml><?xml version="1.0" encoding="utf-8"?>
-<a:theme xmlns:a="http://schemas.openxmlformats.org/drawingml/2006/main" name="Office 主题​​">
+<a:theme xmlns:a="http://schemas.openxmlformats.org/drawingml/2006/main" name="Office Theme">
   <a:themeElements>
     <a:clrScheme name="Office">
       <a:dk1>
@@ -3401,7 +3016,7 @@
         <a:srgbClr val="E7E6E6"/>
       </a:lt2>
       <a:accent1>
-        <a:srgbClr val="4472C4"/>
+        <a:srgbClr val="5B9BD5"/>
       </a:accent1>
       <a:accent2>
         <a:srgbClr val="ED7D31"/>
@@ -3413,7 +3028,7 @@
         <a:srgbClr val="FFC000"/>
       </a:accent4>
       <a:accent5>
-        <a:srgbClr val="5B9BD5"/>
+        <a:srgbClr val="4472C4"/>
       </a:accent5>
       <a:accent6>
         <a:srgbClr val="70AD47"/>
@@ -3427,12 +3042,12 @@
     </a:clrScheme>
     <a:fontScheme name="Office">
       <a:majorFont>
-        <a:latin typeface="等线 Light" panose="020F0302020204030204"/>
+        <a:latin typeface="Calibri Light" panose="020F0302020204030204"/>
         <a:ea typeface=""/>
         <a:cs typeface=""/>
-        <a:font script="Jpan" typeface="游ゴシック Light"/>
+        <a:font script="Jpan" typeface="Yu Gothic Light"/>
         <a:font script="Hang" typeface="맑은 고딕"/>
-        <a:font script="Hans" typeface="等线 Light"/>
+        <a:font script="Hans" typeface="DengXian Light"/>
         <a:font script="Hant" typeface="新細明體"/>
         <a:font script="Arab" typeface="Times New Roman"/>
         <a:font script="Hebr" typeface="Times New Roman"/>
@@ -3460,31 +3075,14 @@
         <a:font script="Viet" typeface="Times New Roman"/>
         <a:font script="Uigh" typeface="Microsoft Uighur"/>
         <a:font script="Geor" typeface="Sylfaen"/>
-        <a:font script="Armn" typeface="Arial"/>
-        <a:font script="Bugi" typeface="Leelawadee UI"/>
-        <a:font script="Bopo" typeface="Microsoft JhengHei"/>
-        <a:font script="Java" typeface="Javanese Text"/>
-        <a:font script="Lisu" typeface="Segoe UI"/>
-        <a:font script="Mymr" typeface="Myanmar Text"/>
-        <a:font script="Nkoo" typeface="Ebrima"/>
-        <a:font script="Olck" typeface="Nirmala UI"/>
-        <a:font script="Osma" typeface="Ebrima"/>
-        <a:font script="Phag" typeface="Phagspa"/>
-        <a:font script="Syrn" typeface="Estrangelo Edessa"/>
-        <a:font script="Syrj" typeface="Estrangelo Edessa"/>
-        <a:font script="Syre" typeface="Estrangelo Edessa"/>
-        <a:font script="Sora" typeface="Nirmala UI"/>
-        <a:font script="Tale" typeface="Microsoft Tai Le"/>
-        <a:font script="Talu" typeface="Microsoft New Tai Lue"/>
-        <a:font script="Tfng" typeface="Ebrima"/>
       </a:majorFont>
       <a:minorFont>
-        <a:latin typeface="等线" panose="020F0502020204030204"/>
+        <a:latin typeface="Calibri" panose="020F0502020204030204"/>
         <a:ea typeface=""/>
         <a:cs typeface=""/>
-        <a:font script="Jpan" typeface="游ゴシック"/>
+        <a:font script="Jpan" typeface="Yu Gothic"/>
         <a:font script="Hang" typeface="맑은 고딕"/>
-        <a:font script="Hans" typeface="等线"/>
+        <a:font script="Hans" typeface="DengXian"/>
         <a:font script="Hant" typeface="新細明體"/>
         <a:font script="Arab" typeface="Arial"/>
         <a:font script="Hebr" typeface="Arial"/>
@@ -3512,23 +3110,6 @@
         <a:font script="Viet" typeface="Arial"/>
         <a:font script="Uigh" typeface="Microsoft Uighur"/>
         <a:font script="Geor" typeface="Sylfaen"/>
-        <a:font script="Armn" typeface="Arial"/>
-        <a:font script="Bugi" typeface="Leelawadee UI"/>
-        <a:font script="Bopo" typeface="Microsoft JhengHei"/>
-        <a:font script="Java" typeface="Javanese Text"/>
-        <a:font script="Lisu" typeface="Segoe UI"/>
-        <a:font script="Mymr" typeface="Myanmar Text"/>
-        <a:font script="Nkoo" typeface="Ebrima"/>
-        <a:font script="Olck" typeface="Nirmala UI"/>
-        <a:font script="Osma" typeface="Ebrima"/>
-        <a:font script="Phag" typeface="Phagspa"/>
-        <a:font script="Syrn" typeface="Estrangelo Edessa"/>
-        <a:font script="Syrj" typeface="Estrangelo Edessa"/>
-        <a:font script="Syre" typeface="Estrangelo Edessa"/>
-        <a:font script="Sora" typeface="Nirmala UI"/>
-        <a:font script="Tale" typeface="Microsoft Tai Le"/>
-        <a:font script="Talu" typeface="Microsoft New Tai Lue"/>
-        <a:font script="Tfng" typeface="Ebrima"/>
       </a:minorFont>
     </a:fontScheme>
     <a:fmtScheme name="Office">

</xml_diff>